<commit_message>
Add presentation as of 14.5.15, sill needs consulting with The Self-deprecating One
</commit_message>
<xml_diff>
--- a/prezentacja/JavaScript.pptx
+++ b/prezentacja/JavaScript.pptx
@@ -5,7 +5,7 @@
     <p:sldMasterId id="2147483648" r:id="rId1"/>
   </p:sldMasterIdLst>
   <p:notesMasterIdLst>
-    <p:notesMasterId r:id="rId10"/>
+    <p:notesMasterId r:id="rId14"/>
   </p:notesMasterIdLst>
   <p:sldIdLst>
     <p:sldId id="256" r:id="rId2"/>
@@ -16,6 +16,10 @@
     <p:sldId id="261" r:id="rId7"/>
     <p:sldId id="262" r:id="rId8"/>
     <p:sldId id="263" r:id="rId9"/>
+    <p:sldId id="264" r:id="rId10"/>
+    <p:sldId id="265" r:id="rId11"/>
+    <p:sldId id="266" r:id="rId12"/>
+    <p:sldId id="267" r:id="rId13"/>
   </p:sldIdLst>
   <p:sldSz cx="9144000" cy="6858000" type="screen4x3"/>
   <p:notesSz cx="6858000" cy="9144000"/>
@@ -117,7 +121,7 @@
   <p:extLst>
     <p:ext uri="{521415D9-36F7-43E2-AB2F-B90AF26B5E84}">
       <p14:sectionLst xmlns:p14="http://schemas.microsoft.com/office/powerpoint/2010/main">
-        <p14:section name="Sekcja domyślna" id="{D0511EF3-511E-4631-88B7-1A47BE7EE97A}">
+        <p14:section name="Intro" id="{D0511EF3-511E-4631-88B7-1A47BE7EE97A}">
           <p14:sldIdLst>
             <p14:sldId id="256"/>
             <p14:sldId id="257"/>
@@ -135,6 +139,14 @@
           <p14:sldIdLst>
             <p14:sldId id="262"/>
             <p14:sldId id="263"/>
+          </p14:sldIdLst>
+        </p14:section>
+        <p14:section name="Zmienne" id="{98A37857-616A-476C-9AB9-773894B3B58D}">
+          <p14:sldIdLst>
+            <p14:sldId id="264"/>
+            <p14:sldId id="265"/>
+            <p14:sldId id="266"/>
+            <p14:sldId id="267"/>
           </p14:sldIdLst>
         </p14:section>
       </p14:sectionLst>
@@ -225,7 +237,7 @@
           <a:p>
             <a:fld id="{5AA8D5F7-D765-4A57-A816-DD68B8B3B493}" type="datetimeFigureOut">
               <a:rPr lang="pl-PL" smtClean="0"/>
-              <a:t>11.05.2015</a:t>
+              <a:t>12.05.2015</a:t>
             </a:fld>
             <a:endParaRPr lang="pl-PL"/>
           </a:p>
@@ -539,7 +551,7 @@
           <a:p>
             <a:r>
               <a:rPr lang="pl-PL" dirty="0" smtClean="0"/>
-              <a:t>http://en.wikipedia.org/wiki/Programming_paradigm</a:t>
+              <a:t>Wycentrować kropki?</a:t>
             </a:r>
             <a:endParaRPr lang="pl-PL" dirty="0"/>
           </a:p>
@@ -562,7 +574,7 @@
           <a:p>
             <a:fld id="{98B85331-A752-4F9F-82CD-29A2C61C3C07}" type="slidenum">
               <a:rPr lang="pl-PL" smtClean="0"/>
-              <a:t>4</a:t>
+              <a:t>2</a:t>
             </a:fld>
             <a:endParaRPr lang="pl-PL"/>
           </a:p>
@@ -571,7 +583,7 @@
     </p:spTree>
     <p:extLst>
       <p:ext uri="{BB962C8B-B14F-4D97-AF65-F5344CB8AC3E}">
-        <p14:creationId xmlns:p14="http://schemas.microsoft.com/office/powerpoint/2010/main" val="2263235030"/>
+        <p14:creationId xmlns:p14="http://schemas.microsoft.com/office/powerpoint/2010/main" val="2447508951"/>
       </p:ext>
     </p:extLst>
   </p:cSld>
@@ -627,13 +639,7 @@
           <a:p>
             <a:r>
               <a:rPr lang="pl-PL" dirty="0" smtClean="0"/>
-              <a:t>http://en.wikipedia.org/wiki/Type_system</a:t>
-            </a:r>
-          </a:p>
-          <a:p>
-            <a:r>
-              <a:rPr lang="pl-PL" dirty="0" smtClean="0"/>
-              <a:t>http://joose-js.googlecode.com/svn/trunk/doc_images/Joose_Type_Hierarchy.png</a:t>
+              <a:t>http://en.wikipedia.org/wiki/Programming_paradigm</a:t>
             </a:r>
             <a:endParaRPr lang="pl-PL" dirty="0"/>
           </a:p>
@@ -656,7 +662,7 @@
           <a:p>
             <a:fld id="{98B85331-A752-4F9F-82CD-29A2C61C3C07}" type="slidenum">
               <a:rPr lang="pl-PL" smtClean="0"/>
-              <a:t>7</a:t>
+              <a:t>4</a:t>
             </a:fld>
             <a:endParaRPr lang="pl-PL"/>
           </a:p>
@@ -665,7 +671,7 @@
     </p:spTree>
     <p:extLst>
       <p:ext uri="{BB962C8B-B14F-4D97-AF65-F5344CB8AC3E}">
-        <p14:creationId xmlns:p14="http://schemas.microsoft.com/office/powerpoint/2010/main" val="2492704381"/>
+        <p14:creationId xmlns:p14="http://schemas.microsoft.com/office/powerpoint/2010/main" val="2263235030"/>
       </p:ext>
     </p:extLst>
   </p:cSld>
@@ -721,6 +727,100 @@
           <a:p>
             <a:r>
               <a:rPr lang="pl-PL" dirty="0" smtClean="0"/>
+              <a:t>http://en.wikipedia.org/wiki/Type_system</a:t>
+            </a:r>
+          </a:p>
+          <a:p>
+            <a:r>
+              <a:rPr lang="pl-PL" dirty="0" smtClean="0"/>
+              <a:t>http://joose-js.googlecode.com/svn/trunk/doc_images/Joose_Type_Hierarchy.png</a:t>
+            </a:r>
+            <a:endParaRPr lang="pl-PL" dirty="0"/>
+          </a:p>
+        </p:txBody>
+      </p:sp>
+      <p:sp>
+        <p:nvSpPr>
+          <p:cNvPr id="4" name="Symbol zastępczy numeru slajdu 3"/>
+          <p:cNvSpPr>
+            <a:spLocks noGrp="1"/>
+          </p:cNvSpPr>
+          <p:nvPr>
+            <p:ph type="sldNum" sz="quarter" idx="10"/>
+          </p:nvPr>
+        </p:nvSpPr>
+        <p:spPr/>
+        <p:txBody>
+          <a:bodyPr/>
+          <a:lstStyle/>
+          <a:p>
+            <a:fld id="{98B85331-A752-4F9F-82CD-29A2C61C3C07}" type="slidenum">
+              <a:rPr lang="pl-PL" smtClean="0"/>
+              <a:t>7</a:t>
+            </a:fld>
+            <a:endParaRPr lang="pl-PL"/>
+          </a:p>
+        </p:txBody>
+      </p:sp>
+    </p:spTree>
+    <p:extLst>
+      <p:ext uri="{BB962C8B-B14F-4D97-AF65-F5344CB8AC3E}">
+        <p14:creationId xmlns:p14="http://schemas.microsoft.com/office/powerpoint/2010/main" val="2492704381"/>
+      </p:ext>
+    </p:extLst>
+  </p:cSld>
+  <p:clrMapOvr>
+    <a:masterClrMapping/>
+  </p:clrMapOvr>
+</p:notes>
+</file>
+
+<file path=ppt/notesSlides/notesSlide4.xml><?xml version="1.0" encoding="utf-8"?>
+<p:notes xmlns:a="http://schemas.openxmlformats.org/drawingml/2006/main" xmlns:r="http://schemas.openxmlformats.org/officeDocument/2006/relationships" xmlns:p="http://schemas.openxmlformats.org/presentationml/2006/main">
+  <p:cSld>
+    <p:spTree>
+      <p:nvGrpSpPr>
+        <p:cNvPr id="1" name=""/>
+        <p:cNvGrpSpPr/>
+        <p:nvPr/>
+      </p:nvGrpSpPr>
+      <p:grpSpPr>
+        <a:xfrm>
+          <a:off x="0" y="0"/>
+          <a:ext cx="0" cy="0"/>
+          <a:chOff x="0" y="0"/>
+          <a:chExt cx="0" cy="0"/>
+        </a:xfrm>
+      </p:grpSpPr>
+      <p:sp>
+        <p:nvSpPr>
+          <p:cNvPr id="2" name="Symbol zastępczy obrazu slajdu 1"/>
+          <p:cNvSpPr>
+            <a:spLocks noGrp="1" noRot="1" noChangeAspect="1"/>
+          </p:cNvSpPr>
+          <p:nvPr>
+            <p:ph type="sldImg"/>
+          </p:nvPr>
+        </p:nvSpPr>
+        <p:spPr/>
+      </p:sp>
+      <p:sp>
+        <p:nvSpPr>
+          <p:cNvPr id="3" name="Symbol zastępczy notatek 2"/>
+          <p:cNvSpPr>
+            <a:spLocks noGrp="1"/>
+          </p:cNvSpPr>
+          <p:nvPr>
+            <p:ph type="body" idx="1"/>
+          </p:nvPr>
+        </p:nvSpPr>
+        <p:spPr/>
+        <p:txBody>
+          <a:bodyPr/>
+          <a:lstStyle/>
+          <a:p>
+            <a:r>
+              <a:rPr lang="pl-PL" dirty="0" smtClean="0"/>
               <a:t>http://c2.com/cgi/wiki?DuckTyping</a:t>
             </a:r>
             <a:endParaRPr lang="pl-PL" dirty="0"/>
@@ -754,6 +854,224 @@
     <p:extLst>
       <p:ext uri="{BB962C8B-B14F-4D97-AF65-F5344CB8AC3E}">
         <p14:creationId xmlns:p14="http://schemas.microsoft.com/office/powerpoint/2010/main" val="4254615756"/>
+      </p:ext>
+    </p:extLst>
+  </p:cSld>
+  <p:clrMapOvr>
+    <a:masterClrMapping/>
+  </p:clrMapOvr>
+</p:notes>
+</file>
+
+<file path=ppt/notesSlides/notesSlide5.xml><?xml version="1.0" encoding="utf-8"?>
+<p:notes xmlns:a="http://schemas.openxmlformats.org/drawingml/2006/main" xmlns:r="http://schemas.openxmlformats.org/officeDocument/2006/relationships" xmlns:p="http://schemas.openxmlformats.org/presentationml/2006/main">
+  <p:cSld>
+    <p:spTree>
+      <p:nvGrpSpPr>
+        <p:cNvPr id="1" name=""/>
+        <p:cNvGrpSpPr/>
+        <p:nvPr/>
+      </p:nvGrpSpPr>
+      <p:grpSpPr>
+        <a:xfrm>
+          <a:off x="0" y="0"/>
+          <a:ext cx="0" cy="0"/>
+          <a:chOff x="0" y="0"/>
+          <a:chExt cx="0" cy="0"/>
+        </a:xfrm>
+      </p:grpSpPr>
+      <p:sp>
+        <p:nvSpPr>
+          <p:cNvPr id="2" name="Symbol zastępczy obrazu slajdu 1"/>
+          <p:cNvSpPr>
+            <a:spLocks noGrp="1" noRot="1" noChangeAspect="1"/>
+          </p:cNvSpPr>
+          <p:nvPr>
+            <p:ph type="sldImg"/>
+          </p:nvPr>
+        </p:nvSpPr>
+        <p:spPr/>
+      </p:sp>
+      <p:sp>
+        <p:nvSpPr>
+          <p:cNvPr id="3" name="Symbol zastępczy notatek 2"/>
+          <p:cNvSpPr>
+            <a:spLocks noGrp="1"/>
+          </p:cNvSpPr>
+          <p:nvPr>
+            <p:ph type="body" idx="1"/>
+          </p:nvPr>
+        </p:nvSpPr>
+        <p:spPr/>
+        <p:txBody>
+          <a:bodyPr/>
+          <a:lstStyle/>
+          <a:p>
+            <a:r>
+              <a:rPr lang="pl-PL" dirty="0" err="1" smtClean="0"/>
+              <a:t>Discussion</a:t>
+            </a:r>
+            <a:r>
+              <a:rPr lang="pl-PL" dirty="0" smtClean="0"/>
+              <a:t>: https://</a:t>
+            </a:r>
+            <a:r>
+              <a:rPr lang="pl-PL" dirty="0" smtClean="0"/>
+              <a:t>github.com/nabijaczleweli/UniwersytetDzieci-Google-2015-prezentacja/commit/53a5ee0508f6e9c11b1e7580060d6b44f52adebd#commitcomment-11144249</a:t>
+            </a:r>
+          </a:p>
+          <a:p>
+            <a:r>
+              <a:rPr lang="pl-PL" dirty="0" smtClean="0"/>
+              <a:t>Image: http://edwuf.de/c-programming-global/</a:t>
+            </a:r>
+            <a:endParaRPr lang="pl-PL" dirty="0"/>
+          </a:p>
+        </p:txBody>
+      </p:sp>
+      <p:sp>
+        <p:nvSpPr>
+          <p:cNvPr id="4" name="Symbol zastępczy numeru slajdu 3"/>
+          <p:cNvSpPr>
+            <a:spLocks noGrp="1"/>
+          </p:cNvSpPr>
+          <p:nvPr>
+            <p:ph type="sldNum" sz="quarter" idx="10"/>
+          </p:nvPr>
+        </p:nvSpPr>
+        <p:spPr/>
+        <p:txBody>
+          <a:bodyPr/>
+          <a:lstStyle/>
+          <a:p>
+            <a:fld id="{98B85331-A752-4F9F-82CD-29A2C61C3C07}" type="slidenum">
+              <a:rPr lang="pl-PL" smtClean="0"/>
+              <a:t>9</a:t>
+            </a:fld>
+            <a:endParaRPr lang="pl-PL"/>
+          </a:p>
+        </p:txBody>
+      </p:sp>
+    </p:spTree>
+    <p:extLst>
+      <p:ext uri="{BB962C8B-B14F-4D97-AF65-F5344CB8AC3E}">
+        <p14:creationId xmlns:p14="http://schemas.microsoft.com/office/powerpoint/2010/main" val="195823191"/>
+      </p:ext>
+    </p:extLst>
+  </p:cSld>
+  <p:clrMapOvr>
+    <a:masterClrMapping/>
+  </p:clrMapOvr>
+</p:notes>
+</file>
+
+<file path=ppt/notesSlides/notesSlide6.xml><?xml version="1.0" encoding="utf-8"?>
+<p:notes xmlns:a="http://schemas.openxmlformats.org/drawingml/2006/main" xmlns:r="http://schemas.openxmlformats.org/officeDocument/2006/relationships" xmlns:p="http://schemas.openxmlformats.org/presentationml/2006/main">
+  <p:cSld>
+    <p:spTree>
+      <p:nvGrpSpPr>
+        <p:cNvPr id="1" name=""/>
+        <p:cNvGrpSpPr/>
+        <p:nvPr/>
+      </p:nvGrpSpPr>
+      <p:grpSpPr>
+        <a:xfrm>
+          <a:off x="0" y="0"/>
+          <a:ext cx="0" cy="0"/>
+          <a:chOff x="0" y="0"/>
+          <a:chExt cx="0" cy="0"/>
+        </a:xfrm>
+      </p:grpSpPr>
+      <p:sp>
+        <p:nvSpPr>
+          <p:cNvPr id="2" name="Symbol zastępczy obrazu slajdu 1"/>
+          <p:cNvSpPr>
+            <a:spLocks noGrp="1" noRot="1" noChangeAspect="1"/>
+          </p:cNvSpPr>
+          <p:nvPr>
+            <p:ph type="sldImg"/>
+          </p:nvPr>
+        </p:nvSpPr>
+        <p:spPr/>
+      </p:sp>
+      <p:sp>
+        <p:nvSpPr>
+          <p:cNvPr id="3" name="Symbol zastępczy notatek 2"/>
+          <p:cNvSpPr>
+            <a:spLocks noGrp="1"/>
+          </p:cNvSpPr>
+          <p:nvPr>
+            <p:ph type="body" idx="1"/>
+          </p:nvPr>
+        </p:nvSpPr>
+        <p:spPr/>
+        <p:txBody>
+          <a:bodyPr/>
+          <a:lstStyle/>
+          <a:p>
+            <a:r>
+              <a:rPr lang="pl-PL" dirty="0" smtClean="0"/>
+              <a:t>Second </a:t>
+            </a:r>
+            <a:r>
+              <a:rPr lang="pl-PL" dirty="0" err="1" smtClean="0"/>
+              <a:t>dot</a:t>
+            </a:r>
+            <a:r>
+              <a:rPr lang="pl-PL" dirty="0" smtClean="0"/>
+              <a:t> </a:t>
+            </a:r>
+            <a:r>
+              <a:rPr lang="pl-PL" dirty="0" err="1" smtClean="0"/>
+              <a:t>might</a:t>
+            </a:r>
+            <a:r>
+              <a:rPr lang="pl-PL" dirty="0" smtClean="0"/>
+              <a:t> </a:t>
+            </a:r>
+            <a:r>
+              <a:rPr lang="pl-PL" dirty="0" err="1" smtClean="0"/>
+              <a:t>require</a:t>
+            </a:r>
+            <a:r>
+              <a:rPr lang="pl-PL" dirty="0" smtClean="0"/>
+              <a:t> </a:t>
+            </a:r>
+            <a:r>
+              <a:rPr lang="pl-PL" dirty="0" err="1" smtClean="0"/>
+              <a:t>cleanup</a:t>
+            </a:r>
+            <a:endParaRPr lang="pl-PL" dirty="0"/>
+          </a:p>
+        </p:txBody>
+      </p:sp>
+      <p:sp>
+        <p:nvSpPr>
+          <p:cNvPr id="4" name="Symbol zastępczy numeru slajdu 3"/>
+          <p:cNvSpPr>
+            <a:spLocks noGrp="1"/>
+          </p:cNvSpPr>
+          <p:nvPr>
+            <p:ph type="sldNum" sz="quarter" idx="10"/>
+          </p:nvPr>
+        </p:nvSpPr>
+        <p:spPr/>
+        <p:txBody>
+          <a:bodyPr/>
+          <a:lstStyle/>
+          <a:p>
+            <a:fld id="{98B85331-A752-4F9F-82CD-29A2C61C3C07}" type="slidenum">
+              <a:rPr lang="pl-PL" smtClean="0"/>
+              <a:t>12</a:t>
+            </a:fld>
+            <a:endParaRPr lang="pl-PL"/>
+          </a:p>
+        </p:txBody>
+      </p:sp>
+    </p:spTree>
+    <p:extLst>
+      <p:ext uri="{BB962C8B-B14F-4D97-AF65-F5344CB8AC3E}">
+        <p14:creationId xmlns:p14="http://schemas.microsoft.com/office/powerpoint/2010/main" val="2571145372"/>
       </p:ext>
     </p:extLst>
   </p:cSld>
@@ -944,7 +1262,7 @@
           <a:p>
             <a:fld id="{34D6017F-CCF5-4515-BCFC-0E080B5EA1AB}" type="datetimeFigureOut">
               <a:rPr lang="pl-PL" smtClean="0"/>
-              <a:t>11.05.2015</a:t>
+              <a:t>12.05.2015</a:t>
             </a:fld>
             <a:endParaRPr lang="pl-PL"/>
           </a:p>
@@ -1114,7 +1432,7 @@
           <a:p>
             <a:fld id="{34D6017F-CCF5-4515-BCFC-0E080B5EA1AB}" type="datetimeFigureOut">
               <a:rPr lang="pl-PL" smtClean="0"/>
-              <a:t>11.05.2015</a:t>
+              <a:t>12.05.2015</a:t>
             </a:fld>
             <a:endParaRPr lang="pl-PL"/>
           </a:p>
@@ -1294,7 +1612,7 @@
           <a:p>
             <a:fld id="{34D6017F-CCF5-4515-BCFC-0E080B5EA1AB}" type="datetimeFigureOut">
               <a:rPr lang="pl-PL" smtClean="0"/>
-              <a:t>11.05.2015</a:t>
+              <a:t>12.05.2015</a:t>
             </a:fld>
             <a:endParaRPr lang="pl-PL"/>
           </a:p>
@@ -1464,7 +1782,7 @@
           <a:p>
             <a:fld id="{34D6017F-CCF5-4515-BCFC-0E080B5EA1AB}" type="datetimeFigureOut">
               <a:rPr lang="pl-PL" smtClean="0"/>
-              <a:t>11.05.2015</a:t>
+              <a:t>12.05.2015</a:t>
             </a:fld>
             <a:endParaRPr lang="pl-PL"/>
           </a:p>
@@ -1710,7 +2028,7 @@
           <a:p>
             <a:fld id="{34D6017F-CCF5-4515-BCFC-0E080B5EA1AB}" type="datetimeFigureOut">
               <a:rPr lang="pl-PL" smtClean="0"/>
-              <a:t>11.05.2015</a:t>
+              <a:t>12.05.2015</a:t>
             </a:fld>
             <a:endParaRPr lang="pl-PL"/>
           </a:p>
@@ -1998,7 +2316,7 @@
           <a:p>
             <a:fld id="{34D6017F-CCF5-4515-BCFC-0E080B5EA1AB}" type="datetimeFigureOut">
               <a:rPr lang="pl-PL" smtClean="0"/>
-              <a:t>11.05.2015</a:t>
+              <a:t>12.05.2015</a:t>
             </a:fld>
             <a:endParaRPr lang="pl-PL"/>
           </a:p>
@@ -2420,7 +2738,7 @@
           <a:p>
             <a:fld id="{34D6017F-CCF5-4515-BCFC-0E080B5EA1AB}" type="datetimeFigureOut">
               <a:rPr lang="pl-PL" smtClean="0"/>
-              <a:t>11.05.2015</a:t>
+              <a:t>12.05.2015</a:t>
             </a:fld>
             <a:endParaRPr lang="pl-PL"/>
           </a:p>
@@ -2538,7 +2856,7 @@
           <a:p>
             <a:fld id="{34D6017F-CCF5-4515-BCFC-0E080B5EA1AB}" type="datetimeFigureOut">
               <a:rPr lang="pl-PL" smtClean="0"/>
-              <a:t>11.05.2015</a:t>
+              <a:t>12.05.2015</a:t>
             </a:fld>
             <a:endParaRPr lang="pl-PL"/>
           </a:p>
@@ -2633,7 +2951,7 @@
           <a:p>
             <a:fld id="{34D6017F-CCF5-4515-BCFC-0E080B5EA1AB}" type="datetimeFigureOut">
               <a:rPr lang="pl-PL" smtClean="0"/>
-              <a:t>11.05.2015</a:t>
+              <a:t>12.05.2015</a:t>
             </a:fld>
             <a:endParaRPr lang="pl-PL"/>
           </a:p>
@@ -2910,7 +3228,7 @@
           <a:p>
             <a:fld id="{34D6017F-CCF5-4515-BCFC-0E080B5EA1AB}" type="datetimeFigureOut">
               <a:rPr lang="pl-PL" smtClean="0"/>
-              <a:t>11.05.2015</a:t>
+              <a:t>12.05.2015</a:t>
             </a:fld>
             <a:endParaRPr lang="pl-PL"/>
           </a:p>
@@ -3163,7 +3481,7 @@
           <a:p>
             <a:fld id="{34D6017F-CCF5-4515-BCFC-0E080B5EA1AB}" type="datetimeFigureOut">
               <a:rPr lang="pl-PL" smtClean="0"/>
-              <a:t>11.05.2015</a:t>
+              <a:t>12.05.2015</a:t>
             </a:fld>
             <a:endParaRPr lang="pl-PL"/>
           </a:p>
@@ -3379,7 +3697,7 @@
           <a:p>
             <a:fld id="{34D6017F-CCF5-4515-BCFC-0E080B5EA1AB}" type="datetimeFigureOut">
               <a:rPr lang="pl-PL" smtClean="0"/>
-              <a:t>11.05.2015</a:t>
+              <a:t>12.05.2015</a:t>
             </a:fld>
             <a:endParaRPr lang="pl-PL"/>
           </a:p>
@@ -3852,6 +4170,519 @@
 </p:sld>
 </file>
 
+<file path=ppt/slides/slide10.xml><?xml version="1.0" encoding="utf-8"?>
+<p:sld xmlns:a="http://schemas.openxmlformats.org/drawingml/2006/main" xmlns:r="http://schemas.openxmlformats.org/officeDocument/2006/relationships" xmlns:p="http://schemas.openxmlformats.org/presentationml/2006/main">
+  <p:cSld>
+    <p:spTree>
+      <p:nvGrpSpPr>
+        <p:cNvPr id="1" name=""/>
+        <p:cNvGrpSpPr/>
+        <p:nvPr/>
+      </p:nvGrpSpPr>
+      <p:grpSpPr>
+        <a:xfrm>
+          <a:off x="0" y="0"/>
+          <a:ext cx="0" cy="0"/>
+          <a:chOff x="0" y="0"/>
+          <a:chExt cx="0" cy="0"/>
+        </a:xfrm>
+      </p:grpSpPr>
+      <p:sp>
+        <p:nvSpPr>
+          <p:cNvPr id="5" name="Tytuł 4"/>
+          <p:cNvSpPr>
+            <a:spLocks noGrp="1"/>
+          </p:cNvSpPr>
+          <p:nvPr>
+            <p:ph type="title"/>
+          </p:nvPr>
+        </p:nvSpPr>
+        <p:spPr/>
+        <p:txBody>
+          <a:bodyPr/>
+          <a:lstStyle/>
+          <a:p>
+            <a:r>
+              <a:rPr lang="pl-PL" dirty="0" smtClean="0">
+                <a:solidFill>
+                  <a:srgbClr val="FFFFFF"/>
+                </a:solidFill>
+              </a:rPr>
+              <a:t>Zmienne ogólnie</a:t>
+            </a:r>
+            <a:endParaRPr lang="pl-PL" dirty="0">
+              <a:solidFill>
+                <a:srgbClr val="FFFFFF"/>
+              </a:solidFill>
+            </a:endParaRPr>
+          </a:p>
+        </p:txBody>
+      </p:sp>
+      <p:sp>
+        <p:nvSpPr>
+          <p:cNvPr id="6" name="Symbol zastępczy zawartości 5"/>
+          <p:cNvSpPr>
+            <a:spLocks noGrp="1"/>
+          </p:cNvSpPr>
+          <p:nvPr>
+            <p:ph idx="1"/>
+          </p:nvPr>
+        </p:nvSpPr>
+        <p:spPr/>
+        <p:txBody>
+          <a:bodyPr>
+            <a:normAutofit/>
+          </a:bodyPr>
+          <a:lstStyle/>
+          <a:p>
+            <a:r>
+              <a:rPr lang="pl-PL" dirty="0" smtClean="0">
+                <a:solidFill>
+                  <a:srgbClr val="FFFFFF"/>
+                </a:solidFill>
+              </a:rPr>
+              <a:t>Zmienna to nazwane miejsce w pamięci o pewnej zawartości</a:t>
+            </a:r>
+          </a:p>
+          <a:p>
+            <a:r>
+              <a:rPr lang="pl-PL" dirty="0" smtClean="0">
+                <a:solidFill>
+                  <a:srgbClr val="FFFFFF"/>
+                </a:solidFill>
+              </a:rPr>
+              <a:t>Na przykład zmienna `</a:t>
+            </a:r>
+            <a:r>
+              <a:rPr lang="pl-PL" dirty="0" err="1" smtClean="0">
+                <a:solidFill>
+                  <a:srgbClr val="FFFFFF"/>
+                </a:solidFill>
+              </a:rPr>
+              <a:t>zbigniew</a:t>
+            </a:r>
+            <a:r>
+              <a:rPr lang="pl-PL" dirty="0" smtClean="0">
+                <a:solidFill>
+                  <a:srgbClr val="FFFFFF"/>
+                </a:solidFill>
+              </a:rPr>
+              <a:t>` może mieć wartość `6969`, a zmienna `</a:t>
+            </a:r>
+            <a:r>
+              <a:rPr lang="pl-PL" dirty="0" err="1" smtClean="0">
+                <a:solidFill>
+                  <a:srgbClr val="FFFFFF"/>
+                </a:solidFill>
+              </a:rPr>
+              <a:t>henryk</a:t>
+            </a:r>
+            <a:r>
+              <a:rPr lang="pl-PL" dirty="0" smtClean="0">
+                <a:solidFill>
+                  <a:srgbClr val="FFFFFF"/>
+                </a:solidFill>
+              </a:rPr>
+              <a:t>` </a:t>
+            </a:r>
+            <a:r>
+              <a:rPr lang="pl-PL" dirty="0">
+                <a:solidFill>
+                  <a:srgbClr val="FFFFFF"/>
+                </a:solidFill>
+              </a:rPr>
+              <a:t>- "</a:t>
+            </a:r>
+            <a:r>
+              <a:rPr lang="pl-PL" dirty="0" smtClean="0">
+                <a:solidFill>
+                  <a:srgbClr val="FFFFFF"/>
+                </a:solidFill>
+              </a:rPr>
+              <a:t>masło.hpp"</a:t>
+            </a:r>
+            <a:endParaRPr lang="pl-PL" dirty="0">
+              <a:solidFill>
+                <a:srgbClr val="FFFFFF"/>
+              </a:solidFill>
+            </a:endParaRPr>
+          </a:p>
+        </p:txBody>
+      </p:sp>
+    </p:spTree>
+    <p:extLst>
+      <p:ext uri="{BB962C8B-B14F-4D97-AF65-F5344CB8AC3E}">
+        <p14:creationId xmlns:p14="http://schemas.microsoft.com/office/powerpoint/2010/main" val="2277812459"/>
+      </p:ext>
+    </p:extLst>
+  </p:cSld>
+  <p:clrMapOvr>
+    <a:masterClrMapping/>
+  </p:clrMapOvr>
+  <p:timing>
+    <p:tnLst>
+      <p:par>
+        <p:cTn id="1" dur="indefinite" restart="never" nodeType="tmRoot"/>
+      </p:par>
+    </p:tnLst>
+  </p:timing>
+</p:sld>
+</file>
+
+<file path=ppt/slides/slide11.xml><?xml version="1.0" encoding="utf-8"?>
+<p:sld xmlns:a="http://schemas.openxmlformats.org/drawingml/2006/main" xmlns:r="http://schemas.openxmlformats.org/officeDocument/2006/relationships" xmlns:p="http://schemas.openxmlformats.org/presentationml/2006/main">
+  <p:cSld>
+    <p:spTree>
+      <p:nvGrpSpPr>
+        <p:cNvPr id="1" name=""/>
+        <p:cNvGrpSpPr/>
+        <p:nvPr/>
+      </p:nvGrpSpPr>
+      <p:grpSpPr>
+        <a:xfrm>
+          <a:off x="0" y="0"/>
+          <a:ext cx="0" cy="0"/>
+          <a:chOff x="0" y="0"/>
+          <a:chExt cx="0" cy="0"/>
+        </a:xfrm>
+      </p:grpSpPr>
+      <p:sp>
+        <p:nvSpPr>
+          <p:cNvPr id="2" name="Tytuł 1"/>
+          <p:cNvSpPr>
+            <a:spLocks noGrp="1"/>
+          </p:cNvSpPr>
+          <p:nvPr>
+            <p:ph type="title"/>
+          </p:nvPr>
+        </p:nvSpPr>
+        <p:spPr/>
+        <p:txBody>
+          <a:bodyPr/>
+          <a:lstStyle/>
+          <a:p>
+            <a:r>
+              <a:rPr lang="pl-PL" dirty="0" smtClean="0">
+                <a:solidFill>
+                  <a:srgbClr val="FFFFFF"/>
+                </a:solidFill>
+              </a:rPr>
+              <a:t>Zmienne w </a:t>
+            </a:r>
+            <a:r>
+              <a:rPr lang="pl-PL" dirty="0" err="1" smtClean="0">
+                <a:solidFill>
+                  <a:srgbClr val="FFFFFF"/>
+                </a:solidFill>
+              </a:rPr>
+              <a:t>JavaSctipt’cie</a:t>
+            </a:r>
+            <a:endParaRPr lang="pl-PL" dirty="0">
+              <a:solidFill>
+                <a:srgbClr val="FFFFFF"/>
+              </a:solidFill>
+            </a:endParaRPr>
+          </a:p>
+        </p:txBody>
+      </p:sp>
+      <p:sp>
+        <p:nvSpPr>
+          <p:cNvPr id="3" name="Symbol zastępczy zawartości 2"/>
+          <p:cNvSpPr>
+            <a:spLocks noGrp="1"/>
+          </p:cNvSpPr>
+          <p:nvPr>
+            <p:ph idx="1"/>
+          </p:nvPr>
+        </p:nvSpPr>
+        <p:spPr/>
+        <p:txBody>
+          <a:bodyPr/>
+          <a:lstStyle/>
+          <a:p>
+            <a:r>
+              <a:rPr lang="pl-PL" dirty="0" smtClean="0">
+                <a:solidFill>
+                  <a:srgbClr val="FFFFFF"/>
+                </a:solidFill>
+              </a:rPr>
+              <a:t>Zmienne w </a:t>
+            </a:r>
+            <a:r>
+              <a:rPr lang="pl-PL" dirty="0" err="1" smtClean="0">
+                <a:solidFill>
+                  <a:srgbClr val="FFFFFF"/>
+                </a:solidFill>
+              </a:rPr>
+              <a:t>JS’ie</a:t>
+            </a:r>
+            <a:r>
+              <a:rPr lang="pl-PL" dirty="0" smtClean="0">
+                <a:solidFill>
+                  <a:srgbClr val="FFFFFF"/>
+                </a:solidFill>
+              </a:rPr>
+              <a:t> nie mają stałego typu, więc `</a:t>
+            </a:r>
+            <a:r>
+              <a:rPr lang="pl-PL" dirty="0" err="1" smtClean="0">
+                <a:solidFill>
+                  <a:srgbClr val="FFFFFF"/>
+                </a:solidFill>
+              </a:rPr>
+              <a:t>zbigniew</a:t>
+            </a:r>
+            <a:r>
+              <a:rPr lang="pl-PL" dirty="0" smtClean="0">
+                <a:solidFill>
+                  <a:srgbClr val="FFFFFF"/>
+                </a:solidFill>
+              </a:rPr>
+              <a:t>` może mieć wartość `6969`, a potem </a:t>
+            </a:r>
+            <a:r>
+              <a:rPr lang="pl-PL" dirty="0">
+                <a:solidFill>
+                  <a:srgbClr val="FFFFFF"/>
+                </a:solidFill>
+              </a:rPr>
+              <a:t>"masło.hpp</a:t>
+            </a:r>
+            <a:r>
+              <a:rPr lang="pl-PL" dirty="0" smtClean="0">
+                <a:solidFill>
+                  <a:srgbClr val="FFFFFF"/>
+                </a:solidFill>
+              </a:rPr>
+              <a:t>"</a:t>
+            </a:r>
+            <a:endParaRPr lang="pl-PL" dirty="0">
+              <a:solidFill>
+                <a:srgbClr val="FFFFFF"/>
+              </a:solidFill>
+            </a:endParaRPr>
+          </a:p>
+          <a:p>
+            <a:r>
+              <a:rPr lang="pl-PL" dirty="0" smtClean="0">
+                <a:solidFill>
+                  <a:srgbClr val="FFFFFF"/>
+                </a:solidFill>
+              </a:rPr>
+              <a:t>Nieprzypisane zmienne mają wartość `</a:t>
+            </a:r>
+            <a:r>
+              <a:rPr lang="pl-PL" dirty="0" err="1" smtClean="0">
+                <a:solidFill>
+                  <a:srgbClr val="FFFFFF"/>
+                </a:solidFill>
+              </a:rPr>
+              <a:t>undefined</a:t>
+            </a:r>
+            <a:r>
+              <a:rPr lang="pl-PL" dirty="0" smtClean="0">
+                <a:solidFill>
+                  <a:srgbClr val="FFFFFF"/>
+                </a:solidFill>
+              </a:rPr>
+              <a:t>`</a:t>
+            </a:r>
+            <a:r>
+              <a:rPr lang="pl-PL" sz="1400" dirty="0" smtClean="0">
+                <a:solidFill>
+                  <a:srgbClr val="FFFFFF"/>
+                </a:solidFill>
+              </a:rPr>
+              <a:t>[niezdefiniowany]</a:t>
+            </a:r>
+            <a:r>
+              <a:rPr lang="pl-PL" dirty="0">
+                <a:solidFill>
+                  <a:srgbClr val="FFFFFF"/>
+                </a:solidFill>
+              </a:rPr>
+              <a:t> </a:t>
+            </a:r>
+            <a:r>
+              <a:rPr lang="pl-PL" dirty="0" smtClean="0">
+                <a:solidFill>
+                  <a:srgbClr val="FFFFFF"/>
+                </a:solidFill>
+              </a:rPr>
+              <a:t>, i nie mają typu</a:t>
+            </a:r>
+          </a:p>
+        </p:txBody>
+      </p:sp>
+    </p:spTree>
+    <p:extLst>
+      <p:ext uri="{BB962C8B-B14F-4D97-AF65-F5344CB8AC3E}">
+        <p14:creationId xmlns:p14="http://schemas.microsoft.com/office/powerpoint/2010/main" val="2455512143"/>
+      </p:ext>
+    </p:extLst>
+  </p:cSld>
+  <p:clrMapOvr>
+    <a:masterClrMapping/>
+  </p:clrMapOvr>
+  <p:timing>
+    <p:tnLst>
+      <p:par>
+        <p:cTn id="1" dur="indefinite" restart="never" nodeType="tmRoot"/>
+      </p:par>
+    </p:tnLst>
+  </p:timing>
+</p:sld>
+</file>
+
+<file path=ppt/slides/slide12.xml><?xml version="1.0" encoding="utf-8"?>
+<p:sld xmlns:a="http://schemas.openxmlformats.org/drawingml/2006/main" xmlns:r="http://schemas.openxmlformats.org/officeDocument/2006/relationships" xmlns:p="http://schemas.openxmlformats.org/presentationml/2006/main">
+  <p:cSld>
+    <p:spTree>
+      <p:nvGrpSpPr>
+        <p:cNvPr id="1" name=""/>
+        <p:cNvGrpSpPr/>
+        <p:nvPr/>
+      </p:nvGrpSpPr>
+      <p:grpSpPr>
+        <a:xfrm>
+          <a:off x="0" y="0"/>
+          <a:ext cx="0" cy="0"/>
+          <a:chOff x="0" y="0"/>
+          <a:chExt cx="0" cy="0"/>
+        </a:xfrm>
+      </p:grpSpPr>
+      <p:sp>
+        <p:nvSpPr>
+          <p:cNvPr id="2" name="Tytuł 1"/>
+          <p:cNvSpPr>
+            <a:spLocks noGrp="1"/>
+          </p:cNvSpPr>
+          <p:nvPr>
+            <p:ph type="title"/>
+          </p:nvPr>
+        </p:nvSpPr>
+        <p:spPr/>
+        <p:txBody>
+          <a:bodyPr/>
+          <a:lstStyle/>
+          <a:p>
+            <a:r>
+              <a:rPr lang="pl-PL" dirty="0" smtClean="0">
+                <a:solidFill>
+                  <a:srgbClr val="FFFFFF"/>
+                </a:solidFill>
+              </a:rPr>
+              <a:t>Zmienne w </a:t>
+            </a:r>
+            <a:r>
+              <a:rPr lang="pl-PL" dirty="0" err="1" smtClean="0">
+                <a:solidFill>
+                  <a:srgbClr val="FFFFFF"/>
+                </a:solidFill>
+              </a:rPr>
+              <a:t>JavaScript’cie</a:t>
+            </a:r>
+            <a:endParaRPr lang="pl-PL" dirty="0">
+              <a:solidFill>
+                <a:srgbClr val="FFFFFF"/>
+              </a:solidFill>
+            </a:endParaRPr>
+          </a:p>
+        </p:txBody>
+      </p:sp>
+      <p:sp>
+        <p:nvSpPr>
+          <p:cNvPr id="3" name="Symbol zastępczy zawartości 2"/>
+          <p:cNvSpPr>
+            <a:spLocks noGrp="1"/>
+          </p:cNvSpPr>
+          <p:nvPr>
+            <p:ph idx="1"/>
+          </p:nvPr>
+        </p:nvSpPr>
+        <p:spPr/>
+        <p:txBody>
+          <a:bodyPr/>
+          <a:lstStyle/>
+          <a:p>
+            <a:r>
+              <a:rPr lang="pl-PL" dirty="0" smtClean="0">
+                <a:solidFill>
+                  <a:srgbClr val="FFFFFF"/>
+                </a:solidFill>
+              </a:rPr>
+              <a:t>Dopóki nie wykorzystuje się nieistniejących jej właściwości, nie ma znaczenia jakiego obecnie typu jest zmienna</a:t>
+            </a:r>
+          </a:p>
+          <a:p>
+            <a:r>
+              <a:rPr lang="pl-PL" dirty="0" smtClean="0">
+                <a:solidFill>
+                  <a:srgbClr val="FFFFFF"/>
+                </a:solidFill>
+              </a:rPr>
+              <a:t>Na przykład, nawet jeśli `człowiek` i `kaczka` są całkowicie innymi typami, a oba mają właściwość `</a:t>
+            </a:r>
+            <a:r>
+              <a:rPr lang="pl-PL" dirty="0" err="1" smtClean="0">
+                <a:solidFill>
+                  <a:srgbClr val="FFFFFF"/>
+                </a:solidFill>
+              </a:rPr>
+              <a:t>zbigniew</a:t>
+            </a:r>
+            <a:r>
+              <a:rPr lang="pl-PL" dirty="0" smtClean="0">
+                <a:solidFill>
+                  <a:srgbClr val="FFFFFF"/>
+                </a:solidFill>
+              </a:rPr>
+              <a:t>`, dopóki używa się tylko `</a:t>
+            </a:r>
+            <a:r>
+              <a:rPr lang="pl-PL" dirty="0" err="1" smtClean="0">
+                <a:solidFill>
+                  <a:srgbClr val="FFFFFF"/>
+                </a:solidFill>
+              </a:rPr>
+              <a:t>zbigniew`a</a:t>
+            </a:r>
+            <a:r>
+              <a:rPr lang="pl-PL" dirty="0" smtClean="0">
+                <a:solidFill>
+                  <a:srgbClr val="FFFFFF"/>
+                </a:solidFill>
+              </a:rPr>
+              <a:t>, zmienna może mieć jakikolwiek z tych typów</a:t>
+            </a:r>
+            <a:endParaRPr lang="pl-PL" dirty="0">
+              <a:solidFill>
+                <a:srgbClr val="FFFFFF"/>
+              </a:solidFill>
+            </a:endParaRPr>
+          </a:p>
+        </p:txBody>
+      </p:sp>
+    </p:spTree>
+    <p:extLst>
+      <p:ext uri="{BB962C8B-B14F-4D97-AF65-F5344CB8AC3E}">
+        <p14:creationId xmlns:p14="http://schemas.microsoft.com/office/powerpoint/2010/main" val="3559301954"/>
+      </p:ext>
+    </p:extLst>
+  </p:cSld>
+  <p:clrMapOvr>
+    <a:masterClrMapping/>
+  </p:clrMapOvr>
+  <p:timing>
+    <p:tnLst>
+      <p:par>
+        <p:cTn id="1" dur="indefinite" restart="never" nodeType="tmRoot"/>
+      </p:par>
+    </p:tnLst>
+  </p:timing>
+</p:sld>
+</file>
+
 <file path=ppt/slides/slide2.xml><?xml version="1.0" encoding="utf-8"?>
 <p:sld xmlns:a="http://schemas.openxmlformats.org/drawingml/2006/main" xmlns:r="http://schemas.openxmlformats.org/officeDocument/2006/relationships" xmlns:p="http://schemas.openxmlformats.org/presentationml/2006/main">
   <p:cSld>
@@ -4447,23 +5278,7 @@
                   <a:srgbClr val="FFFFFF"/>
                 </a:solidFill>
               </a:rPr>
-              <a:t>Skryptowy </a:t>
-            </a:r>
-            <a:r>
-              <a:rPr lang="pl-PL" dirty="0" smtClean="0">
-                <a:solidFill>
-                  <a:srgbClr val="FFFFFF"/>
-                </a:solidFill>
-              </a:rPr>
-              <a:t>– do pisania interpretowanych programów do </a:t>
-            </a:r>
-            <a:r>
-              <a:rPr lang="pl-PL" dirty="0" smtClean="0">
-                <a:solidFill>
-                  <a:srgbClr val="FFFFFF"/>
-                </a:solidFill>
-              </a:rPr>
-              <a:t>automatyzacji</a:t>
+              <a:t>Skryptowy – do pisania interpretowanych programów do automatyzacji</a:t>
             </a:r>
           </a:p>
           <a:p>
@@ -4480,21 +5295,8 @@
                   <a:srgbClr val="FFFFFF"/>
                 </a:solidFill>
               </a:rPr>
-              <a:t>Zorientowany obiektowo – oparty na koncepcie „obiektów” - struktur zawierających dane i kod (metody</a:t>
-            </a:r>
-            <a:r>
-              <a:rPr lang="pl-PL" dirty="0" smtClean="0">
-                <a:solidFill>
-                  <a:srgbClr val="FFFFFF"/>
-                </a:solidFill>
-              </a:rPr>
-              <a:t>)</a:t>
-            </a:r>
-            <a:endParaRPr lang="pl-PL" dirty="0" smtClean="0">
-              <a:solidFill>
-                <a:srgbClr val="FFFFFF"/>
-              </a:solidFill>
-            </a:endParaRPr>
+              <a:t>Zorientowany obiektowo – oparty na koncepcie „obiektów” - struktur zawierających dane i kod (metody)</a:t>
+            </a:r>
           </a:p>
         </p:txBody>
       </p:sp>
@@ -4610,23 +5412,7 @@
                   <a:srgbClr val="FFFFFF"/>
                 </a:solidFill>
               </a:rPr>
-              <a:t>Funkcyjny </a:t>
-            </a:r>
-            <a:r>
-              <a:rPr lang="pl-PL" dirty="0" smtClean="0">
-                <a:solidFill>
-                  <a:srgbClr val="FFFFFF"/>
-                </a:solidFill>
-              </a:rPr>
-              <a:t>– obliczenia traktuje jak ewaluację funkcji matematycznych i unika zmiany stanu i zmiennych </a:t>
-            </a:r>
-            <a:r>
-              <a:rPr lang="pl-PL" dirty="0" smtClean="0">
-                <a:solidFill>
-                  <a:srgbClr val="FFFFFF"/>
-                </a:solidFill>
-              </a:rPr>
-              <a:t>danych</a:t>
+              <a:t>Funkcyjny – obliczenia traktuje jak ewaluację funkcji matematycznych i unika zmiany stanu i zmiennych danych</a:t>
             </a:r>
           </a:p>
           <a:p>
@@ -4890,15 +5676,7 @@
                   <a:srgbClr val="FFFFFF"/>
                 </a:solidFill>
               </a:rPr>
-              <a:t>Dynamiczne – zmienne nie mają stałego typu, mogą go zmieniać w dowolnym </a:t>
-            </a:r>
-            <a:r>
-              <a:rPr lang="pl-PL" dirty="0" smtClean="0">
-                <a:solidFill>
-                  <a:srgbClr val="FFFFFF"/>
-                </a:solidFill>
-              </a:rPr>
-              <a:t>czasie</a:t>
+              <a:t>Dynamiczne – zmienne nie mają stałego typu, mogą go zmieniać w dowolnym czasie</a:t>
             </a:r>
           </a:p>
           <a:p>
@@ -4996,6 +5774,162 @@
     <p:extLst>
       <p:ext uri="{BB962C8B-B14F-4D97-AF65-F5344CB8AC3E}">
         <p14:creationId xmlns:p14="http://schemas.microsoft.com/office/powerpoint/2010/main" val="2492799909"/>
+      </p:ext>
+    </p:extLst>
+  </p:cSld>
+  <p:clrMapOvr>
+    <a:masterClrMapping/>
+  </p:clrMapOvr>
+  <p:timing>
+    <p:tnLst>
+      <p:par>
+        <p:cTn id="1" dur="indefinite" restart="never" nodeType="tmRoot"/>
+      </p:par>
+    </p:tnLst>
+  </p:timing>
+</p:sld>
+</file>
+
+<file path=ppt/slides/slide9.xml><?xml version="1.0" encoding="utf-8"?>
+<p:sld xmlns:a="http://schemas.openxmlformats.org/drawingml/2006/main" xmlns:r="http://schemas.openxmlformats.org/officeDocument/2006/relationships" xmlns:p="http://schemas.openxmlformats.org/presentationml/2006/main">
+  <p:cSld>
+    <p:spTree>
+      <p:nvGrpSpPr>
+        <p:cNvPr id="1" name=""/>
+        <p:cNvGrpSpPr/>
+        <p:nvPr/>
+      </p:nvGrpSpPr>
+      <p:grpSpPr>
+        <a:xfrm>
+          <a:off x="0" y="0"/>
+          <a:ext cx="0" cy="0"/>
+          <a:chOff x="0" y="0"/>
+          <a:chExt cx="0" cy="0"/>
+        </a:xfrm>
+      </p:grpSpPr>
+      <p:sp>
+        <p:nvSpPr>
+          <p:cNvPr id="4" name="Tytuł 3"/>
+          <p:cNvSpPr>
+            <a:spLocks noGrp="1"/>
+          </p:cNvSpPr>
+          <p:nvPr>
+            <p:ph type="title"/>
+          </p:nvPr>
+        </p:nvSpPr>
+        <p:spPr/>
+        <p:txBody>
+          <a:bodyPr/>
+          <a:lstStyle/>
+          <a:p>
+            <a:r>
+              <a:rPr lang="pl-PL" dirty="0">
+                <a:solidFill>
+                  <a:srgbClr val="FFFFFF"/>
+                </a:solidFill>
+              </a:rPr>
+              <a:t>Zmienne, czyli </a:t>
+            </a:r>
+            <a:r>
+              <a:rPr lang="pl-PL" dirty="0" smtClean="0">
+                <a:solidFill>
+                  <a:srgbClr val="FFFFFF"/>
+                </a:solidFill>
+              </a:rPr>
+              <a:t>gdzie ja patrzę?</a:t>
+            </a:r>
+            <a:endParaRPr lang="pl-PL" dirty="0">
+              <a:solidFill>
+                <a:srgbClr val="FFFFFF"/>
+              </a:solidFill>
+            </a:endParaRPr>
+          </a:p>
+        </p:txBody>
+      </p:sp>
+      <p:pic>
+        <p:nvPicPr>
+          <p:cNvPr id="3" name="Symbol zastępczy obrazu 2"/>
+          <p:cNvPicPr>
+            <a:picLocks noGrp="1" noChangeAspect="1"/>
+          </p:cNvPicPr>
+          <p:nvPr>
+            <p:ph type="pic" idx="1"/>
+          </p:nvPr>
+        </p:nvPicPr>
+        <p:blipFill>
+          <a:blip r:embed="rId3">
+            <a:extLst>
+              <a:ext uri="{28A0092B-C50C-407E-A947-70E740481C1C}">
+                <a14:useLocalDpi xmlns:a14="http://schemas.microsoft.com/office/drawing/2010/main" val="0"/>
+              </a:ext>
+            </a:extLst>
+          </a:blip>
+          <a:srcRect t="9903" b="9903"/>
+          <a:stretch>
+            <a:fillRect/>
+          </a:stretch>
+        </p:blipFill>
+        <p:spPr/>
+      </p:pic>
+      <p:sp>
+        <p:nvSpPr>
+          <p:cNvPr id="6" name="Symbol zastępczy tekstu 5"/>
+          <p:cNvSpPr>
+            <a:spLocks noGrp="1"/>
+          </p:cNvSpPr>
+          <p:nvPr>
+            <p:ph type="body" sz="half" idx="2"/>
+          </p:nvPr>
+        </p:nvSpPr>
+        <p:spPr/>
+        <p:txBody>
+          <a:bodyPr/>
+          <a:lstStyle/>
+          <a:p>
+            <a:r>
+              <a:rPr lang="pl-PL" dirty="0" smtClean="0">
+                <a:solidFill>
+                  <a:srgbClr val="FFFFFF"/>
+                </a:solidFill>
+              </a:rPr>
+              <a:t>Zmienna – desygnowane miejsce w </a:t>
+            </a:r>
+            <a:r>
+              <a:rPr lang="pl-PL" smtClean="0">
+                <a:solidFill>
+                  <a:srgbClr val="FFFFFF"/>
+                </a:solidFill>
+              </a:rPr>
+              <a:t>pamięci zawierające </a:t>
+            </a:r>
+            <a:r>
+              <a:rPr lang="pl-PL" i="1" smtClean="0">
+                <a:solidFill>
+                  <a:srgbClr val="FFFFFF"/>
+                </a:solidFill>
+              </a:rPr>
+              <a:t>dane</a:t>
+            </a:r>
+            <a:r>
+              <a:rPr lang="pl-PL" smtClean="0">
+                <a:solidFill>
+                  <a:srgbClr val="FFFFFF"/>
+                </a:solidFill>
+              </a:rPr>
+              <a:t>.</a:t>
+            </a:r>
+            <a:endParaRPr lang="pl-PL" dirty="0">
+              <a:solidFill>
+                <a:srgbClr val="FFFFFF"/>
+              </a:solidFill>
+            </a:endParaRPr>
+          </a:p>
+        </p:txBody>
+      </p:sp>
+    </p:spTree>
+    <p:extLst>
+      <p:ext uri="{BB962C8B-B14F-4D97-AF65-F5344CB8AC3E}">
+        <p14:creationId xmlns:p14="http://schemas.microsoft.com/office/powerpoint/2010/main" val="2993438140"/>
       </p:ext>
     </p:extLst>
   </p:cSld>

</xml_diff>

<commit_message>
Add presentation as of 18[well, 19 at 1am].5.15 , sill needs consulting with The Self-deprecating One
</commit_message>
<xml_diff>
--- a/prezentacja/JavaScript.pptx
+++ b/prezentacja/JavaScript.pptx
@@ -5,7 +5,7 @@
     <p:sldMasterId id="2147483648" r:id="rId1"/>
   </p:sldMasterIdLst>
   <p:notesMasterIdLst>
-    <p:notesMasterId r:id="rId14"/>
+    <p:notesMasterId r:id="rId17"/>
   </p:notesMasterIdLst>
   <p:sldIdLst>
     <p:sldId id="256" r:id="rId2"/>
@@ -20,6 +20,9 @@
     <p:sldId id="265" r:id="rId11"/>
     <p:sldId id="266" r:id="rId12"/>
     <p:sldId id="267" r:id="rId13"/>
+    <p:sldId id="268" r:id="rId14"/>
+    <p:sldId id="269" r:id="rId15"/>
+    <p:sldId id="270" r:id="rId16"/>
   </p:sldIdLst>
   <p:sldSz cx="9144000" cy="6858000" type="screen4x3"/>
   <p:notesSz cx="6858000" cy="9144000"/>
@@ -149,6 +152,13 @@
             <p14:sldId id="267"/>
           </p14:sldIdLst>
         </p14:section>
+        <p14:section name="Funckje" id="{5BF8345B-7685-407B-872E-DA9C3CD4C5FC}">
+          <p14:sldIdLst>
+            <p14:sldId id="268"/>
+            <p14:sldId id="269"/>
+            <p14:sldId id="270"/>
+          </p14:sldIdLst>
+        </p14:section>
       </p14:sectionLst>
     </p:ext>
   </p:extLst>
@@ -237,7 +247,7 @@
           <a:p>
             <a:fld id="{5AA8D5F7-D765-4A57-A816-DD68B8B3B493}" type="datetimeFigureOut">
               <a:rPr lang="pl-PL" smtClean="0"/>
-              <a:t>12.05.2015</a:t>
+              <a:t>18.05.2015</a:t>
             </a:fld>
             <a:endParaRPr lang="pl-PL"/>
           </a:p>
@@ -913,11 +923,7 @@
             </a:r>
             <a:r>
               <a:rPr lang="pl-PL" dirty="0" smtClean="0"/>
-              <a:t>: https://</a:t>
-            </a:r>
-            <a:r>
-              <a:rPr lang="pl-PL" dirty="0" smtClean="0"/>
-              <a:t>github.com/nabijaczleweli/UniwersytetDzieci-Google-2015-prezentacja/commit/53a5ee0508f6e9c11b1e7580060d6b44f52adebd#commitcomment-11144249</a:t>
+              <a:t>: https://github.com/nabijaczleweli/UniwersytetDzieci-Google-2015-prezentacja/commit/53a5ee0508f6e9c11b1e7580060d6b44f52adebd#commitcomment-11144249</a:t>
             </a:r>
           </a:p>
           <a:p>
@@ -1081,6 +1087,208 @@
 </p:notes>
 </file>
 
+<file path=ppt/notesSlides/notesSlide7.xml><?xml version="1.0" encoding="utf-8"?>
+<p:notes xmlns:a="http://schemas.openxmlformats.org/drawingml/2006/main" xmlns:r="http://schemas.openxmlformats.org/officeDocument/2006/relationships" xmlns:p="http://schemas.openxmlformats.org/presentationml/2006/main">
+  <p:cSld>
+    <p:spTree>
+      <p:nvGrpSpPr>
+        <p:cNvPr id="1" name=""/>
+        <p:cNvGrpSpPr/>
+        <p:nvPr/>
+      </p:nvGrpSpPr>
+      <p:grpSpPr>
+        <a:xfrm>
+          <a:off x="0" y="0"/>
+          <a:ext cx="0" cy="0"/>
+          <a:chOff x="0" y="0"/>
+          <a:chExt cx="0" cy="0"/>
+        </a:xfrm>
+      </p:grpSpPr>
+      <p:sp>
+        <p:nvSpPr>
+          <p:cNvPr id="2" name="Symbol zastępczy obrazu slajdu 1"/>
+          <p:cNvSpPr>
+            <a:spLocks noGrp="1" noRot="1" noChangeAspect="1"/>
+          </p:cNvSpPr>
+          <p:nvPr>
+            <p:ph type="sldImg"/>
+          </p:nvPr>
+        </p:nvSpPr>
+        <p:spPr/>
+      </p:sp>
+      <p:sp>
+        <p:nvSpPr>
+          <p:cNvPr id="3" name="Symbol zastępczy notatek 2"/>
+          <p:cNvSpPr>
+            <a:spLocks noGrp="1"/>
+          </p:cNvSpPr>
+          <p:nvPr>
+            <p:ph type="body" idx="1"/>
+          </p:nvPr>
+        </p:nvSpPr>
+        <p:spPr/>
+        <p:txBody>
+          <a:bodyPr/>
+          <a:lstStyle/>
+          <a:p>
+            <a:r>
+              <a:rPr lang="pl-PL" dirty="0" smtClean="0"/>
+              <a:t>Na razie http://www.secretgeek.net/image/function_v_imperative.PNG, http://www.programmingmath.com/blog/wp-content/uploads/2011/03/function-diagram.png konsyderowane przez</a:t>
+            </a:r>
+            <a:r>
+              <a:rPr lang="pl-PL" baseline="0" dirty="0" smtClean="0"/>
+              <a:t> Maję</a:t>
+            </a:r>
+            <a:endParaRPr lang="pl-PL" dirty="0" smtClean="0"/>
+          </a:p>
+          <a:p>
+            <a:r>
+              <a:rPr lang="pl-PL" dirty="0" smtClean="0"/>
+              <a:t>http://en.wikipedia.org/wiki/Subroutine</a:t>
+            </a:r>
+          </a:p>
+          <a:p>
+            <a:r>
+              <a:rPr lang="pl-PL" dirty="0" smtClean="0"/>
+              <a:t>Jednostka może być niezrozumiała, zmienić?</a:t>
+            </a:r>
+            <a:endParaRPr lang="pl-PL" dirty="0"/>
+          </a:p>
+        </p:txBody>
+      </p:sp>
+      <p:sp>
+        <p:nvSpPr>
+          <p:cNvPr id="4" name="Symbol zastępczy numeru slajdu 3"/>
+          <p:cNvSpPr>
+            <a:spLocks noGrp="1"/>
+          </p:cNvSpPr>
+          <p:nvPr>
+            <p:ph type="sldNum" sz="quarter" idx="10"/>
+          </p:nvPr>
+        </p:nvSpPr>
+        <p:spPr/>
+        <p:txBody>
+          <a:bodyPr/>
+          <a:lstStyle/>
+          <a:p>
+            <a:fld id="{98B85331-A752-4F9F-82CD-29A2C61C3C07}" type="slidenum">
+              <a:rPr lang="pl-PL" smtClean="0"/>
+              <a:t>13</a:t>
+            </a:fld>
+            <a:endParaRPr lang="pl-PL"/>
+          </a:p>
+        </p:txBody>
+      </p:sp>
+    </p:spTree>
+    <p:extLst>
+      <p:ext uri="{BB962C8B-B14F-4D97-AF65-F5344CB8AC3E}">
+        <p14:creationId xmlns:p14="http://schemas.microsoft.com/office/powerpoint/2010/main" val="2594355255"/>
+      </p:ext>
+    </p:extLst>
+  </p:cSld>
+  <p:clrMapOvr>
+    <a:masterClrMapping/>
+  </p:clrMapOvr>
+</p:notes>
+</file>
+
+<file path=ppt/notesSlides/notesSlide8.xml><?xml version="1.0" encoding="utf-8"?>
+<p:notes xmlns:a="http://schemas.openxmlformats.org/drawingml/2006/main" xmlns:r="http://schemas.openxmlformats.org/officeDocument/2006/relationships" xmlns:p="http://schemas.openxmlformats.org/presentationml/2006/main">
+  <p:cSld>
+    <p:spTree>
+      <p:nvGrpSpPr>
+        <p:cNvPr id="1" name=""/>
+        <p:cNvGrpSpPr/>
+        <p:nvPr/>
+      </p:nvGrpSpPr>
+      <p:grpSpPr>
+        <a:xfrm>
+          <a:off x="0" y="0"/>
+          <a:ext cx="0" cy="0"/>
+          <a:chOff x="0" y="0"/>
+          <a:chExt cx="0" cy="0"/>
+        </a:xfrm>
+      </p:grpSpPr>
+      <p:sp>
+        <p:nvSpPr>
+          <p:cNvPr id="2" name="Symbol zastępczy obrazu slajdu 1"/>
+          <p:cNvSpPr>
+            <a:spLocks noGrp="1" noRot="1" noChangeAspect="1"/>
+          </p:cNvSpPr>
+          <p:nvPr>
+            <p:ph type="sldImg"/>
+          </p:nvPr>
+        </p:nvSpPr>
+        <p:spPr/>
+      </p:sp>
+      <p:sp>
+        <p:nvSpPr>
+          <p:cNvPr id="3" name="Symbol zastępczy notatek 2"/>
+          <p:cNvSpPr>
+            <a:spLocks noGrp="1"/>
+          </p:cNvSpPr>
+          <p:nvPr>
+            <p:ph type="body" idx="1"/>
+          </p:nvPr>
+        </p:nvSpPr>
+        <p:spPr/>
+        <p:txBody>
+          <a:bodyPr/>
+          <a:lstStyle/>
+          <a:p>
+            <a:r>
+              <a:rPr lang="pl-PL" dirty="0" smtClean="0"/>
+              <a:t>Czy ta</a:t>
+            </a:r>
+            <a:r>
+              <a:rPr lang="pl-PL" baseline="0" dirty="0" smtClean="0"/>
+              <a:t> sekcja jest w ogóle potrzebna?</a:t>
+            </a:r>
+          </a:p>
+          <a:p>
+            <a:r>
+              <a:rPr lang="pl-PL" baseline="0" dirty="0" smtClean="0"/>
+              <a:t>Splitnąć na dwa slajdy?</a:t>
+            </a:r>
+          </a:p>
+        </p:txBody>
+      </p:sp>
+      <p:sp>
+        <p:nvSpPr>
+          <p:cNvPr id="4" name="Symbol zastępczy numeru slajdu 3"/>
+          <p:cNvSpPr>
+            <a:spLocks noGrp="1"/>
+          </p:cNvSpPr>
+          <p:nvPr>
+            <p:ph type="sldNum" sz="quarter" idx="10"/>
+          </p:nvPr>
+        </p:nvSpPr>
+        <p:spPr/>
+        <p:txBody>
+          <a:bodyPr/>
+          <a:lstStyle/>
+          <a:p>
+            <a:fld id="{98B85331-A752-4F9F-82CD-29A2C61C3C07}" type="slidenum">
+              <a:rPr lang="pl-PL" smtClean="0"/>
+              <a:t>14</a:t>
+            </a:fld>
+            <a:endParaRPr lang="pl-PL"/>
+          </a:p>
+        </p:txBody>
+      </p:sp>
+    </p:spTree>
+    <p:extLst>
+      <p:ext uri="{BB962C8B-B14F-4D97-AF65-F5344CB8AC3E}">
+        <p14:creationId xmlns:p14="http://schemas.microsoft.com/office/powerpoint/2010/main" val="3309205085"/>
+      </p:ext>
+    </p:extLst>
+  </p:cSld>
+  <p:clrMapOvr>
+    <a:masterClrMapping/>
+  </p:clrMapOvr>
+</p:notes>
+</file>
+
 <file path=ppt/slideLayouts/slideLayout1.xml><?xml version="1.0" encoding="utf-8"?>
 <p:sldLayout xmlns:a="http://schemas.openxmlformats.org/drawingml/2006/main" xmlns:r="http://schemas.openxmlformats.org/officeDocument/2006/relationships" xmlns:p="http://schemas.openxmlformats.org/presentationml/2006/main" type="title" preserve="1">
   <p:cSld name="Slajd tytułowy">
@@ -1262,7 +1470,7 @@
           <a:p>
             <a:fld id="{34D6017F-CCF5-4515-BCFC-0E080B5EA1AB}" type="datetimeFigureOut">
               <a:rPr lang="pl-PL" smtClean="0"/>
-              <a:t>12.05.2015</a:t>
+              <a:t>18.05.2015</a:t>
             </a:fld>
             <a:endParaRPr lang="pl-PL"/>
           </a:p>
@@ -1432,7 +1640,7 @@
           <a:p>
             <a:fld id="{34D6017F-CCF5-4515-BCFC-0E080B5EA1AB}" type="datetimeFigureOut">
               <a:rPr lang="pl-PL" smtClean="0"/>
-              <a:t>12.05.2015</a:t>
+              <a:t>18.05.2015</a:t>
             </a:fld>
             <a:endParaRPr lang="pl-PL"/>
           </a:p>
@@ -1612,7 +1820,7 @@
           <a:p>
             <a:fld id="{34D6017F-CCF5-4515-BCFC-0E080B5EA1AB}" type="datetimeFigureOut">
               <a:rPr lang="pl-PL" smtClean="0"/>
-              <a:t>12.05.2015</a:t>
+              <a:t>18.05.2015</a:t>
             </a:fld>
             <a:endParaRPr lang="pl-PL"/>
           </a:p>
@@ -1782,7 +1990,7 @@
           <a:p>
             <a:fld id="{34D6017F-CCF5-4515-BCFC-0E080B5EA1AB}" type="datetimeFigureOut">
               <a:rPr lang="pl-PL" smtClean="0"/>
-              <a:t>12.05.2015</a:t>
+              <a:t>18.05.2015</a:t>
             </a:fld>
             <a:endParaRPr lang="pl-PL"/>
           </a:p>
@@ -2028,7 +2236,7 @@
           <a:p>
             <a:fld id="{34D6017F-CCF5-4515-BCFC-0E080B5EA1AB}" type="datetimeFigureOut">
               <a:rPr lang="pl-PL" smtClean="0"/>
-              <a:t>12.05.2015</a:t>
+              <a:t>18.05.2015</a:t>
             </a:fld>
             <a:endParaRPr lang="pl-PL"/>
           </a:p>
@@ -2316,7 +2524,7 @@
           <a:p>
             <a:fld id="{34D6017F-CCF5-4515-BCFC-0E080B5EA1AB}" type="datetimeFigureOut">
               <a:rPr lang="pl-PL" smtClean="0"/>
-              <a:t>12.05.2015</a:t>
+              <a:t>18.05.2015</a:t>
             </a:fld>
             <a:endParaRPr lang="pl-PL"/>
           </a:p>
@@ -2738,7 +2946,7 @@
           <a:p>
             <a:fld id="{34D6017F-CCF5-4515-BCFC-0E080B5EA1AB}" type="datetimeFigureOut">
               <a:rPr lang="pl-PL" smtClean="0"/>
-              <a:t>12.05.2015</a:t>
+              <a:t>18.05.2015</a:t>
             </a:fld>
             <a:endParaRPr lang="pl-PL"/>
           </a:p>
@@ -2856,7 +3064,7 @@
           <a:p>
             <a:fld id="{34D6017F-CCF5-4515-BCFC-0E080B5EA1AB}" type="datetimeFigureOut">
               <a:rPr lang="pl-PL" smtClean="0"/>
-              <a:t>12.05.2015</a:t>
+              <a:t>18.05.2015</a:t>
             </a:fld>
             <a:endParaRPr lang="pl-PL"/>
           </a:p>
@@ -2951,7 +3159,7 @@
           <a:p>
             <a:fld id="{34D6017F-CCF5-4515-BCFC-0E080B5EA1AB}" type="datetimeFigureOut">
               <a:rPr lang="pl-PL" smtClean="0"/>
-              <a:t>12.05.2015</a:t>
+              <a:t>18.05.2015</a:t>
             </a:fld>
             <a:endParaRPr lang="pl-PL"/>
           </a:p>
@@ -3228,7 +3436,7 @@
           <a:p>
             <a:fld id="{34D6017F-CCF5-4515-BCFC-0E080B5EA1AB}" type="datetimeFigureOut">
               <a:rPr lang="pl-PL" smtClean="0"/>
-              <a:t>12.05.2015</a:t>
+              <a:t>18.05.2015</a:t>
             </a:fld>
             <a:endParaRPr lang="pl-PL"/>
           </a:p>
@@ -3481,7 +3689,7 @@
           <a:p>
             <a:fld id="{34D6017F-CCF5-4515-BCFC-0E080B5EA1AB}" type="datetimeFigureOut">
               <a:rPr lang="pl-PL" smtClean="0"/>
-              <a:t>12.05.2015</a:t>
+              <a:t>18.05.2015</a:t>
             </a:fld>
             <a:endParaRPr lang="pl-PL"/>
           </a:p>
@@ -3697,7 +3905,7 @@
           <a:p>
             <a:fld id="{34D6017F-CCF5-4515-BCFC-0E080B5EA1AB}" type="datetimeFigureOut">
               <a:rPr lang="pl-PL" smtClean="0"/>
-              <a:t>12.05.2015</a:t>
+              <a:t>18.05.2015</a:t>
             </a:fld>
             <a:endParaRPr lang="pl-PL"/>
           </a:p>
@@ -4251,23 +4459,7 @@
                   <a:srgbClr val="FFFFFF"/>
                 </a:solidFill>
               </a:rPr>
-              <a:t>Na przykład zmienna `</a:t>
-            </a:r>
-            <a:r>
-              <a:rPr lang="pl-PL" dirty="0" err="1" smtClean="0">
-                <a:solidFill>
-                  <a:srgbClr val="FFFFFF"/>
-                </a:solidFill>
-              </a:rPr>
-              <a:t>zbigniew</a:t>
-            </a:r>
-            <a:r>
-              <a:rPr lang="pl-PL" dirty="0" smtClean="0">
-                <a:solidFill>
-                  <a:srgbClr val="FFFFFF"/>
-                </a:solidFill>
-              </a:rPr>
-              <a:t>` może mieć wartość `6969`, a zmienna `</a:t>
+              <a:t>Na przykład zmienna `zbigniew` może mieć wartość `6969`, a zmienna `</a:t>
             </a:r>
             <a:r>
               <a:rPr lang="pl-PL" dirty="0" err="1" smtClean="0">
@@ -4422,23 +4614,7 @@
                   <a:srgbClr val="FFFFFF"/>
                 </a:solidFill>
               </a:rPr>
-              <a:t> nie mają stałego typu, więc `</a:t>
-            </a:r>
-            <a:r>
-              <a:rPr lang="pl-PL" dirty="0" err="1" smtClean="0">
-                <a:solidFill>
-                  <a:srgbClr val="FFFFFF"/>
-                </a:solidFill>
-              </a:rPr>
-              <a:t>zbigniew</a:t>
-            </a:r>
-            <a:r>
-              <a:rPr lang="pl-PL" dirty="0" smtClean="0">
-                <a:solidFill>
-                  <a:srgbClr val="FFFFFF"/>
-                </a:solidFill>
-              </a:rPr>
-              <a:t>` może mieć wartość `6969`, a potem </a:t>
+              <a:t> nie mają stałego typu, więc `zbigniew` może mieć wartość `6969`, a potem </a:t>
             </a:r>
             <a:r>
               <a:rPr lang="pl-PL" dirty="0">
@@ -4621,23 +4797,7 @@
                   <a:srgbClr val="FFFFFF"/>
                 </a:solidFill>
               </a:rPr>
-              <a:t>Na przykład, nawet jeśli `człowiek` i `kaczka` są całkowicie innymi typami, a oba mają właściwość `</a:t>
-            </a:r>
-            <a:r>
-              <a:rPr lang="pl-PL" dirty="0" err="1" smtClean="0">
-                <a:solidFill>
-                  <a:srgbClr val="FFFFFF"/>
-                </a:solidFill>
-              </a:rPr>
-              <a:t>zbigniew</a:t>
-            </a:r>
-            <a:r>
-              <a:rPr lang="pl-PL" dirty="0" smtClean="0">
-                <a:solidFill>
-                  <a:srgbClr val="FFFFFF"/>
-                </a:solidFill>
-              </a:rPr>
-              <a:t>`, dopóki używa się tylko `</a:t>
+              <a:t>Na przykład, nawet jeśli `człowiek` i `kaczka` są całkowicie innymi typami, a oba mają właściwość `zbigniew`, dopóki używa się tylko `</a:t>
             </a:r>
             <a:r>
               <a:rPr lang="pl-PL" dirty="0" err="1" smtClean="0">
@@ -4667,6 +4827,494 @@
     <p:extLst>
       <p:ext uri="{BB962C8B-B14F-4D97-AF65-F5344CB8AC3E}">
         <p14:creationId xmlns:p14="http://schemas.microsoft.com/office/powerpoint/2010/main" val="3559301954"/>
+      </p:ext>
+    </p:extLst>
+  </p:cSld>
+  <p:clrMapOvr>
+    <a:masterClrMapping/>
+  </p:clrMapOvr>
+  <p:timing>
+    <p:tnLst>
+      <p:par>
+        <p:cTn id="1" dur="indefinite" restart="never" nodeType="tmRoot"/>
+      </p:par>
+    </p:tnLst>
+  </p:timing>
+</p:sld>
+</file>
+
+<file path=ppt/slides/slide13.xml><?xml version="1.0" encoding="utf-8"?>
+<p:sld xmlns:a="http://schemas.openxmlformats.org/drawingml/2006/main" xmlns:r="http://schemas.openxmlformats.org/officeDocument/2006/relationships" xmlns:p="http://schemas.openxmlformats.org/presentationml/2006/main">
+  <p:cSld>
+    <p:spTree>
+      <p:nvGrpSpPr>
+        <p:cNvPr id="1" name=""/>
+        <p:cNvGrpSpPr/>
+        <p:nvPr/>
+      </p:nvGrpSpPr>
+      <p:grpSpPr>
+        <a:xfrm>
+          <a:off x="0" y="0"/>
+          <a:ext cx="0" cy="0"/>
+          <a:chOff x="0" y="0"/>
+          <a:chExt cx="0" cy="0"/>
+        </a:xfrm>
+      </p:grpSpPr>
+      <p:sp>
+        <p:nvSpPr>
+          <p:cNvPr id="4" name="Tytuł 3"/>
+          <p:cNvSpPr>
+            <a:spLocks noGrp="1"/>
+          </p:cNvSpPr>
+          <p:nvPr>
+            <p:ph type="title"/>
+          </p:nvPr>
+        </p:nvSpPr>
+        <p:spPr/>
+        <p:txBody>
+          <a:bodyPr/>
+          <a:lstStyle/>
+          <a:p>
+            <a:r>
+              <a:rPr lang="pl-PL" dirty="0" smtClean="0">
+                <a:solidFill>
+                  <a:srgbClr val="FFFFFF"/>
+                </a:solidFill>
+              </a:rPr>
+              <a:t>Funkcje, czyli czemu ja to znowu piszę?</a:t>
+            </a:r>
+            <a:endParaRPr lang="pl-PL" dirty="0">
+              <a:solidFill>
+                <a:srgbClr val="FFFFFF"/>
+              </a:solidFill>
+            </a:endParaRPr>
+          </a:p>
+        </p:txBody>
+      </p:sp>
+      <p:pic>
+        <p:nvPicPr>
+          <p:cNvPr id="7" name="Symbol zastępczy obrazu 6"/>
+          <p:cNvPicPr>
+            <a:picLocks noGrp="1" noChangeAspect="1"/>
+          </p:cNvPicPr>
+          <p:nvPr>
+            <p:ph type="pic" idx="1"/>
+          </p:nvPr>
+        </p:nvPicPr>
+        <p:blipFill rotWithShape="1">
+          <a:blip r:embed="rId3">
+            <a:extLst>
+              <a:ext uri="{28A0092B-C50C-407E-A947-70E740481C1C}">
+                <a14:useLocalDpi xmlns:a14="http://schemas.microsoft.com/office/drawing/2010/main" val="0"/>
+              </a:ext>
+            </a:extLst>
+          </a:blip>
+          <a:srcRect l="-10222" r="-10222"/>
+          <a:stretch/>
+        </p:blipFill>
+        <p:spPr/>
+      </p:pic>
+      <p:sp>
+        <p:nvSpPr>
+          <p:cNvPr id="6" name="Symbol zastępczy tekstu 5"/>
+          <p:cNvSpPr>
+            <a:spLocks noGrp="1"/>
+          </p:cNvSpPr>
+          <p:nvPr>
+            <p:ph type="body" sz="half" idx="2"/>
+          </p:nvPr>
+        </p:nvSpPr>
+        <p:spPr/>
+        <p:txBody>
+          <a:bodyPr/>
+          <a:lstStyle/>
+          <a:p>
+            <a:r>
+              <a:rPr lang="pl-PL" dirty="0" smtClean="0">
+                <a:solidFill>
+                  <a:srgbClr val="FFFFFF"/>
+                </a:solidFill>
+              </a:rPr>
+              <a:t>Funkcja (</a:t>
+            </a:r>
+            <a:r>
+              <a:rPr lang="pl-PL" dirty="0" err="1" smtClean="0">
+                <a:solidFill>
+                  <a:srgbClr val="FFFFFF"/>
+                </a:solidFill>
+              </a:rPr>
+              <a:t>subrutyna</a:t>
+            </a:r>
+            <a:r>
+              <a:rPr lang="pl-PL" dirty="0" smtClean="0">
+                <a:solidFill>
+                  <a:srgbClr val="FFFFFF"/>
+                </a:solidFill>
+              </a:rPr>
+              <a:t>) – sekwencja instrukcji programowych wykonujących specyficzne zadanie, spakowane do jednostki.</a:t>
+            </a:r>
+            <a:endParaRPr lang="pl-PL" dirty="0">
+              <a:solidFill>
+                <a:srgbClr val="FFFFFF"/>
+              </a:solidFill>
+            </a:endParaRPr>
+          </a:p>
+        </p:txBody>
+      </p:sp>
+    </p:spTree>
+    <p:extLst>
+      <p:ext uri="{BB962C8B-B14F-4D97-AF65-F5344CB8AC3E}">
+        <p14:creationId xmlns:p14="http://schemas.microsoft.com/office/powerpoint/2010/main" val="76196137"/>
+      </p:ext>
+    </p:extLst>
+  </p:cSld>
+  <p:clrMapOvr>
+    <a:masterClrMapping/>
+  </p:clrMapOvr>
+  <p:timing>
+    <p:tnLst>
+      <p:par>
+        <p:cTn id="1" dur="indefinite" restart="never" nodeType="tmRoot"/>
+      </p:par>
+    </p:tnLst>
+  </p:timing>
+</p:sld>
+</file>
+
+<file path=ppt/slides/slide14.xml><?xml version="1.0" encoding="utf-8"?>
+<p:sld xmlns:a="http://schemas.openxmlformats.org/drawingml/2006/main" xmlns:r="http://schemas.openxmlformats.org/officeDocument/2006/relationships" xmlns:p="http://schemas.openxmlformats.org/presentationml/2006/main">
+  <p:cSld>
+    <p:spTree>
+      <p:nvGrpSpPr>
+        <p:cNvPr id="1" name=""/>
+        <p:cNvGrpSpPr/>
+        <p:nvPr/>
+      </p:nvGrpSpPr>
+      <p:grpSpPr>
+        <a:xfrm>
+          <a:off x="0" y="0"/>
+          <a:ext cx="0" cy="0"/>
+          <a:chOff x="0" y="0"/>
+          <a:chExt cx="0" cy="0"/>
+        </a:xfrm>
+      </p:grpSpPr>
+      <p:sp>
+        <p:nvSpPr>
+          <p:cNvPr id="5" name="Tytuł 4"/>
+          <p:cNvSpPr>
+            <a:spLocks noGrp="1"/>
+          </p:cNvSpPr>
+          <p:nvPr>
+            <p:ph type="title"/>
+          </p:nvPr>
+        </p:nvSpPr>
+        <p:spPr/>
+        <p:txBody>
+          <a:bodyPr/>
+          <a:lstStyle/>
+          <a:p>
+            <a:r>
+              <a:rPr lang="pl-PL" dirty="0" smtClean="0">
+                <a:solidFill>
+                  <a:srgbClr val="FFFFFF"/>
+                </a:solidFill>
+              </a:rPr>
+              <a:t>Funkcje ogólnie</a:t>
+            </a:r>
+            <a:endParaRPr lang="pl-PL" dirty="0">
+              <a:solidFill>
+                <a:srgbClr val="FFFFFF"/>
+              </a:solidFill>
+            </a:endParaRPr>
+          </a:p>
+        </p:txBody>
+      </p:sp>
+      <p:sp>
+        <p:nvSpPr>
+          <p:cNvPr id="6" name="Symbol zastępczy zawartości 5"/>
+          <p:cNvSpPr>
+            <a:spLocks noGrp="1"/>
+          </p:cNvSpPr>
+          <p:nvPr>
+            <p:ph idx="1"/>
+          </p:nvPr>
+        </p:nvSpPr>
+        <p:spPr/>
+        <p:txBody>
+          <a:bodyPr/>
+          <a:lstStyle/>
+          <a:p>
+            <a:r>
+              <a:rPr lang="pl-PL" dirty="0" smtClean="0">
+                <a:solidFill>
+                  <a:srgbClr val="FFFFFF"/>
+                </a:solidFill>
+              </a:rPr>
+              <a:t>Funkcja to zgrupowana ponownie używalna sekwencja poleceń</a:t>
+            </a:r>
+          </a:p>
+          <a:p>
+            <a:r>
+              <a:rPr lang="pl-PL" dirty="0" smtClean="0">
+                <a:solidFill>
+                  <a:srgbClr val="FFFFFF"/>
+                </a:solidFill>
+              </a:rPr>
+              <a:t>Tak jak w matematyce, funkcje wywołuje się nawiasami okrągłymi '(' i ')‚</a:t>
+            </a:r>
+          </a:p>
+          <a:p>
+            <a:r>
+              <a:rPr lang="pl-PL" dirty="0" smtClean="0">
+                <a:solidFill>
+                  <a:srgbClr val="FFFFFF"/>
+                </a:solidFill>
+              </a:rPr>
+              <a:t>Na przykład funkcja `zbigniew` może zawierać w sobie (zastępować) polecenia: zamknij rękę, wyprostuj palec, podejdź do Łucji, żgnij Łucję</a:t>
+            </a:r>
+            <a:endParaRPr lang="pl-PL" dirty="0">
+              <a:solidFill>
+                <a:srgbClr val="FFFFFF"/>
+              </a:solidFill>
+            </a:endParaRPr>
+          </a:p>
+        </p:txBody>
+      </p:sp>
+    </p:spTree>
+    <p:extLst>
+      <p:ext uri="{BB962C8B-B14F-4D97-AF65-F5344CB8AC3E}">
+        <p14:creationId xmlns:p14="http://schemas.microsoft.com/office/powerpoint/2010/main" val="1995865"/>
+      </p:ext>
+    </p:extLst>
+  </p:cSld>
+  <p:clrMapOvr>
+    <a:masterClrMapping/>
+  </p:clrMapOvr>
+  <p:timing>
+    <p:tnLst>
+      <p:par>
+        <p:cTn id="1" dur="indefinite" restart="never" nodeType="tmRoot"/>
+      </p:par>
+    </p:tnLst>
+  </p:timing>
+</p:sld>
+</file>
+
+<file path=ppt/slides/slide15.xml><?xml version="1.0" encoding="utf-8"?>
+<p:sld xmlns:a="http://schemas.openxmlformats.org/drawingml/2006/main" xmlns:r="http://schemas.openxmlformats.org/officeDocument/2006/relationships" xmlns:p="http://schemas.openxmlformats.org/presentationml/2006/main">
+  <p:cSld>
+    <p:spTree>
+      <p:nvGrpSpPr>
+        <p:cNvPr id="1" name=""/>
+        <p:cNvGrpSpPr/>
+        <p:nvPr/>
+      </p:nvGrpSpPr>
+      <p:grpSpPr>
+        <a:xfrm>
+          <a:off x="0" y="0"/>
+          <a:ext cx="0" cy="0"/>
+          <a:chOff x="0" y="0"/>
+          <a:chExt cx="0" cy="0"/>
+        </a:xfrm>
+      </p:grpSpPr>
+      <p:sp>
+        <p:nvSpPr>
+          <p:cNvPr id="2" name="Tytuł 1"/>
+          <p:cNvSpPr>
+            <a:spLocks noGrp="1"/>
+          </p:cNvSpPr>
+          <p:nvPr>
+            <p:ph type="title"/>
+          </p:nvPr>
+        </p:nvSpPr>
+        <p:spPr/>
+        <p:txBody>
+          <a:bodyPr/>
+          <a:lstStyle/>
+          <a:p>
+            <a:r>
+              <a:rPr lang="pl-PL" dirty="0" smtClean="0">
+                <a:solidFill>
+                  <a:srgbClr val="FFFFFF"/>
+                </a:solidFill>
+              </a:rPr>
+              <a:t>Funkcje w </a:t>
+            </a:r>
+            <a:r>
+              <a:rPr lang="pl-PL" dirty="0" err="1" smtClean="0">
+                <a:solidFill>
+                  <a:srgbClr val="FFFFFF"/>
+                </a:solidFill>
+              </a:rPr>
+              <a:t>JavaScript’cie</a:t>
+            </a:r>
+            <a:endParaRPr lang="pl-PL" dirty="0">
+              <a:solidFill>
+                <a:srgbClr val="FFFFFF"/>
+              </a:solidFill>
+            </a:endParaRPr>
+          </a:p>
+        </p:txBody>
+      </p:sp>
+      <p:sp>
+        <p:nvSpPr>
+          <p:cNvPr id="3" name="Symbol zastępczy zawartości 2"/>
+          <p:cNvSpPr>
+            <a:spLocks noGrp="1"/>
+          </p:cNvSpPr>
+          <p:nvPr>
+            <p:ph idx="1"/>
+          </p:nvPr>
+        </p:nvSpPr>
+        <p:spPr/>
+        <p:txBody>
+          <a:bodyPr/>
+          <a:lstStyle/>
+          <a:p>
+            <a:r>
+              <a:rPr lang="pl-PL" dirty="0" smtClean="0">
+                <a:solidFill>
+                  <a:srgbClr val="FFFFFF"/>
+                </a:solidFill>
+              </a:rPr>
+              <a:t>Funkcje w </a:t>
+            </a:r>
+            <a:r>
+              <a:rPr lang="pl-PL" dirty="0" err="1" smtClean="0">
+                <a:solidFill>
+                  <a:srgbClr val="FFFFFF"/>
+                </a:solidFill>
+              </a:rPr>
+              <a:t>JS’ie</a:t>
+            </a:r>
+            <a:r>
+              <a:rPr lang="pl-PL" dirty="0">
+                <a:solidFill>
+                  <a:srgbClr val="FFFFFF"/>
+                </a:solidFill>
+              </a:rPr>
+              <a:t> </a:t>
+            </a:r>
+            <a:r>
+              <a:rPr lang="pl-PL" dirty="0" smtClean="0">
+                <a:solidFill>
+                  <a:srgbClr val="FFFFFF"/>
+                </a:solidFill>
+              </a:rPr>
+              <a:t>mogą</a:t>
+            </a:r>
+            <a:r>
+              <a:rPr lang="pl-PL" dirty="0">
+                <a:solidFill>
+                  <a:srgbClr val="FFFFFF"/>
+                </a:solidFill>
+              </a:rPr>
+              <a:t> , lecz nie muszą</a:t>
+            </a:r>
+            <a:r>
+              <a:rPr lang="pl-PL" dirty="0" smtClean="0">
+                <a:solidFill>
+                  <a:srgbClr val="FFFFFF"/>
+                </a:solidFill>
+              </a:rPr>
+              <a:t> brać argumentów, np. `żgnij(kogo)`</a:t>
+            </a:r>
+          </a:p>
+          <a:p>
+            <a:r>
+              <a:rPr lang="pl-PL" dirty="0" smtClean="0">
+                <a:solidFill>
+                  <a:srgbClr val="FFFFFF"/>
+                </a:solidFill>
+              </a:rPr>
+              <a:t>Funkcje w </a:t>
+            </a:r>
+            <a:r>
+              <a:rPr lang="pl-PL" dirty="0" err="1" smtClean="0">
+                <a:solidFill>
+                  <a:srgbClr val="FFFFFF"/>
+                </a:solidFill>
+              </a:rPr>
+              <a:t>JS’ie</a:t>
+            </a:r>
+            <a:r>
+              <a:rPr lang="pl-PL" dirty="0" smtClean="0">
+                <a:solidFill>
+                  <a:srgbClr val="FFFFFF"/>
+                </a:solidFill>
+              </a:rPr>
+              <a:t> mogą, lecz nie muszą zwracać wartości, tak jak np. `sin(x)`</a:t>
+            </a:r>
+          </a:p>
+          <a:p>
+            <a:r>
+              <a:rPr lang="pl-PL" dirty="0" smtClean="0">
+                <a:solidFill>
+                  <a:srgbClr val="FFFFFF"/>
+                </a:solidFill>
+              </a:rPr>
+              <a:t>Funkcje mogą być przypisywane do zmiennych, np `</a:t>
+            </a:r>
+            <a:r>
+              <a:rPr lang="pl-PL" dirty="0" err="1" smtClean="0">
+                <a:solidFill>
+                  <a:srgbClr val="FFFFFF"/>
+                </a:solidFill>
+              </a:rPr>
+              <a:t>var</a:t>
+            </a:r>
+            <a:r>
+              <a:rPr lang="pl-PL" dirty="0" smtClean="0">
+                <a:solidFill>
+                  <a:srgbClr val="FFFFFF"/>
+                </a:solidFill>
+              </a:rPr>
+              <a:t> </a:t>
+            </a:r>
+            <a:r>
+              <a:rPr lang="pl-PL" dirty="0" err="1" smtClean="0">
+                <a:solidFill>
+                  <a:srgbClr val="FFFFFF"/>
+                </a:solidFill>
+              </a:rPr>
+              <a:t>zbigniew</a:t>
+            </a:r>
+            <a:r>
+              <a:rPr lang="pl-PL" dirty="0" smtClean="0">
+                <a:solidFill>
+                  <a:srgbClr val="FFFFFF"/>
+                </a:solidFill>
+              </a:rPr>
+              <a:t> = </a:t>
+            </a:r>
+            <a:r>
+              <a:rPr lang="pl-PL" dirty="0" err="1" smtClean="0">
+                <a:solidFill>
+                  <a:srgbClr val="FFFFFF"/>
+                </a:solidFill>
+              </a:rPr>
+              <a:t>niedorzecznie_długa_nazwa_funkcji</a:t>
+            </a:r>
+            <a:r>
+              <a:rPr lang="pl-PL" dirty="0" smtClean="0">
+                <a:solidFill>
+                  <a:srgbClr val="FFFFFF"/>
+                </a:solidFill>
+              </a:rPr>
+              <a:t>`</a:t>
+            </a:r>
+            <a:endParaRPr lang="pl-PL" dirty="0">
+              <a:solidFill>
+                <a:srgbClr val="FFFFFF"/>
+              </a:solidFill>
+            </a:endParaRPr>
+          </a:p>
+        </p:txBody>
+      </p:sp>
+    </p:spTree>
+    <p:extLst>
+      <p:ext uri="{BB962C8B-B14F-4D97-AF65-F5344CB8AC3E}">
+        <p14:creationId xmlns:p14="http://schemas.microsoft.com/office/powerpoint/2010/main" val="3795016863"/>
       </p:ext>
     </p:extLst>
   </p:cSld>

</xml_diff>

<commit_message>
Add pretty much everything, except showdown for <input>
</commit_message>
<xml_diff>
--- a/prezentacja/JavaScript.pptx
+++ b/prezentacja/JavaScript.pptx
@@ -5,7 +5,7 @@
     <p:sldMasterId id="2147483648" r:id="rId1"/>
   </p:sldMasterIdLst>
   <p:notesMasterIdLst>
-    <p:notesMasterId r:id="rId17"/>
+    <p:notesMasterId r:id="rId23"/>
   </p:notesMasterIdLst>
   <p:sldIdLst>
     <p:sldId id="256" r:id="rId2"/>
@@ -23,6 +23,12 @@
     <p:sldId id="268" r:id="rId14"/>
     <p:sldId id="269" r:id="rId15"/>
     <p:sldId id="270" r:id="rId16"/>
+    <p:sldId id="271" r:id="rId17"/>
+    <p:sldId id="272" r:id="rId18"/>
+    <p:sldId id="273" r:id="rId19"/>
+    <p:sldId id="274" r:id="rId20"/>
+    <p:sldId id="275" r:id="rId21"/>
+    <p:sldId id="276" r:id="rId22"/>
   </p:sldIdLst>
   <p:sldSz cx="9144000" cy="6858000" type="screen4x3"/>
   <p:notesSz cx="6858000" cy="9144000"/>
@@ -152,11 +158,25 @@
             <p14:sldId id="267"/>
           </p14:sldIdLst>
         </p14:section>
-        <p14:section name="Funckje" id="{5BF8345B-7685-407B-872E-DA9C3CD4C5FC}">
+        <p14:section name="Funkcje" id="{5BF8345B-7685-407B-872E-DA9C3CD4C5FC}">
           <p14:sldIdLst>
             <p14:sldId id="268"/>
             <p14:sldId id="269"/>
             <p14:sldId id="270"/>
+          </p14:sldIdLst>
+        </p14:section>
+        <p14:section name="Zdarzenia" id="{E136D6F5-4BA6-4937-ADC7-A0D60274B047}">
+          <p14:sldIdLst>
+            <p14:sldId id="271"/>
+            <p14:sldId id="272"/>
+            <p14:sldId id="273"/>
+          </p14:sldIdLst>
+        </p14:section>
+        <p14:section name="Różne dziwne rzeczy" id="{0A881CBD-2E0F-46FA-827F-3FAA1D9E0A59}">
+          <p14:sldIdLst>
+            <p14:sldId id="274"/>
+            <p14:sldId id="275"/>
+            <p14:sldId id="276"/>
           </p14:sldIdLst>
         </p14:section>
       </p14:sectionLst>
@@ -247,7 +267,7 @@
           <a:p>
             <a:fld id="{5AA8D5F7-D765-4A57-A816-DD68B8B3B493}" type="datetimeFigureOut">
               <a:rPr lang="pl-PL" smtClean="0"/>
-              <a:t>18.05.2015</a:t>
+              <a:t>19.05.2015</a:t>
             </a:fld>
             <a:endParaRPr lang="pl-PL"/>
           </a:p>
@@ -603,6 +623,98 @@
 </p:notes>
 </file>
 
+<file path=ppt/notesSlides/notesSlide10.xml><?xml version="1.0" encoding="utf-8"?>
+<p:notes xmlns:a="http://schemas.openxmlformats.org/drawingml/2006/main" xmlns:r="http://schemas.openxmlformats.org/officeDocument/2006/relationships" xmlns:p="http://schemas.openxmlformats.org/presentationml/2006/main">
+  <p:cSld>
+    <p:spTree>
+      <p:nvGrpSpPr>
+        <p:cNvPr id="1" name=""/>
+        <p:cNvGrpSpPr/>
+        <p:nvPr/>
+      </p:nvGrpSpPr>
+      <p:grpSpPr>
+        <a:xfrm>
+          <a:off x="0" y="0"/>
+          <a:ext cx="0" cy="0"/>
+          <a:chOff x="0" y="0"/>
+          <a:chExt cx="0" cy="0"/>
+        </a:xfrm>
+      </p:grpSpPr>
+      <p:sp>
+        <p:nvSpPr>
+          <p:cNvPr id="2" name="Symbol zastępczy obrazu slajdu 1"/>
+          <p:cNvSpPr>
+            <a:spLocks noGrp="1" noRot="1" noChangeAspect="1"/>
+          </p:cNvSpPr>
+          <p:nvPr>
+            <p:ph type="sldImg"/>
+          </p:nvPr>
+        </p:nvSpPr>
+        <p:spPr/>
+      </p:sp>
+      <p:sp>
+        <p:nvSpPr>
+          <p:cNvPr id="3" name="Symbol zastępczy notatek 2"/>
+          <p:cNvSpPr>
+            <a:spLocks noGrp="1"/>
+          </p:cNvSpPr>
+          <p:nvPr>
+            <p:ph type="body" idx="1"/>
+          </p:nvPr>
+        </p:nvSpPr>
+        <p:spPr/>
+        <p:txBody>
+          <a:bodyPr/>
+          <a:lstStyle/>
+          <a:p>
+            <a:r>
+              <a:rPr lang="pl-PL" dirty="0" smtClean="0"/>
+              <a:t>Fotomontaż</a:t>
+            </a:r>
+            <a:r>
+              <a:rPr lang="pl-PL" baseline="0" dirty="0" smtClean="0"/>
+              <a:t> własny</a:t>
+            </a:r>
+            <a:endParaRPr lang="pl-PL" dirty="0"/>
+          </a:p>
+        </p:txBody>
+      </p:sp>
+      <p:sp>
+        <p:nvSpPr>
+          <p:cNvPr id="4" name="Symbol zastępczy numeru slajdu 3"/>
+          <p:cNvSpPr>
+            <a:spLocks noGrp="1"/>
+          </p:cNvSpPr>
+          <p:nvPr>
+            <p:ph type="sldNum" sz="quarter" idx="10"/>
+          </p:nvPr>
+        </p:nvSpPr>
+        <p:spPr/>
+        <p:txBody>
+          <a:bodyPr/>
+          <a:lstStyle/>
+          <a:p>
+            <a:fld id="{98B85331-A752-4F9F-82CD-29A2C61C3C07}" type="slidenum">
+              <a:rPr lang="pl-PL" smtClean="0"/>
+              <a:t>19</a:t>
+            </a:fld>
+            <a:endParaRPr lang="pl-PL"/>
+          </a:p>
+        </p:txBody>
+      </p:sp>
+    </p:spTree>
+    <p:extLst>
+      <p:ext uri="{BB962C8B-B14F-4D97-AF65-F5344CB8AC3E}">
+        <p14:creationId xmlns:p14="http://schemas.microsoft.com/office/powerpoint/2010/main" val="3522385601"/>
+      </p:ext>
+    </p:extLst>
+  </p:cSld>
+  <p:clrMapOvr>
+    <a:masterClrMapping/>
+  </p:clrMapOvr>
+</p:notes>
+</file>
+
 <file path=ppt/notesSlides/notesSlide2.xml><?xml version="1.0" encoding="utf-8"?>
 <p:notes xmlns:a="http://schemas.openxmlformats.org/drawingml/2006/main" xmlns:r="http://schemas.openxmlformats.org/officeDocument/2006/relationships" xmlns:p="http://schemas.openxmlformats.org/presentationml/2006/main">
   <p:cSld>
@@ -1133,7 +1245,15 @@
           <a:p>
             <a:r>
               <a:rPr lang="pl-PL" dirty="0" smtClean="0"/>
-              <a:t>Na razie http://www.secretgeek.net/image/function_v_imperative.PNG, http://www.programmingmath.com/blog/wp-content/uploads/2011/03/function-diagram.png konsyderowane przez</a:t>
+              <a:t>Na razie http://www.secretgeek.net/image/function_v_imperative.PNG, http://www.programmingmath.com/blog/wp-content/uploads/2011/03/function-diagram.png do </a:t>
+            </a:r>
+            <a:r>
+              <a:rPr lang="pl-PL" dirty="0" err="1" smtClean="0"/>
+              <a:t>skonsyderowania</a:t>
+            </a:r>
+            <a:r>
+              <a:rPr lang="pl-PL" dirty="0" smtClean="0"/>
+              <a:t> przez</a:t>
             </a:r>
             <a:r>
               <a:rPr lang="pl-PL" baseline="0" dirty="0" smtClean="0"/>
@@ -1289,6 +1409,142 @@
 </p:notes>
 </file>
 
+<file path=ppt/notesSlides/notesSlide9.xml><?xml version="1.0" encoding="utf-8"?>
+<p:notes xmlns:a="http://schemas.openxmlformats.org/drawingml/2006/main" xmlns:r="http://schemas.openxmlformats.org/officeDocument/2006/relationships" xmlns:p="http://schemas.openxmlformats.org/presentationml/2006/main">
+  <p:cSld>
+    <p:spTree>
+      <p:nvGrpSpPr>
+        <p:cNvPr id="1" name=""/>
+        <p:cNvGrpSpPr/>
+        <p:nvPr/>
+      </p:nvGrpSpPr>
+      <p:grpSpPr>
+        <a:xfrm>
+          <a:off x="0" y="0"/>
+          <a:ext cx="0" cy="0"/>
+          <a:chOff x="0" y="0"/>
+          <a:chExt cx="0" cy="0"/>
+        </a:xfrm>
+      </p:grpSpPr>
+      <p:sp>
+        <p:nvSpPr>
+          <p:cNvPr id="2" name="Symbol zastępczy obrazu slajdu 1"/>
+          <p:cNvSpPr>
+            <a:spLocks noGrp="1" noRot="1" noChangeAspect="1"/>
+          </p:cNvSpPr>
+          <p:nvPr>
+            <p:ph type="sldImg"/>
+          </p:nvPr>
+        </p:nvSpPr>
+        <p:spPr/>
+      </p:sp>
+      <p:sp>
+        <p:nvSpPr>
+          <p:cNvPr id="3" name="Symbol zastępczy notatek 2"/>
+          <p:cNvSpPr>
+            <a:spLocks noGrp="1"/>
+          </p:cNvSpPr>
+          <p:nvPr>
+            <p:ph type="body" idx="1"/>
+          </p:nvPr>
+        </p:nvSpPr>
+        <p:spPr/>
+        <p:txBody>
+          <a:bodyPr/>
+          <a:lstStyle/>
+          <a:p>
+            <a:r>
+              <a:rPr lang="pl-PL" smtClean="0"/>
+              <a:t>Fotomontaż roboty</a:t>
+            </a:r>
+            <a:r>
+              <a:rPr lang="pl-PL" baseline="0" smtClean="0"/>
+              <a:t> </a:t>
+            </a:r>
+            <a:r>
+              <a:rPr lang="pl-PL" smtClean="0"/>
+              <a:t>własnej </a:t>
+            </a:r>
+            <a:r>
+              <a:rPr lang="pl-PL" baseline="0" smtClean="0"/>
+              <a:t>(</a:t>
+            </a:r>
+            <a:r>
+              <a:rPr lang="pl-PL" baseline="0" dirty="0" smtClean="0"/>
+              <a:t>Google image </a:t>
+            </a:r>
+            <a:r>
+              <a:rPr lang="pl-PL" baseline="0" dirty="0" err="1" smtClean="0"/>
+              <a:t>search</a:t>
+            </a:r>
+            <a:r>
+              <a:rPr lang="pl-PL" baseline="0" dirty="0" smtClean="0"/>
+              <a:t>: businessman, </a:t>
+            </a:r>
+            <a:r>
+              <a:rPr lang="pl-PL" baseline="0" dirty="0" err="1" smtClean="0"/>
+              <a:t>hoodie</a:t>
+            </a:r>
+            <a:r>
+              <a:rPr lang="pl-PL" baseline="0" dirty="0" smtClean="0"/>
+              <a:t> </a:t>
+            </a:r>
+            <a:r>
+              <a:rPr lang="pl-PL" baseline="0" dirty="0" err="1" smtClean="0"/>
+              <a:t>man</a:t>
+            </a:r>
+            <a:r>
+              <a:rPr lang="pl-PL" baseline="0" dirty="0" smtClean="0"/>
+              <a:t> with </a:t>
+            </a:r>
+            <a:r>
+              <a:rPr lang="pl-PL" baseline="0" dirty="0" err="1" smtClean="0"/>
+              <a:t>gun</a:t>
+            </a:r>
+            <a:r>
+              <a:rPr lang="pl-PL" baseline="0" dirty="0" smtClean="0"/>
+              <a:t>)</a:t>
+            </a:r>
+            <a:endParaRPr lang="pl-PL" dirty="0"/>
+          </a:p>
+        </p:txBody>
+      </p:sp>
+      <p:sp>
+        <p:nvSpPr>
+          <p:cNvPr id="4" name="Symbol zastępczy numeru slajdu 3"/>
+          <p:cNvSpPr>
+            <a:spLocks noGrp="1"/>
+          </p:cNvSpPr>
+          <p:nvPr>
+            <p:ph type="sldNum" sz="quarter" idx="10"/>
+          </p:nvPr>
+        </p:nvSpPr>
+        <p:spPr/>
+        <p:txBody>
+          <a:bodyPr/>
+          <a:lstStyle/>
+          <a:p>
+            <a:fld id="{98B85331-A752-4F9F-82CD-29A2C61C3C07}" type="slidenum">
+              <a:rPr lang="pl-PL" smtClean="0"/>
+              <a:t>16</a:t>
+            </a:fld>
+            <a:endParaRPr lang="pl-PL"/>
+          </a:p>
+        </p:txBody>
+      </p:sp>
+    </p:spTree>
+    <p:extLst>
+      <p:ext uri="{BB962C8B-B14F-4D97-AF65-F5344CB8AC3E}">
+        <p14:creationId xmlns:p14="http://schemas.microsoft.com/office/powerpoint/2010/main" val="677068114"/>
+      </p:ext>
+    </p:extLst>
+  </p:cSld>
+  <p:clrMapOvr>
+    <a:masterClrMapping/>
+  </p:clrMapOvr>
+</p:notes>
+</file>
+
 <file path=ppt/slideLayouts/slideLayout1.xml><?xml version="1.0" encoding="utf-8"?>
 <p:sldLayout xmlns:a="http://schemas.openxmlformats.org/drawingml/2006/main" xmlns:r="http://schemas.openxmlformats.org/officeDocument/2006/relationships" xmlns:p="http://schemas.openxmlformats.org/presentationml/2006/main" type="title" preserve="1">
   <p:cSld name="Slajd tytułowy">
@@ -1470,7 +1726,7 @@
           <a:p>
             <a:fld id="{34D6017F-CCF5-4515-BCFC-0E080B5EA1AB}" type="datetimeFigureOut">
               <a:rPr lang="pl-PL" smtClean="0"/>
-              <a:t>18.05.2015</a:t>
+              <a:t>19.05.2015</a:t>
             </a:fld>
             <a:endParaRPr lang="pl-PL"/>
           </a:p>
@@ -1640,7 +1896,7 @@
           <a:p>
             <a:fld id="{34D6017F-CCF5-4515-BCFC-0E080B5EA1AB}" type="datetimeFigureOut">
               <a:rPr lang="pl-PL" smtClean="0"/>
-              <a:t>18.05.2015</a:t>
+              <a:t>19.05.2015</a:t>
             </a:fld>
             <a:endParaRPr lang="pl-PL"/>
           </a:p>
@@ -1820,7 +2076,7 @@
           <a:p>
             <a:fld id="{34D6017F-CCF5-4515-BCFC-0E080B5EA1AB}" type="datetimeFigureOut">
               <a:rPr lang="pl-PL" smtClean="0"/>
-              <a:t>18.05.2015</a:t>
+              <a:t>19.05.2015</a:t>
             </a:fld>
             <a:endParaRPr lang="pl-PL"/>
           </a:p>
@@ -1990,7 +2246,7 @@
           <a:p>
             <a:fld id="{34D6017F-CCF5-4515-BCFC-0E080B5EA1AB}" type="datetimeFigureOut">
               <a:rPr lang="pl-PL" smtClean="0"/>
-              <a:t>18.05.2015</a:t>
+              <a:t>19.05.2015</a:t>
             </a:fld>
             <a:endParaRPr lang="pl-PL"/>
           </a:p>
@@ -2236,7 +2492,7 @@
           <a:p>
             <a:fld id="{34D6017F-CCF5-4515-BCFC-0E080B5EA1AB}" type="datetimeFigureOut">
               <a:rPr lang="pl-PL" smtClean="0"/>
-              <a:t>18.05.2015</a:t>
+              <a:t>19.05.2015</a:t>
             </a:fld>
             <a:endParaRPr lang="pl-PL"/>
           </a:p>
@@ -2524,7 +2780,7 @@
           <a:p>
             <a:fld id="{34D6017F-CCF5-4515-BCFC-0E080B5EA1AB}" type="datetimeFigureOut">
               <a:rPr lang="pl-PL" smtClean="0"/>
-              <a:t>18.05.2015</a:t>
+              <a:t>19.05.2015</a:t>
             </a:fld>
             <a:endParaRPr lang="pl-PL"/>
           </a:p>
@@ -2946,7 +3202,7 @@
           <a:p>
             <a:fld id="{34D6017F-CCF5-4515-BCFC-0E080B5EA1AB}" type="datetimeFigureOut">
               <a:rPr lang="pl-PL" smtClean="0"/>
-              <a:t>18.05.2015</a:t>
+              <a:t>19.05.2015</a:t>
             </a:fld>
             <a:endParaRPr lang="pl-PL"/>
           </a:p>
@@ -3064,7 +3320,7 @@
           <a:p>
             <a:fld id="{34D6017F-CCF5-4515-BCFC-0E080B5EA1AB}" type="datetimeFigureOut">
               <a:rPr lang="pl-PL" smtClean="0"/>
-              <a:t>18.05.2015</a:t>
+              <a:t>19.05.2015</a:t>
             </a:fld>
             <a:endParaRPr lang="pl-PL"/>
           </a:p>
@@ -3159,7 +3415,7 @@
           <a:p>
             <a:fld id="{34D6017F-CCF5-4515-BCFC-0E080B5EA1AB}" type="datetimeFigureOut">
               <a:rPr lang="pl-PL" smtClean="0"/>
-              <a:t>18.05.2015</a:t>
+              <a:t>19.05.2015</a:t>
             </a:fld>
             <a:endParaRPr lang="pl-PL"/>
           </a:p>
@@ -3436,7 +3692,7 @@
           <a:p>
             <a:fld id="{34D6017F-CCF5-4515-BCFC-0E080B5EA1AB}" type="datetimeFigureOut">
               <a:rPr lang="pl-PL" smtClean="0"/>
-              <a:t>18.05.2015</a:t>
+              <a:t>19.05.2015</a:t>
             </a:fld>
             <a:endParaRPr lang="pl-PL"/>
           </a:p>
@@ -3689,7 +3945,7 @@
           <a:p>
             <a:fld id="{34D6017F-CCF5-4515-BCFC-0E080B5EA1AB}" type="datetimeFigureOut">
               <a:rPr lang="pl-PL" smtClean="0"/>
-              <a:t>18.05.2015</a:t>
+              <a:t>19.05.2015</a:t>
             </a:fld>
             <a:endParaRPr lang="pl-PL"/>
           </a:p>
@@ -3905,7 +4161,7 @@
           <a:p>
             <a:fld id="{34D6017F-CCF5-4515-BCFC-0E080B5EA1AB}" type="datetimeFigureOut">
               <a:rPr lang="pl-PL" smtClean="0"/>
-              <a:t>18.05.2015</a:t>
+              <a:t>19.05.2015</a:t>
             </a:fld>
             <a:endParaRPr lang="pl-PL"/>
           </a:p>
@@ -5331,6 +5587,650 @@
 </p:sld>
 </file>
 
+<file path=ppt/slides/slide16.xml><?xml version="1.0" encoding="utf-8"?>
+<p:sld xmlns:a="http://schemas.openxmlformats.org/drawingml/2006/main" xmlns:r="http://schemas.openxmlformats.org/officeDocument/2006/relationships" xmlns:p="http://schemas.openxmlformats.org/presentationml/2006/main">
+  <p:cSld>
+    <p:spTree>
+      <p:nvGrpSpPr>
+        <p:cNvPr id="1" name=""/>
+        <p:cNvGrpSpPr/>
+        <p:nvPr/>
+      </p:nvGrpSpPr>
+      <p:grpSpPr>
+        <a:xfrm>
+          <a:off x="0" y="0"/>
+          <a:ext cx="0" cy="0"/>
+          <a:chOff x="0" y="0"/>
+          <a:chExt cx="0" cy="0"/>
+        </a:xfrm>
+      </p:grpSpPr>
+      <p:sp>
+        <p:nvSpPr>
+          <p:cNvPr id="4" name="Tytuł 3"/>
+          <p:cNvSpPr>
+            <a:spLocks noGrp="1"/>
+          </p:cNvSpPr>
+          <p:nvPr>
+            <p:ph type="title"/>
+          </p:nvPr>
+        </p:nvSpPr>
+        <p:spPr/>
+        <p:txBody>
+          <a:bodyPr/>
+          <a:lstStyle/>
+          <a:p>
+            <a:r>
+              <a:rPr lang="pl-PL" dirty="0" smtClean="0">
+                <a:solidFill>
+                  <a:srgbClr val="FFFFFF"/>
+                </a:solidFill>
+              </a:rPr>
+              <a:t>Zdarzenia, czyli co się tu dzieje?</a:t>
+            </a:r>
+            <a:endParaRPr lang="pl-PL" dirty="0">
+              <a:solidFill>
+                <a:srgbClr val="FFFFFF"/>
+              </a:solidFill>
+            </a:endParaRPr>
+          </a:p>
+        </p:txBody>
+      </p:sp>
+      <p:pic>
+        <p:nvPicPr>
+          <p:cNvPr id="8" name="Symbol zastępczy obrazu 7"/>
+          <p:cNvPicPr>
+            <a:picLocks noGrp="1" noChangeAspect="1"/>
+          </p:cNvPicPr>
+          <p:nvPr>
+            <p:ph type="pic" idx="1"/>
+          </p:nvPr>
+        </p:nvPicPr>
+        <p:blipFill>
+          <a:blip r:embed="rId3">
+            <a:extLst>
+              <a:ext uri="{28A0092B-C50C-407E-A947-70E740481C1C}">
+                <a14:useLocalDpi xmlns:a14="http://schemas.microsoft.com/office/drawing/2010/main" val="0"/>
+              </a:ext>
+            </a:extLst>
+          </a:blip>
+          <a:srcRect/>
+          <a:stretch>
+            <a:fillRect/>
+          </a:stretch>
+        </p:blipFill>
+        <p:spPr/>
+      </p:pic>
+      <p:sp>
+        <p:nvSpPr>
+          <p:cNvPr id="6" name="Symbol zastępczy tekstu 5"/>
+          <p:cNvSpPr>
+            <a:spLocks noGrp="1"/>
+          </p:cNvSpPr>
+          <p:nvPr>
+            <p:ph type="body" sz="half" idx="2"/>
+          </p:nvPr>
+        </p:nvSpPr>
+        <p:spPr/>
+        <p:txBody>
+          <a:bodyPr/>
+          <a:lstStyle/>
+          <a:p>
+            <a:r>
+              <a:rPr lang="pl-PL" dirty="0" smtClean="0">
+                <a:solidFill>
+                  <a:srgbClr val="FFFFFF"/>
+                </a:solidFill>
+              </a:rPr>
+              <a:t>Zdarzenie – akcja lub wydarzenie wykryte przez program mogące zostać przez niego obsłużone</a:t>
+            </a:r>
+            <a:endParaRPr lang="pl-PL" dirty="0">
+              <a:solidFill>
+                <a:srgbClr val="FFFFFF"/>
+              </a:solidFill>
+            </a:endParaRPr>
+          </a:p>
+        </p:txBody>
+      </p:sp>
+    </p:spTree>
+    <p:extLst>
+      <p:ext uri="{BB962C8B-B14F-4D97-AF65-F5344CB8AC3E}">
+        <p14:creationId xmlns:p14="http://schemas.microsoft.com/office/powerpoint/2010/main" val="1344694799"/>
+      </p:ext>
+    </p:extLst>
+  </p:cSld>
+  <p:clrMapOvr>
+    <a:masterClrMapping/>
+  </p:clrMapOvr>
+  <p:timing>
+    <p:tnLst>
+      <p:par>
+        <p:cTn id="1" dur="indefinite" restart="never" nodeType="tmRoot"/>
+      </p:par>
+    </p:tnLst>
+  </p:timing>
+</p:sld>
+</file>
+
+<file path=ppt/slides/slide17.xml><?xml version="1.0" encoding="utf-8"?>
+<p:sld xmlns:a="http://schemas.openxmlformats.org/drawingml/2006/main" xmlns:r="http://schemas.openxmlformats.org/officeDocument/2006/relationships" xmlns:p="http://schemas.openxmlformats.org/presentationml/2006/main">
+  <p:cSld>
+    <p:spTree>
+      <p:nvGrpSpPr>
+        <p:cNvPr id="1" name=""/>
+        <p:cNvGrpSpPr/>
+        <p:nvPr/>
+      </p:nvGrpSpPr>
+      <p:grpSpPr>
+        <a:xfrm>
+          <a:off x="0" y="0"/>
+          <a:ext cx="0" cy="0"/>
+          <a:chOff x="0" y="0"/>
+          <a:chExt cx="0" cy="0"/>
+        </a:xfrm>
+      </p:grpSpPr>
+      <p:sp>
+        <p:nvSpPr>
+          <p:cNvPr id="5" name="Tytuł 4"/>
+          <p:cNvSpPr>
+            <a:spLocks noGrp="1"/>
+          </p:cNvSpPr>
+          <p:nvPr>
+            <p:ph type="title"/>
+          </p:nvPr>
+        </p:nvSpPr>
+        <p:spPr/>
+        <p:txBody>
+          <a:bodyPr/>
+          <a:lstStyle/>
+          <a:p>
+            <a:r>
+              <a:rPr lang="pl-PL" dirty="0" smtClean="0">
+                <a:solidFill>
+                  <a:srgbClr val="FFFFFF"/>
+                </a:solidFill>
+              </a:rPr>
+              <a:t>Zdarzenia</a:t>
+            </a:r>
+            <a:r>
+              <a:rPr lang="pl-PL" sz="2000" dirty="0" smtClean="0">
+                <a:solidFill>
+                  <a:srgbClr val="FFFFFF"/>
+                </a:solidFill>
+              </a:rPr>
+              <a:t>[</a:t>
+            </a:r>
+            <a:r>
+              <a:rPr lang="pl-PL" sz="2000" dirty="0" err="1" smtClean="0">
+                <a:solidFill>
+                  <a:srgbClr val="FFFFFF"/>
+                </a:solidFill>
+              </a:rPr>
+              <a:t>wah</a:t>
+            </a:r>
+            <a:r>
+              <a:rPr lang="pl-PL" sz="2000" dirty="0">
+                <a:solidFill>
+                  <a:srgbClr val="FFFFFF"/>
+                </a:solidFill>
+              </a:rPr>
+              <a:t>]</a:t>
+            </a:r>
+          </a:p>
+        </p:txBody>
+      </p:sp>
+      <p:sp>
+        <p:nvSpPr>
+          <p:cNvPr id="6" name="Symbol zastępczy zawartości 5"/>
+          <p:cNvSpPr>
+            <a:spLocks noGrp="1"/>
+          </p:cNvSpPr>
+          <p:nvPr>
+            <p:ph idx="1"/>
+          </p:nvPr>
+        </p:nvSpPr>
+        <p:spPr/>
+        <p:txBody>
+          <a:bodyPr/>
+          <a:lstStyle/>
+          <a:p>
+            <a:r>
+              <a:rPr lang="pl-PL" dirty="0" smtClean="0">
+                <a:solidFill>
+                  <a:srgbClr val="FFFFFF"/>
+                </a:solidFill>
+              </a:rPr>
+              <a:t>Jako, że HTML, a w konsekwencji również i JS radzi sobie z użytkownikami ludzkimi, nie wszystko dzieje się synchronicznie</a:t>
+            </a:r>
+          </a:p>
+          <a:p>
+            <a:r>
+              <a:rPr lang="pl-PL" dirty="0" smtClean="0">
+                <a:solidFill>
+                  <a:srgbClr val="FFFFFF"/>
+                </a:solidFill>
+              </a:rPr>
+              <a:t>Zachodzi wobec czego czasami potrzeba zareagowania na, np, kliknięcie przycisku</a:t>
+            </a:r>
+            <a:endParaRPr lang="pl-PL" dirty="0">
+              <a:solidFill>
+                <a:srgbClr val="FFFFFF"/>
+              </a:solidFill>
+            </a:endParaRPr>
+          </a:p>
+        </p:txBody>
+      </p:sp>
+    </p:spTree>
+    <p:extLst>
+      <p:ext uri="{BB962C8B-B14F-4D97-AF65-F5344CB8AC3E}">
+        <p14:creationId xmlns:p14="http://schemas.microsoft.com/office/powerpoint/2010/main" val="2236007757"/>
+      </p:ext>
+    </p:extLst>
+  </p:cSld>
+  <p:clrMapOvr>
+    <a:masterClrMapping/>
+  </p:clrMapOvr>
+  <p:timing>
+    <p:tnLst>
+      <p:par>
+        <p:cTn id="1" dur="indefinite" restart="never" nodeType="tmRoot"/>
+      </p:par>
+    </p:tnLst>
+  </p:timing>
+</p:sld>
+</file>
+
+<file path=ppt/slides/slide18.xml><?xml version="1.0" encoding="utf-8"?>
+<p:sld xmlns:a="http://schemas.openxmlformats.org/drawingml/2006/main" xmlns:r="http://schemas.openxmlformats.org/officeDocument/2006/relationships" xmlns:p="http://schemas.openxmlformats.org/presentationml/2006/main">
+  <p:cSld>
+    <p:spTree>
+      <p:nvGrpSpPr>
+        <p:cNvPr id="1" name=""/>
+        <p:cNvGrpSpPr/>
+        <p:nvPr/>
+      </p:nvGrpSpPr>
+      <p:grpSpPr>
+        <a:xfrm>
+          <a:off x="0" y="0"/>
+          <a:ext cx="0" cy="0"/>
+          <a:chOff x="0" y="0"/>
+          <a:chExt cx="0" cy="0"/>
+        </a:xfrm>
+      </p:grpSpPr>
+      <p:sp>
+        <p:nvSpPr>
+          <p:cNvPr id="2" name="Tytuł 1"/>
+          <p:cNvSpPr>
+            <a:spLocks noGrp="1"/>
+          </p:cNvSpPr>
+          <p:nvPr>
+            <p:ph type="title"/>
+          </p:nvPr>
+        </p:nvSpPr>
+        <p:spPr/>
+        <p:txBody>
+          <a:bodyPr/>
+          <a:lstStyle/>
+          <a:p>
+            <a:r>
+              <a:rPr lang="pl-PL" dirty="0">
+                <a:solidFill>
+                  <a:srgbClr val="FFFFFF"/>
+                </a:solidFill>
+              </a:rPr>
+              <a:t>Zdarzenia</a:t>
+            </a:r>
+            <a:r>
+              <a:rPr lang="pl-PL" sz="2000" dirty="0">
+                <a:solidFill>
+                  <a:srgbClr val="FFFFFF"/>
+                </a:solidFill>
+              </a:rPr>
+              <a:t>[</a:t>
+            </a:r>
+            <a:r>
+              <a:rPr lang="pl-PL" sz="2000" dirty="0" err="1">
+                <a:solidFill>
+                  <a:srgbClr val="FFFFFF"/>
+                </a:solidFill>
+              </a:rPr>
+              <a:t>wah</a:t>
+            </a:r>
+            <a:r>
+              <a:rPr lang="pl-PL" sz="2000" dirty="0">
+                <a:solidFill>
+                  <a:srgbClr val="FFFFFF"/>
+                </a:solidFill>
+              </a:rPr>
+              <a:t>]</a:t>
+            </a:r>
+            <a:endParaRPr lang="pl-PL" dirty="0"/>
+          </a:p>
+        </p:txBody>
+      </p:sp>
+      <p:sp>
+        <p:nvSpPr>
+          <p:cNvPr id="3" name="Symbol zastępczy zawartości 2"/>
+          <p:cNvSpPr>
+            <a:spLocks noGrp="1"/>
+          </p:cNvSpPr>
+          <p:nvPr>
+            <p:ph idx="1"/>
+          </p:nvPr>
+        </p:nvSpPr>
+        <p:spPr/>
+        <p:txBody>
+          <a:bodyPr/>
+          <a:lstStyle/>
+          <a:p>
+            <a:r>
+              <a:rPr lang="pl-PL" dirty="0" smtClean="0">
+                <a:solidFill>
+                  <a:srgbClr val="FFFFFF"/>
+                </a:solidFill>
+              </a:rPr>
+              <a:t>Na zdarzenia reaguje się bezpośrednio z </a:t>
+            </a:r>
+            <a:r>
+              <a:rPr lang="pl-PL" dirty="0" err="1" smtClean="0">
+                <a:solidFill>
+                  <a:srgbClr val="FFFFFF"/>
+                </a:solidFill>
+              </a:rPr>
+              <a:t>HTML’a</a:t>
+            </a:r>
+            <a:r>
+              <a:rPr lang="pl-PL" dirty="0" smtClean="0">
+                <a:solidFill>
+                  <a:srgbClr val="FFFFFF"/>
+                </a:solidFill>
+              </a:rPr>
+              <a:t>, np:</a:t>
+            </a:r>
+          </a:p>
+          <a:p>
+            <a:pPr lvl="1"/>
+            <a:r>
+              <a:rPr lang="pl-PL" dirty="0" smtClean="0">
+                <a:solidFill>
+                  <a:srgbClr val="FFFFFF"/>
+                </a:solidFill>
+              </a:rPr>
+              <a:t>&lt;</a:t>
+            </a:r>
+            <a:r>
+              <a:rPr lang="pl-PL" i="1" dirty="0" err="1" smtClean="0">
+                <a:solidFill>
+                  <a:srgbClr val="FFFFFF"/>
+                </a:solidFill>
+              </a:rPr>
+              <a:t>tag</a:t>
+            </a:r>
+            <a:r>
+              <a:rPr lang="pl-PL" dirty="0" smtClean="0">
+                <a:solidFill>
+                  <a:srgbClr val="FFFFFF"/>
+                </a:solidFill>
+              </a:rPr>
+              <a:t> </a:t>
+            </a:r>
+            <a:r>
+              <a:rPr lang="pl-PL" dirty="0" err="1" smtClean="0">
+                <a:solidFill>
+                  <a:srgbClr val="FFFFFF"/>
+                </a:solidFill>
+              </a:rPr>
+              <a:t>on</a:t>
+            </a:r>
+            <a:r>
+              <a:rPr lang="pl-PL" i="1" dirty="0" err="1" smtClean="0">
+                <a:solidFill>
+                  <a:srgbClr val="FFFFFF"/>
+                </a:solidFill>
+              </a:rPr>
+              <a:t>event-name</a:t>
+            </a:r>
+            <a:r>
+              <a:rPr lang="pl-PL" dirty="0" smtClean="0">
+                <a:solidFill>
+                  <a:srgbClr val="FFFFFF"/>
+                </a:solidFill>
+              </a:rPr>
+              <a:t>="</a:t>
+            </a:r>
+            <a:r>
+              <a:rPr lang="pl-PL" i="1" dirty="0" err="1" smtClean="0">
+                <a:solidFill>
+                  <a:srgbClr val="FFFFFF"/>
+                </a:solidFill>
+              </a:rPr>
+              <a:t>expression</a:t>
+            </a:r>
+            <a:r>
+              <a:rPr lang="pl-PL" dirty="0" smtClean="0">
+                <a:solidFill>
+                  <a:srgbClr val="FFFFFF"/>
+                </a:solidFill>
+              </a:rPr>
+              <a:t>" /&gt;</a:t>
+            </a:r>
+          </a:p>
+          <a:p>
+            <a:r>
+              <a:rPr lang="pl-PL" dirty="0" smtClean="0">
+                <a:solidFill>
+                  <a:srgbClr val="FFFFFF"/>
+                </a:solidFill>
+              </a:rPr>
+              <a:t>Lub do właściwości instancji elementu przypisując funkcję, np:</a:t>
+            </a:r>
+          </a:p>
+          <a:p>
+            <a:pPr lvl="1"/>
+            <a:r>
+              <a:rPr lang="pl-PL" i="1" dirty="0" err="1" smtClean="0">
+                <a:solidFill>
+                  <a:srgbClr val="FFFFFF"/>
+                </a:solidFill>
+              </a:rPr>
+              <a:t>expression</a:t>
+            </a:r>
+            <a:r>
+              <a:rPr lang="pl-PL" dirty="0" err="1" smtClean="0">
+                <a:solidFill>
+                  <a:srgbClr val="FFFFFF"/>
+                </a:solidFill>
+              </a:rPr>
+              <a:t>.on</a:t>
+            </a:r>
+            <a:r>
+              <a:rPr lang="pl-PL" i="1" dirty="0" err="1" smtClean="0">
+                <a:solidFill>
+                  <a:srgbClr val="FFFFFF"/>
+                </a:solidFill>
+              </a:rPr>
+              <a:t>event-name</a:t>
+            </a:r>
+            <a:r>
+              <a:rPr lang="pl-PL" dirty="0" smtClean="0">
+                <a:solidFill>
+                  <a:srgbClr val="FFFFFF"/>
+                </a:solidFill>
+              </a:rPr>
+              <a:t> = </a:t>
+            </a:r>
+            <a:r>
+              <a:rPr lang="pl-PL" i="1" dirty="0" err="1" smtClean="0">
+                <a:solidFill>
+                  <a:srgbClr val="FFFFFF"/>
+                </a:solidFill>
+              </a:rPr>
+              <a:t>function-definition</a:t>
+            </a:r>
+            <a:endParaRPr lang="pl-PL" dirty="0" smtClean="0">
+              <a:solidFill>
+                <a:srgbClr val="FFFFFF"/>
+              </a:solidFill>
+            </a:endParaRPr>
+          </a:p>
+          <a:p>
+            <a:endParaRPr lang="pl-PL" i="1" dirty="0">
+              <a:solidFill>
+                <a:srgbClr val="FFFFFF"/>
+              </a:solidFill>
+            </a:endParaRPr>
+          </a:p>
+        </p:txBody>
+      </p:sp>
+    </p:spTree>
+    <p:extLst>
+      <p:ext uri="{BB962C8B-B14F-4D97-AF65-F5344CB8AC3E}">
+        <p14:creationId xmlns:p14="http://schemas.microsoft.com/office/powerpoint/2010/main" val="1050035074"/>
+      </p:ext>
+    </p:extLst>
+  </p:cSld>
+  <p:clrMapOvr>
+    <a:masterClrMapping/>
+  </p:clrMapOvr>
+  <p:timing>
+    <p:tnLst>
+      <p:par>
+        <p:cTn id="1" dur="indefinite" restart="never" nodeType="tmRoot"/>
+      </p:par>
+    </p:tnLst>
+  </p:timing>
+</p:sld>
+</file>
+
+<file path=ppt/slides/slide19.xml><?xml version="1.0" encoding="utf-8"?>
+<p:sld xmlns:a="http://schemas.openxmlformats.org/drawingml/2006/main" xmlns:r="http://schemas.openxmlformats.org/officeDocument/2006/relationships" xmlns:p="http://schemas.openxmlformats.org/presentationml/2006/main">
+  <p:cSld>
+    <p:spTree>
+      <p:nvGrpSpPr>
+        <p:cNvPr id="1" name=""/>
+        <p:cNvGrpSpPr/>
+        <p:nvPr/>
+      </p:nvGrpSpPr>
+      <p:grpSpPr>
+        <a:xfrm>
+          <a:off x="0" y="0"/>
+          <a:ext cx="0" cy="0"/>
+          <a:chOff x="0" y="0"/>
+          <a:chExt cx="0" cy="0"/>
+        </a:xfrm>
+      </p:grpSpPr>
+      <p:sp>
+        <p:nvSpPr>
+          <p:cNvPr id="4" name="Tytuł 3"/>
+          <p:cNvSpPr>
+            <a:spLocks noGrp="1"/>
+          </p:cNvSpPr>
+          <p:nvPr>
+            <p:ph type="title"/>
+          </p:nvPr>
+        </p:nvSpPr>
+        <p:spPr/>
+        <p:txBody>
+          <a:bodyPr/>
+          <a:lstStyle/>
+          <a:p>
+            <a:r>
+              <a:rPr lang="pl-PL" dirty="0" smtClean="0">
+                <a:solidFill>
+                  <a:srgbClr val="FFFFFF"/>
+                </a:solidFill>
+              </a:rPr>
+              <a:t>Różne dziwne rzeczy</a:t>
+            </a:r>
+            <a:endParaRPr lang="pl-PL" dirty="0">
+              <a:solidFill>
+                <a:srgbClr val="FFFFFF"/>
+              </a:solidFill>
+            </a:endParaRPr>
+          </a:p>
+        </p:txBody>
+      </p:sp>
+      <p:pic>
+        <p:nvPicPr>
+          <p:cNvPr id="8" name="Symbol zastępczy obrazu 7"/>
+          <p:cNvPicPr>
+            <a:picLocks noGrp="1" noChangeAspect="1"/>
+          </p:cNvPicPr>
+          <p:nvPr>
+            <p:ph type="pic" idx="1"/>
+          </p:nvPr>
+        </p:nvPicPr>
+        <p:blipFill rotWithShape="1">
+          <a:blip r:embed="rId3">
+            <a:extLst>
+              <a:ext uri="{28A0092B-C50C-407E-A947-70E740481C1C}">
+                <a14:useLocalDpi xmlns:a14="http://schemas.microsoft.com/office/drawing/2010/main" val="0"/>
+              </a:ext>
+            </a:extLst>
+          </a:blip>
+          <a:srcRect t="-6516" b="-6516"/>
+          <a:stretch/>
+        </p:blipFill>
+        <p:spPr/>
+      </p:pic>
+      <p:sp>
+        <p:nvSpPr>
+          <p:cNvPr id="6" name="Symbol zastępczy tekstu 5"/>
+          <p:cNvSpPr>
+            <a:spLocks noGrp="1"/>
+          </p:cNvSpPr>
+          <p:nvPr>
+            <p:ph type="body" sz="half" idx="2"/>
+          </p:nvPr>
+        </p:nvSpPr>
+        <p:spPr/>
+        <p:txBody>
+          <a:bodyPr/>
+          <a:lstStyle/>
+          <a:p>
+            <a:r>
+              <a:rPr lang="pl-PL" dirty="0" err="1" smtClean="0">
+                <a:solidFill>
+                  <a:srgbClr val="FFFFFF"/>
+                </a:solidFill>
+              </a:rPr>
+              <a:t>Wah</a:t>
+            </a:r>
+            <a:r>
+              <a:rPr lang="pl-PL" dirty="0" smtClean="0">
+                <a:solidFill>
+                  <a:srgbClr val="FFFFFF"/>
+                </a:solidFill>
+              </a:rPr>
+              <a:t>!</a:t>
+            </a:r>
+            <a:endParaRPr lang="pl-PL" dirty="0">
+              <a:solidFill>
+                <a:srgbClr val="FFFFFF"/>
+              </a:solidFill>
+            </a:endParaRPr>
+          </a:p>
+        </p:txBody>
+      </p:sp>
+    </p:spTree>
+    <p:extLst>
+      <p:ext uri="{BB962C8B-B14F-4D97-AF65-F5344CB8AC3E}">
+        <p14:creationId xmlns:p14="http://schemas.microsoft.com/office/powerpoint/2010/main" val="2381991332"/>
+      </p:ext>
+    </p:extLst>
+  </p:cSld>
+  <p:clrMapOvr>
+    <a:masterClrMapping/>
+  </p:clrMapOvr>
+  <p:timing>
+    <p:tnLst>
+      <p:par>
+        <p:cTn id="1" dur="indefinite" restart="never" nodeType="tmRoot"/>
+      </p:par>
+    </p:tnLst>
+  </p:timing>
+</p:sld>
+</file>
+
 <file path=ppt/slides/slide2.xml><?xml version="1.0" encoding="utf-8"?>
 <p:sld xmlns:a="http://schemas.openxmlformats.org/drawingml/2006/main" xmlns:r="http://schemas.openxmlformats.org/officeDocument/2006/relationships" xmlns:p="http://schemas.openxmlformats.org/presentationml/2006/main">
   <p:cSld>
@@ -5586,6 +6486,334 @@
     <p:extLst>
       <p:ext uri="{BB962C8B-B14F-4D97-AF65-F5344CB8AC3E}">
         <p14:creationId xmlns:p14="http://schemas.microsoft.com/office/powerpoint/2010/main" val="1132806336"/>
+      </p:ext>
+    </p:extLst>
+  </p:cSld>
+  <p:clrMapOvr>
+    <a:masterClrMapping/>
+  </p:clrMapOvr>
+  <p:timing>
+    <p:tnLst>
+      <p:par>
+        <p:cTn id="1" dur="indefinite" restart="never" nodeType="tmRoot"/>
+      </p:par>
+    </p:tnLst>
+  </p:timing>
+</p:sld>
+</file>
+
+<file path=ppt/slides/slide20.xml><?xml version="1.0" encoding="utf-8"?>
+<p:sld xmlns:a="http://schemas.openxmlformats.org/drawingml/2006/main" xmlns:r="http://schemas.openxmlformats.org/officeDocument/2006/relationships" xmlns:p="http://schemas.openxmlformats.org/presentationml/2006/main">
+  <p:cSld>
+    <p:spTree>
+      <p:nvGrpSpPr>
+        <p:cNvPr id="1" name=""/>
+        <p:cNvGrpSpPr/>
+        <p:nvPr/>
+      </p:nvGrpSpPr>
+      <p:grpSpPr>
+        <a:xfrm>
+          <a:off x="0" y="0"/>
+          <a:ext cx="0" cy="0"/>
+          <a:chOff x="0" y="0"/>
+          <a:chExt cx="0" cy="0"/>
+        </a:xfrm>
+      </p:grpSpPr>
+      <p:sp>
+        <p:nvSpPr>
+          <p:cNvPr id="5" name="Tytuł 4"/>
+          <p:cNvSpPr>
+            <a:spLocks noGrp="1"/>
+          </p:cNvSpPr>
+          <p:nvPr>
+            <p:ph type="title"/>
+          </p:nvPr>
+        </p:nvSpPr>
+        <p:spPr/>
+        <p:txBody>
+          <a:bodyPr/>
+          <a:lstStyle/>
+          <a:p>
+            <a:r>
+              <a:rPr lang="pl-PL" dirty="0" smtClean="0">
+                <a:solidFill>
+                  <a:srgbClr val="FFFFFF"/>
+                </a:solidFill>
+              </a:rPr>
+              <a:t>&lt;</a:t>
+            </a:r>
+            <a:r>
+              <a:rPr lang="pl-PL" dirty="0" err="1" smtClean="0">
+                <a:solidFill>
+                  <a:srgbClr val="FFFFFF"/>
+                </a:solidFill>
+              </a:rPr>
+              <a:t>canvas</a:t>
+            </a:r>
+            <a:r>
+              <a:rPr lang="pl-PL" dirty="0" smtClean="0">
+                <a:solidFill>
+                  <a:srgbClr val="FFFFFF"/>
+                </a:solidFill>
+              </a:rPr>
+              <a:t>&gt;</a:t>
+            </a:r>
+            <a:endParaRPr lang="pl-PL" dirty="0">
+              <a:solidFill>
+                <a:srgbClr val="FFFFFF"/>
+              </a:solidFill>
+            </a:endParaRPr>
+          </a:p>
+        </p:txBody>
+      </p:sp>
+      <p:sp>
+        <p:nvSpPr>
+          <p:cNvPr id="6" name="Symbol zastępczy zawartości 5"/>
+          <p:cNvSpPr>
+            <a:spLocks noGrp="1"/>
+          </p:cNvSpPr>
+          <p:nvPr>
+            <p:ph idx="1"/>
+          </p:nvPr>
+        </p:nvSpPr>
+        <p:spPr/>
+        <p:txBody>
+          <a:bodyPr/>
+          <a:lstStyle/>
+          <a:p>
+            <a:r>
+              <a:rPr lang="pl-PL" dirty="0" smtClean="0">
+                <a:solidFill>
+                  <a:srgbClr val="FFFFFF"/>
+                </a:solidFill>
+              </a:rPr>
+              <a:t>&lt;</a:t>
+            </a:r>
+            <a:r>
+              <a:rPr lang="pl-PL" dirty="0" err="1" smtClean="0">
+                <a:solidFill>
+                  <a:srgbClr val="FFFFFF"/>
+                </a:solidFill>
+              </a:rPr>
+              <a:t>canvas</a:t>
+            </a:r>
+            <a:r>
+              <a:rPr lang="pl-PL" dirty="0" smtClean="0">
+                <a:solidFill>
+                  <a:srgbClr val="FFFFFF"/>
+                </a:solidFill>
+              </a:rPr>
+              <a:t>&gt; – dosłownie „płótno” – element do rysowania dwu- i trzywymiarowego, patrz </a:t>
+            </a:r>
+            <a:r>
+              <a:rPr lang="pl-PL" dirty="0" err="1" smtClean="0">
+                <a:solidFill>
+                  <a:srgbClr val="FFFFFF"/>
+                </a:solidFill>
+              </a:rPr>
+              <a:t>egzampul</a:t>
+            </a:r>
+            <a:r>
+              <a:rPr lang="pl-PL" dirty="0" smtClean="0">
+                <a:solidFill>
+                  <a:srgbClr val="FFFFFF"/>
+                </a:solidFill>
+              </a:rPr>
+              <a:t> „</a:t>
+            </a:r>
+            <a:r>
+              <a:rPr lang="pl-PL" dirty="0" err="1" smtClean="0">
+                <a:solidFill>
+                  <a:srgbClr val="FFFFFF"/>
+                </a:solidFill>
+              </a:rPr>
+              <a:t>canvas</a:t>
+            </a:r>
+            <a:r>
+              <a:rPr lang="pl-PL" dirty="0" smtClean="0">
+                <a:solidFill>
+                  <a:srgbClr val="FFFFFF"/>
+                </a:solidFill>
+              </a:rPr>
+              <a:t>”</a:t>
+            </a:r>
+          </a:p>
+          <a:p>
+            <a:endParaRPr lang="pl-PL" dirty="0" smtClean="0">
+              <a:solidFill>
+                <a:srgbClr val="FFFFFF"/>
+              </a:solidFill>
+            </a:endParaRPr>
+          </a:p>
+        </p:txBody>
+      </p:sp>
+    </p:spTree>
+    <p:extLst>
+      <p:ext uri="{BB962C8B-B14F-4D97-AF65-F5344CB8AC3E}">
+        <p14:creationId xmlns:p14="http://schemas.microsoft.com/office/powerpoint/2010/main" val="1076531335"/>
+      </p:ext>
+    </p:extLst>
+  </p:cSld>
+  <p:clrMapOvr>
+    <a:masterClrMapping/>
+  </p:clrMapOvr>
+  <p:timing>
+    <p:tnLst>
+      <p:par>
+        <p:cTn id="1" dur="indefinite" restart="never" nodeType="tmRoot"/>
+      </p:par>
+    </p:tnLst>
+  </p:timing>
+</p:sld>
+</file>
+
+<file path=ppt/slides/slide21.xml><?xml version="1.0" encoding="utf-8"?>
+<p:sld xmlns:a="http://schemas.openxmlformats.org/drawingml/2006/main" xmlns:r="http://schemas.openxmlformats.org/officeDocument/2006/relationships" xmlns:p="http://schemas.openxmlformats.org/presentationml/2006/main">
+  <p:cSld>
+    <p:spTree>
+      <p:nvGrpSpPr>
+        <p:cNvPr id="1" name=""/>
+        <p:cNvGrpSpPr/>
+        <p:nvPr/>
+      </p:nvGrpSpPr>
+      <p:grpSpPr>
+        <a:xfrm>
+          <a:off x="0" y="0"/>
+          <a:ext cx="0" cy="0"/>
+          <a:chOff x="0" y="0"/>
+          <a:chExt cx="0" cy="0"/>
+        </a:xfrm>
+      </p:grpSpPr>
+      <p:sp>
+        <p:nvSpPr>
+          <p:cNvPr id="2" name="Tytuł 1"/>
+          <p:cNvSpPr>
+            <a:spLocks noGrp="1"/>
+          </p:cNvSpPr>
+          <p:nvPr>
+            <p:ph type="title"/>
+          </p:nvPr>
+        </p:nvSpPr>
+        <p:spPr/>
+        <p:txBody>
+          <a:bodyPr/>
+          <a:lstStyle/>
+          <a:p>
+            <a:r>
+              <a:rPr lang="pl-PL" dirty="0" smtClean="0">
+                <a:solidFill>
+                  <a:srgbClr val="FFFFFF"/>
+                </a:solidFill>
+              </a:rPr>
+              <a:t>&lt;</a:t>
+            </a:r>
+            <a:r>
+              <a:rPr lang="pl-PL" smtClean="0">
+                <a:solidFill>
+                  <a:srgbClr val="FFFFFF"/>
+                </a:solidFill>
+              </a:rPr>
+              <a:t>input</a:t>
+            </a:r>
+            <a:r>
+              <a:rPr lang="pl-PL" dirty="0" smtClean="0">
+                <a:solidFill>
+                  <a:srgbClr val="FFFFFF"/>
+                </a:solidFill>
+              </a:rPr>
+              <a:t>&gt;</a:t>
+            </a:r>
+            <a:endParaRPr lang="pl-PL" dirty="0">
+              <a:solidFill>
+                <a:srgbClr val="FFFFFF"/>
+              </a:solidFill>
+            </a:endParaRPr>
+          </a:p>
+        </p:txBody>
+      </p:sp>
+      <p:sp>
+        <p:nvSpPr>
+          <p:cNvPr id="3" name="Symbol zastępczy zawartości 2"/>
+          <p:cNvSpPr>
+            <a:spLocks noGrp="1"/>
+          </p:cNvSpPr>
+          <p:nvPr>
+            <p:ph idx="1"/>
+          </p:nvPr>
+        </p:nvSpPr>
+        <p:spPr/>
+        <p:txBody>
+          <a:bodyPr/>
+          <a:lstStyle/>
+          <a:p>
+            <a:r>
+              <a:rPr lang="pl-PL" dirty="0" smtClean="0">
+                <a:solidFill>
+                  <a:srgbClr val="FFFFFF"/>
+                </a:solidFill>
+              </a:rPr>
+              <a:t>&lt;</a:t>
+            </a:r>
+            <a:r>
+              <a:rPr lang="pl-PL" dirty="0" err="1" smtClean="0">
+                <a:solidFill>
+                  <a:srgbClr val="FFFFFF"/>
+                </a:solidFill>
+              </a:rPr>
+              <a:t>input</a:t>
+            </a:r>
+            <a:r>
+              <a:rPr lang="pl-PL" dirty="0" smtClean="0">
+                <a:solidFill>
+                  <a:srgbClr val="FFFFFF"/>
+                </a:solidFill>
+              </a:rPr>
+              <a:t>&gt; – dosłownie „dane wejściowe” – element do obsługiwania różnorakich twórczych danych od użytkownika, patrz </a:t>
+            </a:r>
+            <a:r>
+              <a:rPr lang="pl-PL" dirty="0" err="1" smtClean="0">
+                <a:solidFill>
+                  <a:srgbClr val="FFFFFF"/>
+                </a:solidFill>
+              </a:rPr>
+              <a:t>egzampul</a:t>
+            </a:r>
+            <a:r>
+              <a:rPr lang="pl-PL" dirty="0" smtClean="0">
+                <a:solidFill>
+                  <a:srgbClr val="FFFFFF"/>
+                </a:solidFill>
+              </a:rPr>
+              <a:t> „</a:t>
+            </a:r>
+            <a:r>
+              <a:rPr lang="pl-PL" dirty="0" err="1" smtClean="0">
+                <a:solidFill>
+                  <a:srgbClr val="FFFFFF"/>
+                </a:solidFill>
+              </a:rPr>
+              <a:t>input</a:t>
+            </a:r>
+            <a:r>
+              <a:rPr lang="pl-PL" dirty="0" smtClean="0">
+                <a:solidFill>
+                  <a:srgbClr val="FFFFFF"/>
+                </a:solidFill>
+              </a:rPr>
+              <a:t>”</a:t>
+            </a:r>
+            <a:endParaRPr lang="pl-PL" dirty="0">
+              <a:solidFill>
+                <a:srgbClr val="FFFFFF"/>
+              </a:solidFill>
+            </a:endParaRPr>
+          </a:p>
+        </p:txBody>
+      </p:sp>
+    </p:spTree>
+    <p:extLst>
+      <p:ext uri="{BB962C8B-B14F-4D97-AF65-F5344CB8AC3E}">
+        <p14:creationId xmlns:p14="http://schemas.microsoft.com/office/powerpoint/2010/main" val="3900130006"/>
       </p:ext>
     </p:extLst>
   </p:cSld>

</xml_diff>

<commit_message>
Add the near-final version - reviewed by The Self-deprecating One
</commit_message>
<xml_diff>
--- a/prezentacja/JavaScript.pptx
+++ b/prezentacja/JavaScript.pptx
@@ -5,7 +5,7 @@
     <p:sldMasterId id="2147483648" r:id="rId1"/>
   </p:sldMasterIdLst>
   <p:notesMasterIdLst>
-    <p:notesMasterId r:id="rId23"/>
+    <p:notesMasterId r:id="rId24"/>
   </p:notesMasterIdLst>
   <p:sldIdLst>
     <p:sldId id="256" r:id="rId2"/>
@@ -22,13 +22,14 @@
     <p:sldId id="267" r:id="rId13"/>
     <p:sldId id="268" r:id="rId14"/>
     <p:sldId id="269" r:id="rId15"/>
-    <p:sldId id="270" r:id="rId16"/>
-    <p:sldId id="271" r:id="rId17"/>
-    <p:sldId id="272" r:id="rId18"/>
-    <p:sldId id="273" r:id="rId19"/>
-    <p:sldId id="274" r:id="rId20"/>
-    <p:sldId id="275" r:id="rId21"/>
-    <p:sldId id="276" r:id="rId22"/>
+    <p:sldId id="277" r:id="rId16"/>
+    <p:sldId id="270" r:id="rId17"/>
+    <p:sldId id="271" r:id="rId18"/>
+    <p:sldId id="272" r:id="rId19"/>
+    <p:sldId id="273" r:id="rId20"/>
+    <p:sldId id="274" r:id="rId21"/>
+    <p:sldId id="275" r:id="rId22"/>
+    <p:sldId id="276" r:id="rId23"/>
   </p:sldIdLst>
   <p:sldSz cx="9144000" cy="6858000" type="screen4x3"/>
   <p:notesSz cx="6858000" cy="9144000"/>
@@ -162,6 +163,7 @@
           <p14:sldIdLst>
             <p14:sldId id="268"/>
             <p14:sldId id="269"/>
+            <p14:sldId id="277"/>
             <p14:sldId id="270"/>
           </p14:sldIdLst>
         </p14:section>
@@ -267,7 +269,7 @@
           <a:p>
             <a:fld id="{5AA8D5F7-D765-4A57-A816-DD68B8B3B493}" type="datetimeFigureOut">
               <a:rPr lang="pl-PL" smtClean="0"/>
-              <a:t>19.05.2015</a:t>
+              <a:t>20.05.2015</a:t>
             </a:fld>
             <a:endParaRPr lang="pl-PL"/>
           </a:p>
@@ -579,10 +581,6 @@
           <a:bodyPr/>
           <a:lstStyle/>
           <a:p>
-            <a:r>
-              <a:rPr lang="pl-PL" dirty="0" smtClean="0"/>
-              <a:t>Wycentrować kropki?</a:t>
-            </a:r>
             <a:endParaRPr lang="pl-PL" dirty="0"/>
           </a:p>
         </p:txBody>
@@ -696,7 +694,7 @@
           <a:p>
             <a:fld id="{98B85331-A752-4F9F-82CD-29A2C61C3C07}" type="slidenum">
               <a:rPr lang="pl-PL" smtClean="0"/>
-              <a:t>19</a:t>
+              <a:t>20</a:t>
             </a:fld>
             <a:endParaRPr lang="pl-PL"/>
           </a:p>
@@ -1245,26 +1243,21 @@
           <a:p>
             <a:r>
               <a:rPr lang="pl-PL" dirty="0" smtClean="0"/>
-              <a:t>Na razie http://www.secretgeek.net/image/function_v_imperative.PNG, http://www.programmingmath.com/blog/wp-content/uploads/2011/03/function-diagram.png do </a:t>
-            </a:r>
-            <a:r>
-              <a:rPr lang="pl-PL" dirty="0" err="1" smtClean="0"/>
-              <a:t>skonsyderowania</a:t>
+              <a:t>Na razie http://</a:t>
             </a:r>
             <a:r>
               <a:rPr lang="pl-PL" dirty="0" smtClean="0"/>
-              <a:t> przez</a:t>
-            </a:r>
-            <a:r>
-              <a:rPr lang="pl-PL" baseline="0" dirty="0" smtClean="0"/>
-              <a:t> Maję</a:t>
-            </a:r>
-            <a:endParaRPr lang="pl-PL" dirty="0" smtClean="0"/>
+              <a:t>www.secretgeek.net/image/function_v_imperative.PNG</a:t>
+            </a:r>
           </a:p>
           <a:p>
             <a:r>
               <a:rPr lang="pl-PL" dirty="0" smtClean="0"/>
-              <a:t>http://en.wikipedia.org/wiki/Subroutine</a:t>
+              <a:t>http</a:t>
+            </a:r>
+            <a:r>
+              <a:rPr lang="pl-PL" dirty="0" smtClean="0"/>
+              <a:t>://en.wikipedia.org/wiki/Subroutine</a:t>
             </a:r>
           </a:p>
           <a:p>
@@ -1526,7 +1519,7 @@
           <a:p>
             <a:fld id="{98B85331-A752-4F9F-82CD-29A2C61C3C07}" type="slidenum">
               <a:rPr lang="pl-PL" smtClean="0"/>
-              <a:t>16</a:t>
+              <a:t>17</a:t>
             </a:fld>
             <a:endParaRPr lang="pl-PL"/>
           </a:p>
@@ -1726,7 +1719,7 @@
           <a:p>
             <a:fld id="{34D6017F-CCF5-4515-BCFC-0E080B5EA1AB}" type="datetimeFigureOut">
               <a:rPr lang="pl-PL" smtClean="0"/>
-              <a:t>19.05.2015</a:t>
+              <a:t>20.05.2015</a:t>
             </a:fld>
             <a:endParaRPr lang="pl-PL"/>
           </a:p>
@@ -1896,7 +1889,7 @@
           <a:p>
             <a:fld id="{34D6017F-CCF5-4515-BCFC-0E080B5EA1AB}" type="datetimeFigureOut">
               <a:rPr lang="pl-PL" smtClean="0"/>
-              <a:t>19.05.2015</a:t>
+              <a:t>20.05.2015</a:t>
             </a:fld>
             <a:endParaRPr lang="pl-PL"/>
           </a:p>
@@ -2076,7 +2069,7 @@
           <a:p>
             <a:fld id="{34D6017F-CCF5-4515-BCFC-0E080B5EA1AB}" type="datetimeFigureOut">
               <a:rPr lang="pl-PL" smtClean="0"/>
-              <a:t>19.05.2015</a:t>
+              <a:t>20.05.2015</a:t>
             </a:fld>
             <a:endParaRPr lang="pl-PL"/>
           </a:p>
@@ -2246,7 +2239,7 @@
           <a:p>
             <a:fld id="{34D6017F-CCF5-4515-BCFC-0E080B5EA1AB}" type="datetimeFigureOut">
               <a:rPr lang="pl-PL" smtClean="0"/>
-              <a:t>19.05.2015</a:t>
+              <a:t>20.05.2015</a:t>
             </a:fld>
             <a:endParaRPr lang="pl-PL"/>
           </a:p>
@@ -2492,7 +2485,7 @@
           <a:p>
             <a:fld id="{34D6017F-CCF5-4515-BCFC-0E080B5EA1AB}" type="datetimeFigureOut">
               <a:rPr lang="pl-PL" smtClean="0"/>
-              <a:t>19.05.2015</a:t>
+              <a:t>20.05.2015</a:t>
             </a:fld>
             <a:endParaRPr lang="pl-PL"/>
           </a:p>
@@ -2780,7 +2773,7 @@
           <a:p>
             <a:fld id="{34D6017F-CCF5-4515-BCFC-0E080B5EA1AB}" type="datetimeFigureOut">
               <a:rPr lang="pl-PL" smtClean="0"/>
-              <a:t>19.05.2015</a:t>
+              <a:t>20.05.2015</a:t>
             </a:fld>
             <a:endParaRPr lang="pl-PL"/>
           </a:p>
@@ -3202,7 +3195,7 @@
           <a:p>
             <a:fld id="{34D6017F-CCF5-4515-BCFC-0E080B5EA1AB}" type="datetimeFigureOut">
               <a:rPr lang="pl-PL" smtClean="0"/>
-              <a:t>19.05.2015</a:t>
+              <a:t>20.05.2015</a:t>
             </a:fld>
             <a:endParaRPr lang="pl-PL"/>
           </a:p>
@@ -3320,7 +3313,7 @@
           <a:p>
             <a:fld id="{34D6017F-CCF5-4515-BCFC-0E080B5EA1AB}" type="datetimeFigureOut">
               <a:rPr lang="pl-PL" smtClean="0"/>
-              <a:t>19.05.2015</a:t>
+              <a:t>20.05.2015</a:t>
             </a:fld>
             <a:endParaRPr lang="pl-PL"/>
           </a:p>
@@ -3415,7 +3408,7 @@
           <a:p>
             <a:fld id="{34D6017F-CCF5-4515-BCFC-0E080B5EA1AB}" type="datetimeFigureOut">
               <a:rPr lang="pl-PL" smtClean="0"/>
-              <a:t>19.05.2015</a:t>
+              <a:t>20.05.2015</a:t>
             </a:fld>
             <a:endParaRPr lang="pl-PL"/>
           </a:p>
@@ -3692,7 +3685,7 @@
           <a:p>
             <a:fld id="{34D6017F-CCF5-4515-BCFC-0E080B5EA1AB}" type="datetimeFigureOut">
               <a:rPr lang="pl-PL" smtClean="0"/>
-              <a:t>19.05.2015</a:t>
+              <a:t>20.05.2015</a:t>
             </a:fld>
             <a:endParaRPr lang="pl-PL"/>
           </a:p>
@@ -3945,7 +3938,7 @@
           <a:p>
             <a:fld id="{34D6017F-CCF5-4515-BCFC-0E080B5EA1AB}" type="datetimeFigureOut">
               <a:rPr lang="pl-PL" smtClean="0"/>
-              <a:t>19.05.2015</a:t>
+              <a:t>20.05.2015</a:t>
             </a:fld>
             <a:endParaRPr lang="pl-PL"/>
           </a:p>
@@ -4161,7 +4154,7 @@
           <a:p>
             <a:fld id="{34D6017F-CCF5-4515-BCFC-0E080B5EA1AB}" type="datetimeFigureOut">
               <a:rPr lang="pl-PL" smtClean="0"/>
-              <a:t>19.05.2015</a:t>
+              <a:t>20.05.2015</a:t>
             </a:fld>
             <a:endParaRPr lang="pl-PL"/>
           </a:p>
@@ -4699,23 +4692,69 @@
           </a:bodyPr>
           <a:lstStyle/>
           <a:p>
-            <a:r>
-              <a:rPr lang="pl-PL" dirty="0" smtClean="0">
-                <a:solidFill>
-                  <a:srgbClr val="FFFFFF"/>
-                </a:solidFill>
-              </a:rPr>
-              <a:t>Zmienna to nazwane miejsce w pamięci o pewnej zawartości</a:t>
-            </a:r>
-          </a:p>
-          <a:p>
-            <a:r>
-              <a:rPr lang="pl-PL" dirty="0" smtClean="0">
-                <a:solidFill>
-                  <a:srgbClr val="FFFFFF"/>
-                </a:solidFill>
-              </a:rPr>
-              <a:t>Na przykład zmienna `zbigniew` może mieć wartość `6969`, a zmienna `</a:t>
+            <a:endParaRPr lang="pl-PL" dirty="0" smtClean="0">
+              <a:solidFill>
+                <a:srgbClr val="FFFFFF"/>
+              </a:solidFill>
+            </a:endParaRPr>
+          </a:p>
+          <a:p>
+            <a:r>
+              <a:rPr lang="pl-PL" dirty="0" smtClean="0">
+                <a:solidFill>
+                  <a:srgbClr val="FFFFFF"/>
+                </a:solidFill>
+              </a:rPr>
+              <a:t>Zmienna </a:t>
+            </a:r>
+            <a:r>
+              <a:rPr lang="pl-PL" dirty="0" smtClean="0">
+                <a:solidFill>
+                  <a:srgbClr val="FFFFFF"/>
+                </a:solidFill>
+              </a:rPr>
+              <a:t>to nazwane miejsce w pamięci o pewnej zawartości</a:t>
+            </a:r>
+          </a:p>
+          <a:p>
+            <a:endParaRPr lang="pl-PL" dirty="0" smtClean="0">
+              <a:solidFill>
+                <a:srgbClr val="FFFFFF"/>
+              </a:solidFill>
+            </a:endParaRPr>
+          </a:p>
+          <a:p>
+            <a:r>
+              <a:rPr lang="pl-PL" dirty="0" smtClean="0">
+                <a:solidFill>
+                  <a:srgbClr val="FFFFFF"/>
+                </a:solidFill>
+              </a:rPr>
+              <a:t>Na </a:t>
+            </a:r>
+            <a:r>
+              <a:rPr lang="pl-PL" dirty="0" smtClean="0">
+                <a:solidFill>
+                  <a:srgbClr val="FFFFFF"/>
+                </a:solidFill>
+              </a:rPr>
+              <a:t>przykład zmienna `zbigniew` może mieć wartość </a:t>
+            </a:r>
+            <a:r>
+              <a:rPr lang="pl-PL" dirty="0" smtClean="0">
+                <a:solidFill>
+                  <a:srgbClr val="FFFFFF"/>
+                </a:solidFill>
+              </a:rPr>
+              <a:t>`666`, </a:t>
+            </a:r>
+            <a:r>
+              <a:rPr lang="pl-PL" dirty="0" smtClean="0">
+                <a:solidFill>
+                  <a:srgbClr val="FFFFFF"/>
+                </a:solidFill>
+              </a:rPr>
+              <a:t>a zmienna `</a:t>
             </a:r>
             <a:r>
               <a:rPr lang="pl-PL" dirty="0" err="1" smtClean="0">
@@ -4823,7 +4862,7 @@
                   <a:srgbClr val="FFFFFF"/>
                 </a:solidFill>
               </a:rPr>
-              <a:t>JavaSctipt’cie</a:t>
+              <a:t>JavaScript’cie</a:t>
             </a:r>
             <a:endParaRPr lang="pl-PL" dirty="0">
               <a:solidFill>
@@ -4848,13 +4887,28 @@
           <a:bodyPr/>
           <a:lstStyle/>
           <a:p>
-            <a:r>
-              <a:rPr lang="pl-PL" dirty="0" smtClean="0">
-                <a:solidFill>
-                  <a:srgbClr val="FFFFFF"/>
-                </a:solidFill>
-              </a:rPr>
-              <a:t>Zmienne w </a:t>
+            <a:endParaRPr lang="pl-PL" dirty="0" smtClean="0">
+              <a:solidFill>
+                <a:srgbClr val="FFFFFF"/>
+              </a:solidFill>
+            </a:endParaRPr>
+          </a:p>
+          <a:p>
+            <a:r>
+              <a:rPr lang="pl-PL" dirty="0" smtClean="0">
+                <a:solidFill>
+                  <a:srgbClr val="FFFFFF"/>
+                </a:solidFill>
+              </a:rPr>
+              <a:t>Zmienne </a:t>
+            </a:r>
+            <a:r>
+              <a:rPr lang="pl-PL" dirty="0" smtClean="0">
+                <a:solidFill>
+                  <a:srgbClr val="FFFFFF"/>
+                </a:solidFill>
+              </a:rPr>
+              <a:t>w </a:t>
             </a:r>
             <a:r>
               <a:rPr lang="pl-PL" dirty="0" err="1" smtClean="0">
@@ -4870,7 +4924,23 @@
                   <a:srgbClr val="FFFFFF"/>
                 </a:solidFill>
               </a:rPr>
-              <a:t> nie mają stałego typu, więc `zbigniew` może mieć wartość `6969`, a potem </a:t>
+              <a:t> nie mają stałego typu, więc `zbigniew` może mieć wartość </a:t>
+            </a:r>
+            <a:r>
+              <a:rPr lang="pl-PL" dirty="0" smtClean="0">
+                <a:solidFill>
+                  <a:srgbClr val="FFFFFF"/>
+                </a:solidFill>
+              </a:rPr>
+              <a:t>`666`, </a:t>
+            </a:r>
+            <a:r>
+              <a:rPr lang="pl-PL" dirty="0" smtClean="0">
+                <a:solidFill>
+                  <a:srgbClr val="FFFFFF"/>
+                </a:solidFill>
+              </a:rPr>
+              <a:t>a potem </a:t>
             </a:r>
             <a:r>
               <a:rPr lang="pl-PL" dirty="0">
@@ -4895,13 +4965,28 @@
             </a:endParaRPr>
           </a:p>
           <a:p>
-            <a:r>
-              <a:rPr lang="pl-PL" dirty="0" smtClean="0">
-                <a:solidFill>
-                  <a:srgbClr val="FFFFFF"/>
-                </a:solidFill>
-              </a:rPr>
-              <a:t>Nieprzypisane zmienne mają wartość `</a:t>
+            <a:endParaRPr lang="pl-PL" dirty="0" smtClean="0">
+              <a:solidFill>
+                <a:srgbClr val="FFFFFF"/>
+              </a:solidFill>
+            </a:endParaRPr>
+          </a:p>
+          <a:p>
+            <a:r>
+              <a:rPr lang="pl-PL" dirty="0" smtClean="0">
+                <a:solidFill>
+                  <a:srgbClr val="FFFFFF"/>
+                </a:solidFill>
+              </a:rPr>
+              <a:t>Nieprzypisane </a:t>
+            </a:r>
+            <a:r>
+              <a:rPr lang="pl-PL" dirty="0" smtClean="0">
+                <a:solidFill>
+                  <a:srgbClr val="FFFFFF"/>
+                </a:solidFill>
+              </a:rPr>
+              <a:t>zmienne mają wartość `</a:t>
             </a:r>
             <a:r>
               <a:rPr lang="pl-PL" dirty="0" err="1" smtClean="0">
@@ -5034,26 +5119,59 @@
         </p:nvSpPr>
         <p:spPr/>
         <p:txBody>
-          <a:bodyPr/>
-          <a:lstStyle/>
-          <a:p>
-            <a:r>
-              <a:rPr lang="pl-PL" dirty="0" smtClean="0">
-                <a:solidFill>
-                  <a:srgbClr val="FFFFFF"/>
-                </a:solidFill>
-              </a:rPr>
-              <a:t>Dopóki nie wykorzystuje się nieistniejących jej właściwości, nie ma znaczenia jakiego obecnie typu jest zmienna</a:t>
-            </a:r>
-          </a:p>
-          <a:p>
-            <a:r>
-              <a:rPr lang="pl-PL" dirty="0" smtClean="0">
-                <a:solidFill>
-                  <a:srgbClr val="FFFFFF"/>
-                </a:solidFill>
-              </a:rPr>
-              <a:t>Na przykład, nawet jeśli `człowiek` i `kaczka` są całkowicie innymi typami, a oba mają właściwość `zbigniew`, dopóki używa się tylko `</a:t>
+          <a:bodyPr>
+            <a:normAutofit lnSpcReduction="10000"/>
+          </a:bodyPr>
+          <a:lstStyle/>
+          <a:p>
+            <a:r>
+              <a:rPr lang="pl-PL" dirty="0" smtClean="0">
+                <a:solidFill>
+                  <a:srgbClr val="FFFFFF"/>
+                </a:solidFill>
+              </a:rPr>
+              <a:t>Dopóki nie wykorzystuje się nieistniejących jej właściwości, nie ma znaczenia jakiego obecnie </a:t>
+            </a:r>
+            <a:r>
+              <a:rPr lang="pl-PL" dirty="0" smtClean="0">
+                <a:solidFill>
+                  <a:srgbClr val="FFFFFF"/>
+                </a:solidFill>
+              </a:rPr>
+              <a:t>typu </a:t>
+            </a:r>
+            <a:r>
+              <a:rPr lang="pl-PL" dirty="0" smtClean="0">
+                <a:solidFill>
+                  <a:srgbClr val="FFFFFF"/>
+                </a:solidFill>
+              </a:rPr>
+              <a:t>jest zmienna</a:t>
+            </a:r>
+          </a:p>
+          <a:p>
+            <a:endParaRPr lang="pl-PL" dirty="0" smtClean="0">
+              <a:solidFill>
+                <a:srgbClr val="FFFFFF"/>
+              </a:solidFill>
+            </a:endParaRPr>
+          </a:p>
+          <a:p>
+            <a:r>
+              <a:rPr lang="pl-PL" dirty="0" smtClean="0">
+                <a:solidFill>
+                  <a:srgbClr val="FFFFFF"/>
+                </a:solidFill>
+              </a:rPr>
+              <a:t>Na </a:t>
+            </a:r>
+            <a:r>
+              <a:rPr lang="pl-PL" dirty="0" smtClean="0">
+                <a:solidFill>
+                  <a:srgbClr val="FFFFFF"/>
+                </a:solidFill>
+              </a:rPr>
+              <a:t>przykład, nawet jeśli `człowiek` i `kaczka` są całkowicie innymi typami, a oba mają właściwość `zbigniew`, dopóki używa się tylko `</a:t>
             </a:r>
             <a:r>
               <a:rPr lang="pl-PL" dirty="0" err="1" smtClean="0">
@@ -5297,38 +5415,68 @@
         </p:nvSpPr>
         <p:spPr/>
         <p:txBody>
-          <a:bodyPr/>
-          <a:lstStyle/>
-          <a:p>
-            <a:r>
-              <a:rPr lang="pl-PL" dirty="0" smtClean="0">
-                <a:solidFill>
-                  <a:srgbClr val="FFFFFF"/>
-                </a:solidFill>
-              </a:rPr>
-              <a:t>Funkcja to zgrupowana ponownie używalna sekwencja poleceń</a:t>
-            </a:r>
-          </a:p>
-          <a:p>
-            <a:r>
-              <a:rPr lang="pl-PL" dirty="0" smtClean="0">
-                <a:solidFill>
-                  <a:srgbClr val="FFFFFF"/>
-                </a:solidFill>
-              </a:rPr>
-              <a:t>Tak jak w matematyce, funkcje wywołuje się nawiasami okrągłymi '(' i ')‚</a:t>
-            </a:r>
-          </a:p>
-          <a:p>
-            <a:r>
-              <a:rPr lang="pl-PL" dirty="0" smtClean="0">
-                <a:solidFill>
-                  <a:srgbClr val="FFFFFF"/>
-                </a:solidFill>
-              </a:rPr>
-              <a:t>Na przykład funkcja `zbigniew` może zawierać w sobie (zastępować) polecenia: zamknij rękę, wyprostuj palec, podejdź do Łucji, żgnij Łucję</a:t>
-            </a:r>
-            <a:endParaRPr lang="pl-PL" dirty="0">
+          <a:bodyPr>
+            <a:normAutofit/>
+          </a:bodyPr>
+          <a:lstStyle/>
+          <a:p>
+            <a:endParaRPr lang="pl-PL" dirty="0" smtClean="0">
+              <a:solidFill>
+                <a:srgbClr val="FFFFFF"/>
+              </a:solidFill>
+            </a:endParaRPr>
+          </a:p>
+          <a:p>
+            <a:r>
+              <a:rPr lang="pl-PL" dirty="0" smtClean="0">
+                <a:solidFill>
+                  <a:srgbClr val="FFFFFF"/>
+                </a:solidFill>
+              </a:rPr>
+              <a:t>Funkcja </a:t>
+            </a:r>
+            <a:r>
+              <a:rPr lang="pl-PL" dirty="0" smtClean="0">
+                <a:solidFill>
+                  <a:srgbClr val="FFFFFF"/>
+                </a:solidFill>
+              </a:rPr>
+              <a:t>to zgrupowana ponownie używalna sekwencja poleceń</a:t>
+            </a:r>
+          </a:p>
+          <a:p>
+            <a:endParaRPr lang="pl-PL" dirty="0" smtClean="0">
+              <a:solidFill>
+                <a:srgbClr val="FFFFFF"/>
+              </a:solidFill>
+            </a:endParaRPr>
+          </a:p>
+          <a:p>
+            <a:r>
+              <a:rPr lang="pl-PL" dirty="0" smtClean="0">
+                <a:solidFill>
+                  <a:srgbClr val="FFFFFF"/>
+                </a:solidFill>
+              </a:rPr>
+              <a:t>Tak </a:t>
+            </a:r>
+            <a:r>
+              <a:rPr lang="pl-PL" dirty="0" smtClean="0">
+                <a:solidFill>
+                  <a:srgbClr val="FFFFFF"/>
+                </a:solidFill>
+              </a:rPr>
+              <a:t>jak w matematyce, funkcje wywołuje się nawiasami okrągłymi '(' i </a:t>
+            </a:r>
+            <a:r>
+              <a:rPr lang="pl-PL" dirty="0" smtClean="0">
+                <a:solidFill>
+                  <a:srgbClr val="FFFFFF"/>
+                </a:solidFill>
+              </a:rPr>
+              <a:t>')‚</a:t>
+            </a:r>
+            <a:endParaRPr lang="pl-PL" dirty="0" smtClean="0">
               <a:solidFill>
                 <a:srgbClr val="FFFFFF"/>
               </a:solidFill>
@@ -5389,59 +5537,46 @@
           <a:lstStyle/>
           <a:p>
             <a:r>
-              <a:rPr lang="pl-PL" dirty="0" smtClean="0">
-                <a:solidFill>
-                  <a:srgbClr val="FFFFFF"/>
-                </a:solidFill>
-              </a:rPr>
-              <a:t>Funkcje w </a:t>
-            </a:r>
-            <a:r>
-              <a:rPr lang="pl-PL" dirty="0" err="1" smtClean="0">
-                <a:solidFill>
-                  <a:srgbClr val="FFFFFF"/>
-                </a:solidFill>
-              </a:rPr>
-              <a:t>JavaScript’cie</a:t>
-            </a:r>
-            <a:endParaRPr lang="pl-PL" dirty="0">
+              <a:rPr lang="pl-PL" dirty="0">
+                <a:solidFill>
+                  <a:srgbClr val="FFFFFF"/>
+                </a:solidFill>
+              </a:rPr>
+              <a:t>Funkcje ogólnie</a:t>
+            </a:r>
+            <a:endParaRPr lang="pl-PL" dirty="0"/>
+          </a:p>
+        </p:txBody>
+      </p:sp>
+      <p:sp>
+        <p:nvSpPr>
+          <p:cNvPr id="3" name="Symbol zastępczy zawartości 2"/>
+          <p:cNvSpPr>
+            <a:spLocks noGrp="1"/>
+          </p:cNvSpPr>
+          <p:nvPr>
+            <p:ph idx="1"/>
+          </p:nvPr>
+        </p:nvSpPr>
+        <p:spPr/>
+        <p:txBody>
+          <a:bodyPr/>
+          <a:lstStyle/>
+          <a:p>
+            <a:endParaRPr lang="pl-PL" dirty="0" smtClean="0">
               <a:solidFill>
                 <a:srgbClr val="FFFFFF"/>
               </a:solidFill>
             </a:endParaRPr>
           </a:p>
-        </p:txBody>
-      </p:sp>
-      <p:sp>
-        <p:nvSpPr>
-          <p:cNvPr id="3" name="Symbol zastępczy zawartości 2"/>
-          <p:cNvSpPr>
-            <a:spLocks noGrp="1"/>
-          </p:cNvSpPr>
-          <p:nvPr>
-            <p:ph idx="1"/>
-          </p:nvPr>
-        </p:nvSpPr>
-        <p:spPr/>
-        <p:txBody>
-          <a:bodyPr/>
-          <a:lstStyle/>
-          <a:p>
-            <a:r>
-              <a:rPr lang="pl-PL" dirty="0" smtClean="0">
-                <a:solidFill>
-                  <a:srgbClr val="FFFFFF"/>
-                </a:solidFill>
-              </a:rPr>
-              <a:t>Funkcje w </a:t>
-            </a:r>
-            <a:r>
-              <a:rPr lang="pl-PL" dirty="0" err="1" smtClean="0">
-                <a:solidFill>
-                  <a:srgbClr val="FFFFFF"/>
-                </a:solidFill>
-              </a:rPr>
-              <a:t>JS’ie</a:t>
+          <a:p>
+            <a:r>
+              <a:rPr lang="pl-PL" dirty="0" smtClean="0">
+                <a:solidFill>
+                  <a:srgbClr val="FFFFFF"/>
+                </a:solidFill>
+              </a:rPr>
+              <a:t>Na </a:t>
             </a:r>
             <a:r>
               <a:rPr lang="pl-PL" dirty="0">
@@ -5449,15 +5584,60 @@
                   <a:srgbClr val="FFFFFF"/>
                 </a:solidFill>
               </a:rPr>
+              <a:t>przykład funkcja `</a:t>
+            </a:r>
+            <a:r>
+              <a:rPr lang="pl-PL" dirty="0" err="1">
+                <a:solidFill>
+                  <a:srgbClr val="FFFFFF"/>
+                </a:solidFill>
+              </a:rPr>
+              <a:t>zbigniew</a:t>
+            </a:r>
+            <a:r>
+              <a:rPr lang="pl-PL" dirty="0">
+                <a:solidFill>
+                  <a:srgbClr val="FFFFFF"/>
+                </a:solidFill>
+              </a:rPr>
+              <a:t>` może zawierać w sobie (zastępować) polecenia: zamknij rękę, wyprostuj palec, podejdź do Łucji, żgnij Łucję</a:t>
+            </a:r>
+          </a:p>
+          <a:p>
+            <a:endParaRPr lang="pl-PL" dirty="0" smtClean="0"/>
+          </a:p>
+          <a:p>
+            <a:r>
+              <a:rPr lang="pl-PL" dirty="0">
+                <a:solidFill>
+                  <a:srgbClr val="FFFFFF"/>
+                </a:solidFill>
+              </a:rPr>
+              <a:t>Funkcje mogą być przypisywane do zmiennych, np `</a:t>
+            </a:r>
+            <a:r>
+              <a:rPr lang="pl-PL" dirty="0" err="1">
+                <a:solidFill>
+                  <a:srgbClr val="FFFFFF"/>
+                </a:solidFill>
+              </a:rPr>
+              <a:t>var</a:t>
+            </a:r>
+            <a:r>
+              <a:rPr lang="pl-PL" dirty="0">
+                <a:solidFill>
+                  <a:srgbClr val="FFFFFF"/>
+                </a:solidFill>
+              </a:rPr>
               <a:t> </a:t>
             </a:r>
             <a:r>
-              <a:rPr lang="pl-PL" dirty="0" smtClean="0">
-                <a:solidFill>
-                  <a:srgbClr val="FFFFFF"/>
-                </a:solidFill>
-              </a:rPr>
-              <a:t>mogą</a:t>
+              <a:rPr lang="pl-PL" dirty="0" err="1">
+                <a:solidFill>
+                  <a:srgbClr val="FFFFFF"/>
+                </a:solidFill>
+              </a:rPr>
+              <a:t>zbigniew</a:t>
             </a:r>
             <a:r>
               <a:rPr lang="pl-PL" dirty="0">
@@ -5465,86 +5645,10 @@
                   <a:srgbClr val="FFFFFF"/>
                 </a:solidFill>
               </a:rPr>
-              <a:t> , lecz nie muszą</a:t>
-            </a:r>
-            <a:r>
-              <a:rPr lang="pl-PL" dirty="0" smtClean="0">
-                <a:solidFill>
-                  <a:srgbClr val="FFFFFF"/>
-                </a:solidFill>
-              </a:rPr>
-              <a:t> brać argumentów, np. `żgnij(kogo)`</a:t>
-            </a:r>
-          </a:p>
-          <a:p>
-            <a:r>
-              <a:rPr lang="pl-PL" dirty="0" smtClean="0">
-                <a:solidFill>
-                  <a:srgbClr val="FFFFFF"/>
-                </a:solidFill>
-              </a:rPr>
-              <a:t>Funkcje w </a:t>
-            </a:r>
-            <a:r>
-              <a:rPr lang="pl-PL" dirty="0" err="1" smtClean="0">
-                <a:solidFill>
-                  <a:srgbClr val="FFFFFF"/>
-                </a:solidFill>
-              </a:rPr>
-              <a:t>JS’ie</a:t>
-            </a:r>
-            <a:r>
-              <a:rPr lang="pl-PL" dirty="0" smtClean="0">
-                <a:solidFill>
-                  <a:srgbClr val="FFFFFF"/>
-                </a:solidFill>
-              </a:rPr>
-              <a:t> mogą, lecz nie muszą zwracać wartości, tak jak np. `sin(x)`</a:t>
-            </a:r>
-          </a:p>
-          <a:p>
-            <a:r>
-              <a:rPr lang="pl-PL" dirty="0" smtClean="0">
-                <a:solidFill>
-                  <a:srgbClr val="FFFFFF"/>
-                </a:solidFill>
-              </a:rPr>
-              <a:t>Funkcje mogą być przypisywane do zmiennych, np `</a:t>
-            </a:r>
-            <a:r>
-              <a:rPr lang="pl-PL" dirty="0" err="1" smtClean="0">
-                <a:solidFill>
-                  <a:srgbClr val="FFFFFF"/>
-                </a:solidFill>
-              </a:rPr>
-              <a:t>var</a:t>
-            </a:r>
-            <a:r>
-              <a:rPr lang="pl-PL" dirty="0" smtClean="0">
-                <a:solidFill>
-                  <a:srgbClr val="FFFFFF"/>
-                </a:solidFill>
-              </a:rPr>
-              <a:t> </a:t>
-            </a:r>
-            <a:r>
-              <a:rPr lang="pl-PL" dirty="0" err="1" smtClean="0">
-                <a:solidFill>
-                  <a:srgbClr val="FFFFFF"/>
-                </a:solidFill>
-              </a:rPr>
-              <a:t>zbigniew</a:t>
-            </a:r>
-            <a:r>
-              <a:rPr lang="pl-PL" dirty="0" smtClean="0">
-                <a:solidFill>
-                  <a:srgbClr val="FFFFFF"/>
-                </a:solidFill>
-              </a:rPr>
               <a:t> = </a:t>
             </a:r>
             <a:r>
-              <a:rPr lang="pl-PL" dirty="0" err="1" smtClean="0">
+              <a:rPr lang="pl-PL" dirty="0" err="1">
                 <a:solidFill>
                   <a:srgbClr val="FFFFFF"/>
                 </a:solidFill>
@@ -5552,25 +5656,23 @@
               <a:t>niedorzecznie_długa_nazwa_funkcji</a:t>
             </a:r>
             <a:r>
-              <a:rPr lang="pl-PL" dirty="0" smtClean="0">
+              <a:rPr lang="pl-PL" dirty="0">
                 <a:solidFill>
                   <a:srgbClr val="FFFFFF"/>
                 </a:solidFill>
               </a:rPr>
               <a:t>`</a:t>
             </a:r>
-            <a:endParaRPr lang="pl-PL" dirty="0">
-              <a:solidFill>
-                <a:srgbClr val="FFFFFF"/>
-              </a:solidFill>
-            </a:endParaRPr>
+          </a:p>
+          <a:p>
+            <a:endParaRPr lang="pl-PL" dirty="0"/>
           </a:p>
         </p:txBody>
       </p:sp>
     </p:spTree>
     <p:extLst>
       <p:ext uri="{BB962C8B-B14F-4D97-AF65-F5344CB8AC3E}">
-        <p14:creationId xmlns:p14="http://schemas.microsoft.com/office/powerpoint/2010/main" val="3795016863"/>
+        <p14:creationId xmlns:p14="http://schemas.microsoft.com/office/powerpoint/2010/main" val="1682513767"/>
       </p:ext>
     </p:extLst>
   </p:cSld>
@@ -5606,7 +5708,7 @@
       </p:grpSpPr>
       <p:sp>
         <p:nvSpPr>
-          <p:cNvPr id="4" name="Tytuł 3"/>
+          <p:cNvPr id="2" name="Tytuł 1"/>
           <p:cNvSpPr>
             <a:spLocks noGrp="1"/>
           </p:cNvSpPr>
@@ -5625,7 +5727,15 @@
                   <a:srgbClr val="FFFFFF"/>
                 </a:solidFill>
               </a:rPr>
-              <a:t>Zdarzenia, czyli co się tu dzieje?</a:t>
+              <a:t>Funkcje w </a:t>
+            </a:r>
+            <a:r>
+              <a:rPr lang="pl-PL" dirty="0" err="1" smtClean="0">
+                <a:solidFill>
+                  <a:srgbClr val="FFFFFF"/>
+                </a:solidFill>
+              </a:rPr>
+              <a:t>JavaScript’cie</a:t>
             </a:r>
             <a:endParaRPr lang="pl-PL" dirty="0">
               <a:solidFill>
@@ -5635,66 +5745,155 @@
           </a:p>
         </p:txBody>
       </p:sp>
-      <p:pic>
-        <p:nvPicPr>
-          <p:cNvPr id="8" name="Symbol zastępczy obrazu 7"/>
-          <p:cNvPicPr>
-            <a:picLocks noGrp="1" noChangeAspect="1"/>
-          </p:cNvPicPr>
-          <p:nvPr>
-            <p:ph type="pic" idx="1"/>
-          </p:nvPr>
-        </p:nvPicPr>
-        <p:blipFill>
-          <a:blip r:embed="rId3">
-            <a:extLst>
-              <a:ext uri="{28A0092B-C50C-407E-A947-70E740481C1C}">
-                <a14:useLocalDpi xmlns:a14="http://schemas.microsoft.com/office/drawing/2010/main" val="0"/>
-              </a:ext>
-            </a:extLst>
-          </a:blip>
-          <a:srcRect/>
-          <a:stretch>
-            <a:fillRect/>
-          </a:stretch>
-        </p:blipFill>
-        <p:spPr/>
-      </p:pic>
-      <p:sp>
-        <p:nvSpPr>
-          <p:cNvPr id="6" name="Symbol zastępczy tekstu 5"/>
-          <p:cNvSpPr>
-            <a:spLocks noGrp="1"/>
-          </p:cNvSpPr>
-          <p:nvPr>
-            <p:ph type="body" sz="half" idx="2"/>
-          </p:nvPr>
-        </p:nvSpPr>
-        <p:spPr/>
-        <p:txBody>
-          <a:bodyPr/>
-          <a:lstStyle/>
-          <a:p>
-            <a:r>
-              <a:rPr lang="pl-PL" dirty="0" smtClean="0">
-                <a:solidFill>
-                  <a:srgbClr val="FFFFFF"/>
-                </a:solidFill>
-              </a:rPr>
-              <a:t>Zdarzenie – akcja lub wydarzenie wykryte przez program mogące zostać przez niego obsłużone</a:t>
-            </a:r>
+      <p:sp>
+        <p:nvSpPr>
+          <p:cNvPr id="3" name="Symbol zastępczy zawartości 2"/>
+          <p:cNvSpPr>
+            <a:spLocks noGrp="1"/>
+          </p:cNvSpPr>
+          <p:nvPr>
+            <p:ph idx="1"/>
+          </p:nvPr>
+        </p:nvSpPr>
+        <p:spPr/>
+        <p:txBody>
+          <a:bodyPr/>
+          <a:lstStyle/>
+          <a:p>
+            <a:pPr marL="0" indent="0">
+              <a:buNone/>
+            </a:pPr>
             <a:endParaRPr lang="pl-PL" dirty="0">
               <a:solidFill>
                 <a:srgbClr val="FFFFFF"/>
               </a:solidFill>
             </a:endParaRPr>
           </a:p>
+          <a:p>
+            <a:r>
+              <a:rPr lang="pl-PL" dirty="0" smtClean="0">
+                <a:solidFill>
+                  <a:srgbClr val="FFFFFF"/>
+                </a:solidFill>
+              </a:rPr>
+              <a:t>Funkcje </a:t>
+            </a:r>
+            <a:r>
+              <a:rPr lang="pl-PL" dirty="0" smtClean="0">
+                <a:solidFill>
+                  <a:srgbClr val="FFFFFF"/>
+                </a:solidFill>
+              </a:rPr>
+              <a:t>w </a:t>
+            </a:r>
+            <a:r>
+              <a:rPr lang="pl-PL" dirty="0" err="1" smtClean="0">
+                <a:solidFill>
+                  <a:srgbClr val="FFFFFF"/>
+                </a:solidFill>
+              </a:rPr>
+              <a:t>JS’ie</a:t>
+            </a:r>
+            <a:r>
+              <a:rPr lang="pl-PL" dirty="0">
+                <a:solidFill>
+                  <a:srgbClr val="FFFFFF"/>
+                </a:solidFill>
+              </a:rPr>
+              <a:t> </a:t>
+            </a:r>
+            <a:r>
+              <a:rPr lang="pl-PL" dirty="0" smtClean="0">
+                <a:solidFill>
+                  <a:srgbClr val="FFFFFF"/>
+                </a:solidFill>
+              </a:rPr>
+              <a:t>mogą</a:t>
+            </a:r>
+            <a:r>
+              <a:rPr lang="pl-PL" dirty="0">
+                <a:solidFill>
+                  <a:srgbClr val="FFFFFF"/>
+                </a:solidFill>
+              </a:rPr>
+              <a:t> , lecz nie muszą</a:t>
+            </a:r>
+            <a:r>
+              <a:rPr lang="pl-PL" dirty="0" smtClean="0">
+                <a:solidFill>
+                  <a:srgbClr val="FFFFFF"/>
+                </a:solidFill>
+              </a:rPr>
+              <a:t> brać argumentów, np. `żgnij(kogo)`</a:t>
+            </a:r>
+          </a:p>
+          <a:p>
+            <a:endParaRPr lang="pl-PL" dirty="0" smtClean="0">
+              <a:solidFill>
+                <a:srgbClr val="FFFFFF"/>
+              </a:solidFill>
+            </a:endParaRPr>
+          </a:p>
+          <a:p>
+            <a:endParaRPr lang="pl-PL" dirty="0" smtClean="0">
+              <a:solidFill>
+                <a:srgbClr val="FFFFFF"/>
+              </a:solidFill>
+            </a:endParaRPr>
+          </a:p>
+          <a:p>
+            <a:r>
+              <a:rPr lang="pl-PL" dirty="0" smtClean="0">
+                <a:solidFill>
+                  <a:srgbClr val="FFFFFF"/>
+                </a:solidFill>
+              </a:rPr>
+              <a:t>Funkcje </a:t>
+            </a:r>
+            <a:r>
+              <a:rPr lang="pl-PL" dirty="0" smtClean="0">
+                <a:solidFill>
+                  <a:srgbClr val="FFFFFF"/>
+                </a:solidFill>
+              </a:rPr>
+              <a:t>w </a:t>
+            </a:r>
+            <a:r>
+              <a:rPr lang="pl-PL" dirty="0" err="1" smtClean="0">
+                <a:solidFill>
+                  <a:srgbClr val="FFFFFF"/>
+                </a:solidFill>
+              </a:rPr>
+              <a:t>JS’ie</a:t>
+            </a:r>
+            <a:r>
+              <a:rPr lang="pl-PL" dirty="0" smtClean="0">
+                <a:solidFill>
+                  <a:srgbClr val="FFFFFF"/>
+                </a:solidFill>
+              </a:rPr>
+              <a:t> mogą, lecz nie muszą zwracać wartości, tak jak np. `sin(x</a:t>
+            </a:r>
+            <a:r>
+              <a:rPr lang="pl-PL" dirty="0" smtClean="0">
+                <a:solidFill>
+                  <a:srgbClr val="FFFFFF"/>
+                </a:solidFill>
+              </a:rPr>
+              <a:t>)`</a:t>
+            </a:r>
+            <a:endParaRPr lang="pl-PL" dirty="0" smtClean="0">
+              <a:solidFill>
+                <a:srgbClr val="FFFFFF"/>
+              </a:solidFill>
+            </a:endParaRPr>
+          </a:p>
         </p:txBody>
       </p:sp>
     </p:spTree>
     <p:extLst>
       <p:ext uri="{BB962C8B-B14F-4D97-AF65-F5344CB8AC3E}">
-        <p14:creationId xmlns:p14="http://schemas.microsoft.com/office/powerpoint/2010/main" val="1344694799"/>
+        <p14:creationId xmlns:p14="http://schemas.microsoft.com/office/powerpoint/2010/main" val="3795016863"/>
       </p:ext>
     </p:extLst>
   </p:cSld>
@@ -5730,7 +5929,7 @@
       </p:grpSpPr>
       <p:sp>
         <p:nvSpPr>
-          <p:cNvPr id="5" name="Tytuł 4"/>
+          <p:cNvPr id="4" name="Tytuł 3"/>
           <p:cNvSpPr>
             <a:spLocks noGrp="1"/>
           </p:cNvSpPr>
@@ -5749,67 +5948,7 @@
                   <a:srgbClr val="FFFFFF"/>
                 </a:solidFill>
               </a:rPr>
-              <a:t>Zdarzenia</a:t>
-            </a:r>
-            <a:r>
-              <a:rPr lang="pl-PL" sz="2000" dirty="0" smtClean="0">
-                <a:solidFill>
-                  <a:srgbClr val="FFFFFF"/>
-                </a:solidFill>
-              </a:rPr>
-              <a:t>[</a:t>
-            </a:r>
-            <a:r>
-              <a:rPr lang="pl-PL" sz="2000" dirty="0" err="1" smtClean="0">
-                <a:solidFill>
-                  <a:srgbClr val="FFFFFF"/>
-                </a:solidFill>
-              </a:rPr>
-              <a:t>wah</a:t>
-            </a:r>
-            <a:r>
-              <a:rPr lang="pl-PL" sz="2000" dirty="0">
-                <a:solidFill>
-                  <a:srgbClr val="FFFFFF"/>
-                </a:solidFill>
-              </a:rPr>
-              <a:t>]</a:t>
-            </a:r>
-          </a:p>
-        </p:txBody>
-      </p:sp>
-      <p:sp>
-        <p:nvSpPr>
-          <p:cNvPr id="6" name="Symbol zastępczy zawartości 5"/>
-          <p:cNvSpPr>
-            <a:spLocks noGrp="1"/>
-          </p:cNvSpPr>
-          <p:nvPr>
-            <p:ph idx="1"/>
-          </p:nvPr>
-        </p:nvSpPr>
-        <p:spPr/>
-        <p:txBody>
-          <a:bodyPr/>
-          <a:lstStyle/>
-          <a:p>
-            <a:r>
-              <a:rPr lang="pl-PL" dirty="0" smtClean="0">
-                <a:solidFill>
-                  <a:srgbClr val="FFFFFF"/>
-                </a:solidFill>
-              </a:rPr>
-              <a:t>Jako, że HTML, a w konsekwencji również i JS radzi sobie z użytkownikami ludzkimi, nie wszystko dzieje się synchronicznie</a:t>
-            </a:r>
-          </a:p>
-          <a:p>
-            <a:r>
-              <a:rPr lang="pl-PL" dirty="0" smtClean="0">
-                <a:solidFill>
-                  <a:srgbClr val="FFFFFF"/>
-                </a:solidFill>
-              </a:rPr>
-              <a:t>Zachodzi wobec czego czasami potrzeba zareagowania na, np, kliknięcie przycisku</a:t>
+              <a:t>Zdarzenia, czyli co się tu dzieje?</a:t>
             </a:r>
             <a:endParaRPr lang="pl-PL" dirty="0">
               <a:solidFill>
@@ -5819,10 +5958,66 @@
           </a:p>
         </p:txBody>
       </p:sp>
+      <p:pic>
+        <p:nvPicPr>
+          <p:cNvPr id="8" name="Symbol zastępczy obrazu 7"/>
+          <p:cNvPicPr>
+            <a:picLocks noGrp="1" noChangeAspect="1"/>
+          </p:cNvPicPr>
+          <p:nvPr>
+            <p:ph type="pic" idx="1"/>
+          </p:nvPr>
+        </p:nvPicPr>
+        <p:blipFill>
+          <a:blip r:embed="rId3">
+            <a:extLst>
+              <a:ext uri="{28A0092B-C50C-407E-A947-70E740481C1C}">
+                <a14:useLocalDpi xmlns:a14="http://schemas.microsoft.com/office/drawing/2010/main" val="0"/>
+              </a:ext>
+            </a:extLst>
+          </a:blip>
+          <a:srcRect/>
+          <a:stretch>
+            <a:fillRect/>
+          </a:stretch>
+        </p:blipFill>
+        <p:spPr/>
+      </p:pic>
+      <p:sp>
+        <p:nvSpPr>
+          <p:cNvPr id="6" name="Symbol zastępczy tekstu 5"/>
+          <p:cNvSpPr>
+            <a:spLocks noGrp="1"/>
+          </p:cNvSpPr>
+          <p:nvPr>
+            <p:ph type="body" sz="half" idx="2"/>
+          </p:nvPr>
+        </p:nvSpPr>
+        <p:spPr/>
+        <p:txBody>
+          <a:bodyPr/>
+          <a:lstStyle/>
+          <a:p>
+            <a:r>
+              <a:rPr lang="pl-PL" dirty="0" smtClean="0">
+                <a:solidFill>
+                  <a:srgbClr val="FFFFFF"/>
+                </a:solidFill>
+              </a:rPr>
+              <a:t>Zdarzenie – akcja lub wydarzenie wykryte przez program mogące zostać przez niego obsłużone</a:t>
+            </a:r>
+            <a:endParaRPr lang="pl-PL" dirty="0">
+              <a:solidFill>
+                <a:srgbClr val="FFFFFF"/>
+              </a:solidFill>
+            </a:endParaRPr>
+          </a:p>
+        </p:txBody>
+      </p:sp>
     </p:spTree>
     <p:extLst>
       <p:ext uri="{BB962C8B-B14F-4D97-AF65-F5344CB8AC3E}">
-        <p14:creationId xmlns:p14="http://schemas.microsoft.com/office/powerpoint/2010/main" val="2236007757"/>
+        <p14:creationId xmlns:p14="http://schemas.microsoft.com/office/powerpoint/2010/main" val="1344694799"/>
       </p:ext>
     </p:extLst>
   </p:cSld>
@@ -5858,7 +6053,7 @@
       </p:grpSpPr>
       <p:sp>
         <p:nvSpPr>
-          <p:cNvPr id="2" name="Tytuł 1"/>
+          <p:cNvPr id="5" name="Tytuł 4"/>
           <p:cNvSpPr>
             <a:spLocks noGrp="1"/>
           </p:cNvSpPr>
@@ -5872,44 +6067,24 @@
           <a:lstStyle/>
           <a:p>
             <a:r>
-              <a:rPr lang="pl-PL" dirty="0">
+              <a:rPr lang="pl-PL" dirty="0" smtClean="0">
                 <a:solidFill>
                   <a:srgbClr val="FFFFFF"/>
                 </a:solidFill>
               </a:rPr>
               <a:t>Zdarzenia</a:t>
             </a:r>
-            <a:r>
-              <a:rPr lang="pl-PL" sz="2000" dirty="0">
-                <a:solidFill>
-                  <a:srgbClr val="FFFFFF"/>
-                </a:solidFill>
-              </a:rPr>
-              <a:t>[</a:t>
-            </a:r>
-            <a:r>
-              <a:rPr lang="pl-PL" sz="2000" dirty="0" err="1">
-                <a:solidFill>
-                  <a:srgbClr val="FFFFFF"/>
-                </a:solidFill>
-              </a:rPr>
-              <a:t>wah</a:t>
-            </a:r>
-            <a:r>
-              <a:rPr lang="pl-PL" sz="2000" dirty="0">
-                <a:solidFill>
-                  <a:srgbClr val="FFFFFF"/>
-                </a:solidFill>
-              </a:rPr>
-              <a:t>]</a:t>
-            </a:r>
-            <a:endParaRPr lang="pl-PL" dirty="0"/>
-          </a:p>
-        </p:txBody>
-      </p:sp>
-      <p:sp>
-        <p:nvSpPr>
-          <p:cNvPr id="3" name="Symbol zastępczy zawartości 2"/>
+            <a:endParaRPr lang="pl-PL" sz="2000" dirty="0">
+              <a:solidFill>
+                <a:srgbClr val="FFFFFF"/>
+              </a:solidFill>
+            </a:endParaRPr>
+          </a:p>
+        </p:txBody>
+      </p:sp>
+      <p:sp>
+        <p:nvSpPr>
+          <p:cNvPr id="6" name="Symbol zastępczy zawartości 5"/>
           <p:cNvSpPr>
             <a:spLocks noGrp="1"/>
           </p:cNvSpPr>
@@ -5922,150 +6097,6 @@
           <a:bodyPr/>
           <a:lstStyle/>
           <a:p>
-            <a:r>
-              <a:rPr lang="pl-PL" dirty="0" smtClean="0">
-                <a:solidFill>
-                  <a:srgbClr val="FFFFFF"/>
-                </a:solidFill>
-              </a:rPr>
-              <a:t>Na zdarzenia reaguje się bezpośrednio z </a:t>
-            </a:r>
-            <a:r>
-              <a:rPr lang="pl-PL" dirty="0" err="1" smtClean="0">
-                <a:solidFill>
-                  <a:srgbClr val="FFFFFF"/>
-                </a:solidFill>
-              </a:rPr>
-              <a:t>HTML’a</a:t>
-            </a:r>
-            <a:r>
-              <a:rPr lang="pl-PL" dirty="0" smtClean="0">
-                <a:solidFill>
-                  <a:srgbClr val="FFFFFF"/>
-                </a:solidFill>
-              </a:rPr>
-              <a:t>, np:</a:t>
-            </a:r>
-          </a:p>
-          <a:p>
-            <a:pPr lvl="1"/>
-            <a:r>
-              <a:rPr lang="pl-PL" dirty="0" smtClean="0">
-                <a:solidFill>
-                  <a:srgbClr val="FFFFFF"/>
-                </a:solidFill>
-              </a:rPr>
-              <a:t>&lt;</a:t>
-            </a:r>
-            <a:r>
-              <a:rPr lang="pl-PL" i="1" dirty="0" err="1" smtClean="0">
-                <a:solidFill>
-                  <a:srgbClr val="FFFFFF"/>
-                </a:solidFill>
-              </a:rPr>
-              <a:t>tag</a:t>
-            </a:r>
-            <a:r>
-              <a:rPr lang="pl-PL" dirty="0" smtClean="0">
-                <a:solidFill>
-                  <a:srgbClr val="FFFFFF"/>
-                </a:solidFill>
-              </a:rPr>
-              <a:t> </a:t>
-            </a:r>
-            <a:r>
-              <a:rPr lang="pl-PL" dirty="0" err="1" smtClean="0">
-                <a:solidFill>
-                  <a:srgbClr val="FFFFFF"/>
-                </a:solidFill>
-              </a:rPr>
-              <a:t>on</a:t>
-            </a:r>
-            <a:r>
-              <a:rPr lang="pl-PL" i="1" dirty="0" err="1" smtClean="0">
-                <a:solidFill>
-                  <a:srgbClr val="FFFFFF"/>
-                </a:solidFill>
-              </a:rPr>
-              <a:t>event-name</a:t>
-            </a:r>
-            <a:r>
-              <a:rPr lang="pl-PL" dirty="0" smtClean="0">
-                <a:solidFill>
-                  <a:srgbClr val="FFFFFF"/>
-                </a:solidFill>
-              </a:rPr>
-              <a:t>="</a:t>
-            </a:r>
-            <a:r>
-              <a:rPr lang="pl-PL" i="1" dirty="0" err="1" smtClean="0">
-                <a:solidFill>
-                  <a:srgbClr val="FFFFFF"/>
-                </a:solidFill>
-              </a:rPr>
-              <a:t>expression</a:t>
-            </a:r>
-            <a:r>
-              <a:rPr lang="pl-PL" dirty="0" smtClean="0">
-                <a:solidFill>
-                  <a:srgbClr val="FFFFFF"/>
-                </a:solidFill>
-              </a:rPr>
-              <a:t>" /&gt;</a:t>
-            </a:r>
-          </a:p>
-          <a:p>
-            <a:r>
-              <a:rPr lang="pl-PL" dirty="0" smtClean="0">
-                <a:solidFill>
-                  <a:srgbClr val="FFFFFF"/>
-                </a:solidFill>
-              </a:rPr>
-              <a:t>Lub do właściwości instancji elementu przypisując funkcję, np:</a:t>
-            </a:r>
-          </a:p>
-          <a:p>
-            <a:pPr lvl="1"/>
-            <a:r>
-              <a:rPr lang="pl-PL" i="1" dirty="0" err="1" smtClean="0">
-                <a:solidFill>
-                  <a:srgbClr val="FFFFFF"/>
-                </a:solidFill>
-              </a:rPr>
-              <a:t>expression</a:t>
-            </a:r>
-            <a:r>
-              <a:rPr lang="pl-PL" dirty="0" err="1" smtClean="0">
-                <a:solidFill>
-                  <a:srgbClr val="FFFFFF"/>
-                </a:solidFill>
-              </a:rPr>
-              <a:t>.on</a:t>
-            </a:r>
-            <a:r>
-              <a:rPr lang="pl-PL" i="1" dirty="0" err="1" smtClean="0">
-                <a:solidFill>
-                  <a:srgbClr val="FFFFFF"/>
-                </a:solidFill>
-              </a:rPr>
-              <a:t>event-name</a:t>
-            </a:r>
-            <a:r>
-              <a:rPr lang="pl-PL" dirty="0" smtClean="0">
-                <a:solidFill>
-                  <a:srgbClr val="FFFFFF"/>
-                </a:solidFill>
-              </a:rPr>
-              <a:t> = </a:t>
-            </a:r>
-            <a:r>
-              <a:rPr lang="pl-PL" i="1" dirty="0" err="1" smtClean="0">
-                <a:solidFill>
-                  <a:srgbClr val="FFFFFF"/>
-                </a:solidFill>
-              </a:rPr>
-              <a:t>function-definition</a:t>
-            </a:r>
             <a:endParaRPr lang="pl-PL" dirty="0" smtClean="0">
               <a:solidFill>
                 <a:srgbClr val="FFFFFF"/>
@@ -6073,18 +6104,59 @@
             </a:endParaRPr>
           </a:p>
           <a:p>
-            <a:endParaRPr lang="pl-PL" i="1" dirty="0">
+            <a:r>
+              <a:rPr lang="pl-PL" dirty="0" smtClean="0">
+                <a:solidFill>
+                  <a:srgbClr val="FFFFFF"/>
+                </a:solidFill>
+              </a:rPr>
+              <a:t>Jako</a:t>
+            </a:r>
+            <a:r>
+              <a:rPr lang="pl-PL" dirty="0" smtClean="0">
+                <a:solidFill>
+                  <a:srgbClr val="FFFFFF"/>
+                </a:solidFill>
+              </a:rPr>
+              <a:t>, że HTML, a w konsekwencji również i JS radzi sobie z użytkownikami ludzkimi, nie wszystko dzieje się synchronicznie</a:t>
+            </a:r>
+          </a:p>
+          <a:p>
+            <a:endParaRPr lang="pl-PL" dirty="0" smtClean="0">
               <a:solidFill>
                 <a:srgbClr val="FFFFFF"/>
               </a:solidFill>
             </a:endParaRPr>
           </a:p>
+          <a:p>
+            <a:r>
+              <a:rPr lang="pl-PL" dirty="0" smtClean="0">
+                <a:solidFill>
+                  <a:srgbClr val="FFFFFF"/>
+                </a:solidFill>
+              </a:rPr>
+              <a:t>Zachodzi </a:t>
+            </a:r>
+            <a:r>
+              <a:rPr lang="pl-PL" dirty="0" smtClean="0">
+                <a:solidFill>
+                  <a:srgbClr val="FFFFFF"/>
+                </a:solidFill>
+              </a:rPr>
+              <a:t>wobec czego czasami potrzeba zareagowania na, np, kliknięcie przycisku</a:t>
+            </a:r>
+            <a:endParaRPr lang="pl-PL" dirty="0">
+              <a:solidFill>
+                <a:srgbClr val="FFFFFF"/>
+              </a:solidFill>
+            </a:endParaRPr>
+          </a:p>
         </p:txBody>
       </p:sp>
     </p:spTree>
     <p:extLst>
       <p:ext uri="{BB962C8B-B14F-4D97-AF65-F5344CB8AC3E}">
-        <p14:creationId xmlns:p14="http://schemas.microsoft.com/office/powerpoint/2010/main" val="1050035074"/>
+        <p14:creationId xmlns:p14="http://schemas.microsoft.com/office/powerpoint/2010/main" val="2236007757"/>
       </p:ext>
     </p:extLst>
   </p:cSld>
@@ -6120,7 +6192,7 @@
       </p:grpSpPr>
       <p:sp>
         <p:nvSpPr>
-          <p:cNvPr id="4" name="Tytuł 3"/>
+          <p:cNvPr id="2" name="Tytuł 1"/>
           <p:cNvSpPr>
             <a:spLocks noGrp="1"/>
           </p:cNvSpPr>
@@ -6139,82 +6211,213 @@
                   <a:srgbClr val="FFFFFF"/>
                 </a:solidFill>
               </a:rPr>
-              <a:t>Różne dziwne rzeczy</a:t>
-            </a:r>
-            <a:endParaRPr lang="pl-PL" dirty="0">
+              <a:t>Zdarzenia</a:t>
+            </a:r>
+            <a:endParaRPr lang="pl-PL" dirty="0"/>
+          </a:p>
+        </p:txBody>
+      </p:sp>
+      <p:sp>
+        <p:nvSpPr>
+          <p:cNvPr id="3" name="Symbol zastępczy zawartości 2"/>
+          <p:cNvSpPr>
+            <a:spLocks noGrp="1"/>
+          </p:cNvSpPr>
+          <p:nvPr>
+            <p:ph idx="1"/>
+          </p:nvPr>
+        </p:nvSpPr>
+        <p:spPr/>
+        <p:txBody>
+          <a:bodyPr/>
+          <a:lstStyle/>
+          <a:p>
+            <a:r>
+              <a:rPr lang="pl-PL" dirty="0" smtClean="0">
+                <a:solidFill>
+                  <a:srgbClr val="FFFFFF"/>
+                </a:solidFill>
+              </a:rPr>
+              <a:t>Na zdarzenia reaguje się bezpośrednio z </a:t>
+            </a:r>
+            <a:r>
+              <a:rPr lang="pl-PL" dirty="0" err="1" smtClean="0">
+                <a:solidFill>
+                  <a:srgbClr val="FFFFFF"/>
+                </a:solidFill>
+              </a:rPr>
+              <a:t>HTML’a</a:t>
+            </a:r>
+            <a:r>
+              <a:rPr lang="pl-PL" dirty="0" smtClean="0">
+                <a:solidFill>
+                  <a:srgbClr val="FFFFFF"/>
+                </a:solidFill>
+              </a:rPr>
+              <a:t>, np:</a:t>
+            </a:r>
+          </a:p>
+          <a:p>
+            <a:pPr lvl="1"/>
+            <a:r>
+              <a:rPr lang="pl-PL" dirty="0" smtClean="0">
+                <a:solidFill>
+                  <a:srgbClr val="FFFFFF"/>
+                </a:solidFill>
+              </a:rPr>
+              <a:t>&lt;</a:t>
+            </a:r>
+            <a:r>
+              <a:rPr lang="pl-PL" i="1" dirty="0" err="1" smtClean="0">
+                <a:solidFill>
+                  <a:srgbClr val="FFFFFF"/>
+                </a:solidFill>
+              </a:rPr>
+              <a:t>tag</a:t>
+            </a:r>
+            <a:r>
+              <a:rPr lang="pl-PL" dirty="0" smtClean="0">
+                <a:solidFill>
+                  <a:srgbClr val="FFFFFF"/>
+                </a:solidFill>
+              </a:rPr>
+              <a:t> </a:t>
+            </a:r>
+            <a:r>
+              <a:rPr lang="pl-PL" dirty="0" smtClean="0">
+                <a:solidFill>
+                  <a:srgbClr val="FFFFFF"/>
+                </a:solidFill>
+              </a:rPr>
+              <a:t>on[</a:t>
+            </a:r>
+            <a:r>
+              <a:rPr lang="pl-PL" dirty="0" err="1" smtClean="0">
+                <a:solidFill>
+                  <a:srgbClr val="FFFFFF"/>
+                </a:solidFill>
+              </a:rPr>
+              <a:t>event-name</a:t>
+            </a:r>
+            <a:r>
+              <a:rPr lang="pl-PL" dirty="0" smtClean="0">
+                <a:solidFill>
+                  <a:srgbClr val="FFFFFF"/>
+                </a:solidFill>
+              </a:rPr>
+              <a:t>]="</a:t>
+            </a:r>
+            <a:r>
+              <a:rPr lang="pl-PL" i="1" dirty="0" err="1" smtClean="0">
+                <a:solidFill>
+                  <a:srgbClr val="FFFFFF"/>
+                </a:solidFill>
+              </a:rPr>
+              <a:t>expression</a:t>
+            </a:r>
+            <a:r>
+              <a:rPr lang="pl-PL" dirty="0" smtClean="0">
+                <a:solidFill>
+                  <a:srgbClr val="FFFFFF"/>
+                </a:solidFill>
+              </a:rPr>
+              <a:t>" /&gt;</a:t>
+            </a:r>
+          </a:p>
+          <a:p>
+            <a:endParaRPr lang="pl-PL" dirty="0" smtClean="0">
               <a:solidFill>
                 <a:srgbClr val="FFFFFF"/>
               </a:solidFill>
             </a:endParaRPr>
           </a:p>
-        </p:txBody>
-      </p:sp>
-      <p:pic>
-        <p:nvPicPr>
-          <p:cNvPr id="8" name="Symbol zastępczy obrazu 7"/>
-          <p:cNvPicPr>
-            <a:picLocks noGrp="1" noChangeAspect="1"/>
-          </p:cNvPicPr>
-          <p:nvPr>
-            <p:ph type="pic" idx="1"/>
-          </p:nvPr>
-        </p:nvPicPr>
-        <p:blipFill rotWithShape="1">
-          <a:blip r:embed="rId3">
-            <a:extLst>
-              <a:ext uri="{28A0092B-C50C-407E-A947-70E740481C1C}">
-                <a14:useLocalDpi xmlns:a14="http://schemas.microsoft.com/office/drawing/2010/main" val="0"/>
-              </a:ext>
-            </a:extLst>
-          </a:blip>
-          <a:srcRect t="-6516" b="-6516"/>
-          <a:stretch/>
-        </p:blipFill>
-        <p:spPr/>
-      </p:pic>
-      <p:sp>
-        <p:nvSpPr>
-          <p:cNvPr id="6" name="Symbol zastępczy tekstu 5"/>
-          <p:cNvSpPr>
-            <a:spLocks noGrp="1"/>
-          </p:cNvSpPr>
-          <p:nvPr>
-            <p:ph type="body" sz="half" idx="2"/>
-          </p:nvPr>
-        </p:nvSpPr>
-        <p:spPr/>
-        <p:txBody>
-          <a:bodyPr/>
-          <a:lstStyle/>
-          <a:p>
+          <a:p>
+            <a:r>
+              <a:rPr lang="pl-PL" dirty="0" smtClean="0">
+                <a:solidFill>
+                  <a:srgbClr val="FFFFFF"/>
+                </a:solidFill>
+              </a:rPr>
+              <a:t>Lub </a:t>
+            </a:r>
+            <a:r>
+              <a:rPr lang="pl-PL" dirty="0" smtClean="0">
+                <a:solidFill>
+                  <a:srgbClr val="FFFFFF"/>
+                </a:solidFill>
+              </a:rPr>
+              <a:t>do właściwości instancji elementu przypisując funkcję, np:</a:t>
+            </a:r>
+          </a:p>
+          <a:p>
+            <a:pPr lvl="1"/>
             <a:r>
               <a:rPr lang="pl-PL" dirty="0" err="1" smtClean="0">
                 <a:solidFill>
                   <a:srgbClr val="FFFFFF"/>
                 </a:solidFill>
               </a:rPr>
-              <a:t>Wah</a:t>
-            </a:r>
-            <a:r>
-              <a:rPr lang="pl-PL" dirty="0" smtClean="0">
-                <a:solidFill>
-                  <a:srgbClr val="FFFFFF"/>
-                </a:solidFill>
-              </a:rPr>
-              <a:t>!</a:t>
-            </a:r>
-            <a:endParaRPr lang="pl-PL" dirty="0">
+              <a:t>expression.on</a:t>
+            </a:r>
+            <a:r>
+              <a:rPr lang="pl-PL" dirty="0" smtClean="0">
+                <a:solidFill>
+                  <a:srgbClr val="FFFFFF"/>
+                </a:solidFill>
+              </a:rPr>
+              <a:t>[</a:t>
+            </a:r>
+            <a:r>
+              <a:rPr lang="pl-PL" dirty="0" err="1" smtClean="0">
+                <a:solidFill>
+                  <a:srgbClr val="FFFFFF"/>
+                </a:solidFill>
+              </a:rPr>
+              <a:t>event-name</a:t>
+            </a:r>
+            <a:r>
+              <a:rPr lang="pl-PL" dirty="0" smtClean="0">
+                <a:solidFill>
+                  <a:srgbClr val="FFFFFF"/>
+                </a:solidFill>
+              </a:rPr>
+              <a:t>] </a:t>
+            </a:r>
+            <a:r>
+              <a:rPr lang="pl-PL" dirty="0" smtClean="0">
+                <a:solidFill>
+                  <a:srgbClr val="FFFFFF"/>
+                </a:solidFill>
+              </a:rPr>
+              <a:t>= </a:t>
+            </a:r>
+            <a:r>
+              <a:rPr lang="pl-PL" i="1" dirty="0" err="1" smtClean="0">
+                <a:solidFill>
+                  <a:srgbClr val="FFFFFF"/>
+                </a:solidFill>
+              </a:rPr>
+              <a:t>function-definition</a:t>
+            </a:r>
+            <a:endParaRPr lang="pl-PL" dirty="0" smtClean="0">
               <a:solidFill>
                 <a:srgbClr val="FFFFFF"/>
               </a:solidFill>
             </a:endParaRPr>
           </a:p>
+          <a:p>
+            <a:endParaRPr lang="pl-PL" i="1" dirty="0">
+              <a:solidFill>
+                <a:srgbClr val="FFFFFF"/>
+              </a:solidFill>
+            </a:endParaRPr>
+          </a:p>
         </p:txBody>
       </p:sp>
     </p:spTree>
     <p:extLst>
       <p:ext uri="{BB962C8B-B14F-4D97-AF65-F5344CB8AC3E}">
-        <p14:creationId xmlns:p14="http://schemas.microsoft.com/office/powerpoint/2010/main" val="2381991332"/>
+        <p14:creationId xmlns:p14="http://schemas.microsoft.com/office/powerpoint/2010/main" val="1050035074"/>
       </p:ext>
     </p:extLst>
   </p:cSld>
@@ -6294,6 +6497,13 @@
           <a:bodyPr/>
           <a:lstStyle/>
           <a:p>
+            <a:endParaRPr lang="pl-PL" dirty="0" smtClean="0">
+              <a:solidFill>
+                <a:srgbClr val="FFFFFF"/>
+              </a:solidFill>
+            </a:endParaRPr>
+          </a:p>
+          <a:p>
             <a:r>
               <a:rPr lang="pl-PL" dirty="0" err="1" smtClean="0">
                 <a:solidFill>
@@ -6414,6 +6624,13 @@
               </a:rPr>
               <a:t>funkcyjny</a:t>
             </a:r>
+          </a:p>
+          <a:p>
+            <a:endParaRPr lang="pl-PL" dirty="0" smtClean="0">
+              <a:solidFill>
+                <a:srgbClr val="FFFFFF"/>
+              </a:solidFill>
+            </a:endParaRPr>
           </a:p>
           <a:p>
             <a:r>
@@ -6521,7 +6738,7 @@
       </p:grpSpPr>
       <p:sp>
         <p:nvSpPr>
-          <p:cNvPr id="5" name="Tytuł 4"/>
+          <p:cNvPr id="4" name="Tytuł 3"/>
           <p:cNvSpPr>
             <a:spLocks noGrp="1"/>
           </p:cNvSpPr>
@@ -6540,23 +6757,7 @@
                   <a:srgbClr val="FFFFFF"/>
                 </a:solidFill>
               </a:rPr>
-              <a:t>&lt;</a:t>
-            </a:r>
-            <a:r>
-              <a:rPr lang="pl-PL" dirty="0" err="1" smtClean="0">
-                <a:solidFill>
-                  <a:srgbClr val="FFFFFF"/>
-                </a:solidFill>
-              </a:rPr>
-              <a:t>canvas</a:t>
-            </a:r>
-            <a:r>
-              <a:rPr lang="pl-PL" dirty="0" smtClean="0">
-                <a:solidFill>
-                  <a:srgbClr val="FFFFFF"/>
-                </a:solidFill>
-              </a:rPr>
-              <a:t>&gt;</a:t>
+              <a:t>Różne dziwne rzeczy</a:t>
             </a:r>
             <a:endParaRPr lang="pl-PL" dirty="0">
               <a:solidFill>
@@ -6566,80 +6767,53 @@
           </a:p>
         </p:txBody>
       </p:sp>
-      <p:sp>
-        <p:nvSpPr>
-          <p:cNvPr id="6" name="Symbol zastępczy zawartości 5"/>
-          <p:cNvSpPr>
-            <a:spLocks noGrp="1"/>
-          </p:cNvSpPr>
-          <p:nvPr>
-            <p:ph idx="1"/>
-          </p:nvPr>
-        </p:nvSpPr>
-        <p:spPr/>
-        <p:txBody>
-          <a:bodyPr/>
-          <a:lstStyle/>
-          <a:p>
-            <a:r>
-              <a:rPr lang="pl-PL" dirty="0" smtClean="0">
-                <a:solidFill>
-                  <a:srgbClr val="FFFFFF"/>
-                </a:solidFill>
-              </a:rPr>
-              <a:t>&lt;</a:t>
-            </a:r>
-            <a:r>
-              <a:rPr lang="pl-PL" dirty="0" err="1" smtClean="0">
-                <a:solidFill>
-                  <a:srgbClr val="FFFFFF"/>
-                </a:solidFill>
-              </a:rPr>
-              <a:t>canvas</a:t>
-            </a:r>
-            <a:r>
-              <a:rPr lang="pl-PL" dirty="0" smtClean="0">
-                <a:solidFill>
-                  <a:srgbClr val="FFFFFF"/>
-                </a:solidFill>
-              </a:rPr>
-              <a:t>&gt; – dosłownie „płótno” – element do rysowania dwu- i trzywymiarowego, patrz </a:t>
-            </a:r>
-            <a:r>
-              <a:rPr lang="pl-PL" dirty="0" err="1" smtClean="0">
-                <a:solidFill>
-                  <a:srgbClr val="FFFFFF"/>
-                </a:solidFill>
-              </a:rPr>
-              <a:t>egzampul</a:t>
-            </a:r>
-            <a:r>
-              <a:rPr lang="pl-PL" dirty="0" smtClean="0">
-                <a:solidFill>
-                  <a:srgbClr val="FFFFFF"/>
-                </a:solidFill>
-              </a:rPr>
-              <a:t> „</a:t>
-            </a:r>
-            <a:r>
-              <a:rPr lang="pl-PL" dirty="0" err="1" smtClean="0">
-                <a:solidFill>
-                  <a:srgbClr val="FFFFFF"/>
-                </a:solidFill>
-              </a:rPr>
-              <a:t>canvas</a:t>
-            </a:r>
-            <a:r>
-              <a:rPr lang="pl-PL" dirty="0" smtClean="0">
-                <a:solidFill>
-                  <a:srgbClr val="FFFFFF"/>
-                </a:solidFill>
-              </a:rPr>
-              <a:t>”</a:t>
-            </a:r>
-          </a:p>
-          <a:p>
-            <a:endParaRPr lang="pl-PL" dirty="0" smtClean="0">
+      <p:pic>
+        <p:nvPicPr>
+          <p:cNvPr id="8" name="Symbol zastępczy obrazu 7"/>
+          <p:cNvPicPr>
+            <a:picLocks noGrp="1" noChangeAspect="1"/>
+          </p:cNvPicPr>
+          <p:nvPr>
+            <p:ph type="pic" idx="1"/>
+          </p:nvPr>
+        </p:nvPicPr>
+        <p:blipFill rotWithShape="1">
+          <a:blip r:embed="rId3">
+            <a:extLst>
+              <a:ext uri="{28A0092B-C50C-407E-A947-70E740481C1C}">
+                <a14:useLocalDpi xmlns:a14="http://schemas.microsoft.com/office/drawing/2010/main" val="0"/>
+              </a:ext>
+            </a:extLst>
+          </a:blip>
+          <a:srcRect t="-6516" b="-6516"/>
+          <a:stretch/>
+        </p:blipFill>
+        <p:spPr/>
+      </p:pic>
+      <p:sp>
+        <p:nvSpPr>
+          <p:cNvPr id="6" name="Symbol zastępczy tekstu 5"/>
+          <p:cNvSpPr>
+            <a:spLocks noGrp="1"/>
+          </p:cNvSpPr>
+          <p:nvPr>
+            <p:ph type="body" sz="half" idx="2"/>
+          </p:nvPr>
+        </p:nvSpPr>
+        <p:spPr/>
+        <p:txBody>
+          <a:bodyPr/>
+          <a:lstStyle/>
+          <a:p>
+            <a:r>
+              <a:rPr lang="pl-PL" dirty="0" smtClean="0">
+                <a:solidFill>
+                  <a:srgbClr val="FFFFFF"/>
+                </a:solidFill>
+              </a:rPr>
+              <a:t>Interakcja z użytkownikiem w przybliżeniu</a:t>
+            </a:r>
+            <a:endParaRPr lang="pl-PL" dirty="0">
               <a:solidFill>
                 <a:srgbClr val="FFFFFF"/>
               </a:solidFill>
@@ -6650,7 +6824,7 @@
     </p:spTree>
     <p:extLst>
       <p:ext uri="{BB962C8B-B14F-4D97-AF65-F5344CB8AC3E}">
-        <p14:creationId xmlns:p14="http://schemas.microsoft.com/office/powerpoint/2010/main" val="1076531335"/>
+        <p14:creationId xmlns:p14="http://schemas.microsoft.com/office/powerpoint/2010/main" val="2381991332"/>
       </p:ext>
     </p:extLst>
   </p:cSld>
@@ -6686,7 +6860,7 @@
       </p:grpSpPr>
       <p:sp>
         <p:nvSpPr>
-          <p:cNvPr id="2" name="Tytuł 1"/>
+          <p:cNvPr id="5" name="Tytuł 4"/>
           <p:cNvSpPr>
             <a:spLocks noGrp="1"/>
           </p:cNvSpPr>
@@ -6708,12 +6882,12 @@
               <a:t>&lt;</a:t>
             </a:r>
             <a:r>
-              <a:rPr lang="pl-PL" smtClean="0">
-                <a:solidFill>
-                  <a:srgbClr val="FFFFFF"/>
-                </a:solidFill>
-              </a:rPr>
-              <a:t>input</a:t>
+              <a:rPr lang="pl-PL" dirty="0" err="1" smtClean="0">
+                <a:solidFill>
+                  <a:srgbClr val="FFFFFF"/>
+                </a:solidFill>
+              </a:rPr>
+              <a:t>canvas</a:t>
             </a:r>
             <a:r>
               <a:rPr lang="pl-PL" dirty="0" smtClean="0">
@@ -6733,6 +6907,177 @@
       </p:sp>
       <p:sp>
         <p:nvSpPr>
+          <p:cNvPr id="6" name="Symbol zastępczy zawartości 5"/>
+          <p:cNvSpPr>
+            <a:spLocks noGrp="1"/>
+          </p:cNvSpPr>
+          <p:nvPr>
+            <p:ph idx="1"/>
+          </p:nvPr>
+        </p:nvSpPr>
+        <p:spPr/>
+        <p:txBody>
+          <a:bodyPr/>
+          <a:lstStyle/>
+          <a:p>
+            <a:endParaRPr lang="pl-PL" dirty="0" smtClean="0">
+              <a:solidFill>
+                <a:srgbClr val="FFFFFF"/>
+              </a:solidFill>
+            </a:endParaRPr>
+          </a:p>
+          <a:p>
+            <a:endParaRPr lang="pl-PL" dirty="0">
+              <a:solidFill>
+                <a:srgbClr val="FFFFFF"/>
+              </a:solidFill>
+            </a:endParaRPr>
+          </a:p>
+          <a:p>
+            <a:r>
+              <a:rPr lang="pl-PL" dirty="0" smtClean="0">
+                <a:solidFill>
+                  <a:srgbClr val="FFFFFF"/>
+                </a:solidFill>
+              </a:rPr>
+              <a:t>&lt;</a:t>
+            </a:r>
+            <a:r>
+              <a:rPr lang="pl-PL" dirty="0" err="1" smtClean="0">
+                <a:solidFill>
+                  <a:srgbClr val="FFFFFF"/>
+                </a:solidFill>
+              </a:rPr>
+              <a:t>canvas</a:t>
+            </a:r>
+            <a:r>
+              <a:rPr lang="pl-PL" dirty="0" smtClean="0">
+                <a:solidFill>
+                  <a:srgbClr val="FFFFFF"/>
+                </a:solidFill>
+              </a:rPr>
+              <a:t>&gt; – dosłownie „płótno” – element do rysowania dwu- i trzywymiarowego, patrz </a:t>
+            </a:r>
+            <a:r>
+              <a:rPr lang="pl-PL" dirty="0" smtClean="0">
+                <a:solidFill>
+                  <a:srgbClr val="FFFFFF"/>
+                </a:solidFill>
+              </a:rPr>
+              <a:t>przykład „</a:t>
+            </a:r>
+            <a:r>
+              <a:rPr lang="pl-PL" dirty="0" err="1" smtClean="0">
+                <a:solidFill>
+                  <a:srgbClr val="FFFFFF"/>
+                </a:solidFill>
+              </a:rPr>
+              <a:t>canvas</a:t>
+            </a:r>
+            <a:r>
+              <a:rPr lang="pl-PL" dirty="0" smtClean="0">
+                <a:solidFill>
+                  <a:srgbClr val="FFFFFF"/>
+                </a:solidFill>
+              </a:rPr>
+              <a:t>”</a:t>
+            </a:r>
+          </a:p>
+          <a:p>
+            <a:endParaRPr lang="pl-PL" dirty="0" smtClean="0">
+              <a:solidFill>
+                <a:srgbClr val="FFFFFF"/>
+              </a:solidFill>
+            </a:endParaRPr>
+          </a:p>
+        </p:txBody>
+      </p:sp>
+    </p:spTree>
+    <p:extLst>
+      <p:ext uri="{BB962C8B-B14F-4D97-AF65-F5344CB8AC3E}">
+        <p14:creationId xmlns:p14="http://schemas.microsoft.com/office/powerpoint/2010/main" val="1076531335"/>
+      </p:ext>
+    </p:extLst>
+  </p:cSld>
+  <p:clrMapOvr>
+    <a:masterClrMapping/>
+  </p:clrMapOvr>
+  <p:timing>
+    <p:tnLst>
+      <p:par>
+        <p:cTn id="1" dur="indefinite" restart="never" nodeType="tmRoot"/>
+      </p:par>
+    </p:tnLst>
+  </p:timing>
+</p:sld>
+</file>
+
+<file path=ppt/slides/slide22.xml><?xml version="1.0" encoding="utf-8"?>
+<p:sld xmlns:a="http://schemas.openxmlformats.org/drawingml/2006/main" xmlns:r="http://schemas.openxmlformats.org/officeDocument/2006/relationships" xmlns:p="http://schemas.openxmlformats.org/presentationml/2006/main">
+  <p:cSld>
+    <p:spTree>
+      <p:nvGrpSpPr>
+        <p:cNvPr id="1" name=""/>
+        <p:cNvGrpSpPr/>
+        <p:nvPr/>
+      </p:nvGrpSpPr>
+      <p:grpSpPr>
+        <a:xfrm>
+          <a:off x="0" y="0"/>
+          <a:ext cx="0" cy="0"/>
+          <a:chOff x="0" y="0"/>
+          <a:chExt cx="0" cy="0"/>
+        </a:xfrm>
+      </p:grpSpPr>
+      <p:sp>
+        <p:nvSpPr>
+          <p:cNvPr id="2" name="Tytuł 1"/>
+          <p:cNvSpPr>
+            <a:spLocks noGrp="1"/>
+          </p:cNvSpPr>
+          <p:nvPr>
+            <p:ph type="title"/>
+          </p:nvPr>
+        </p:nvSpPr>
+        <p:spPr/>
+        <p:txBody>
+          <a:bodyPr/>
+          <a:lstStyle/>
+          <a:p>
+            <a:r>
+              <a:rPr lang="pl-PL" dirty="0" smtClean="0">
+                <a:solidFill>
+                  <a:srgbClr val="FFFFFF"/>
+                </a:solidFill>
+              </a:rPr>
+              <a:t>&lt;</a:t>
+            </a:r>
+            <a:r>
+              <a:rPr lang="pl-PL" smtClean="0">
+                <a:solidFill>
+                  <a:srgbClr val="FFFFFF"/>
+                </a:solidFill>
+              </a:rPr>
+              <a:t>input</a:t>
+            </a:r>
+            <a:r>
+              <a:rPr lang="pl-PL" dirty="0" smtClean="0">
+                <a:solidFill>
+                  <a:srgbClr val="FFFFFF"/>
+                </a:solidFill>
+              </a:rPr>
+              <a:t>&gt;</a:t>
+            </a:r>
+            <a:endParaRPr lang="pl-PL" dirty="0">
+              <a:solidFill>
+                <a:srgbClr val="FFFFFF"/>
+              </a:solidFill>
+            </a:endParaRPr>
+          </a:p>
+        </p:txBody>
+      </p:sp>
+      <p:sp>
+        <p:nvSpPr>
           <p:cNvPr id="3" name="Symbol zastępczy zawartości 2"/>
           <p:cNvSpPr>
             <a:spLocks noGrp="1"/>
@@ -6746,6 +7091,26 @@
           <a:bodyPr/>
           <a:lstStyle/>
           <a:p>
+            <a:pPr marL="0" indent="0">
+              <a:buNone/>
+            </a:pPr>
+            <a:endParaRPr lang="pl-PL" dirty="0" smtClean="0">
+              <a:solidFill>
+                <a:srgbClr val="FFFFFF"/>
+              </a:solidFill>
+            </a:endParaRPr>
+          </a:p>
+          <a:p>
+            <a:pPr marL="0" indent="0">
+              <a:buNone/>
+            </a:pPr>
+            <a:endParaRPr lang="pl-PL" dirty="0" smtClean="0">
+              <a:solidFill>
+                <a:srgbClr val="FFFFFF"/>
+              </a:solidFill>
+            </a:endParaRPr>
+          </a:p>
+          <a:p>
             <a:r>
               <a:rPr lang="pl-PL" dirty="0" smtClean="0">
                 <a:solidFill>
@@ -6771,20 +7136,12 @@
               <a:t>&gt; – dosłownie „dane wejściowe” – element do obsługiwania różnorakich twórczych danych od użytkownika, patrz </a:t>
             </a:r>
             <a:r>
-              <a:rPr lang="pl-PL" dirty="0" err="1" smtClean="0">
-                <a:solidFill>
-                  <a:srgbClr val="FFFFFF"/>
-                </a:solidFill>
-              </a:rPr>
-              <a:t>egzampul</a:t>
-            </a:r>
-            <a:r>
-              <a:rPr lang="pl-PL" dirty="0" smtClean="0">
-                <a:solidFill>
-                  <a:srgbClr val="FFFFFF"/>
-                </a:solidFill>
-              </a:rPr>
-              <a:t> „</a:t>
+              <a:rPr lang="pl-PL" dirty="0" smtClean="0">
+                <a:solidFill>
+                  <a:srgbClr val="FFFFFF"/>
+                </a:solidFill>
+              </a:rPr>
+              <a:t>przykład „</a:t>
             </a:r>
             <a:r>
               <a:rPr lang="pl-PL" dirty="0" err="1" smtClean="0">

</xml_diff>